<commit_message>
updating slide and code
</commit_message>
<xml_diff>
--- a/Text_Mining_Presentation.pptx
+++ b/Text_Mining_Presentation.pptx
@@ -24,7 +24,7 @@
     <p:sldId id="316" r:id="rId15"/>
     <p:sldId id="329" r:id="rId16"/>
     <p:sldId id="311" r:id="rId17"/>
-    <p:sldId id="317" r:id="rId18"/>
+    <p:sldId id="336" r:id="rId18"/>
     <p:sldId id="312" r:id="rId19"/>
     <p:sldId id="320" r:id="rId20"/>
     <p:sldId id="318" r:id="rId21"/>
@@ -3874,753 +3874,6 @@
   <dgm:styleLbl name="fgShp">
     <dgm:fillClrLst meth="repeat">
       <a:schemeClr val="accent2">
-        <a:tint val="60000"/>
-      </a:schemeClr>
-    </dgm:fillClrLst>
-    <dgm:linClrLst meth="repeat">
-      <a:schemeClr val="lt1"/>
-    </dgm:linClrLst>
-    <dgm:effectClrLst/>
-    <dgm:txLinClrLst/>
-    <dgm:txFillClrLst meth="repeat">
-      <a:schemeClr val="dk1"/>
-    </dgm:txFillClrLst>
-    <dgm:txEffectClrLst/>
-  </dgm:styleLbl>
-  <dgm:styleLbl name="revTx">
-    <dgm:fillClrLst meth="repeat">
-      <a:schemeClr val="lt1">
-        <a:alpha val="0"/>
-      </a:schemeClr>
-    </dgm:fillClrLst>
-    <dgm:linClrLst meth="repeat">
-      <a:schemeClr val="dk1">
-        <a:alpha val="0"/>
-      </a:schemeClr>
-    </dgm:linClrLst>
-    <dgm:effectClrLst/>
-    <dgm:txLinClrLst/>
-    <dgm:txFillClrLst meth="repeat">
-      <a:schemeClr val="tx1"/>
-    </dgm:txFillClrLst>
-    <dgm:txEffectClrLst/>
-  </dgm:styleLbl>
-</dgm:colorsDef>
-</file>
-
-<file path=ppt/diagrams/colors6.xml><?xml version="1.0" encoding="utf-8"?>
-<dgm:colorsDef xmlns:dgm="http://schemas.openxmlformats.org/drawingml/2006/diagram" xmlns:a="http://schemas.openxmlformats.org/drawingml/2006/main" uniqueId="urn:microsoft.com/office/officeart/2005/8/colors/accent1_2">
-  <dgm:title val=""/>
-  <dgm:desc val=""/>
-  <dgm:catLst>
-    <dgm:cat type="accent1" pri="11200"/>
-  </dgm:catLst>
-  <dgm:styleLbl name="node0">
-    <dgm:fillClrLst meth="repeat">
-      <a:schemeClr val="accent1"/>
-    </dgm:fillClrLst>
-    <dgm:linClrLst meth="repeat">
-      <a:schemeClr val="lt1"/>
-    </dgm:linClrLst>
-    <dgm:effectClrLst/>
-    <dgm:txLinClrLst/>
-    <dgm:txFillClrLst/>
-    <dgm:txEffectClrLst/>
-  </dgm:styleLbl>
-  <dgm:styleLbl name="alignNode1">
-    <dgm:fillClrLst meth="repeat">
-      <a:schemeClr val="accent1"/>
-    </dgm:fillClrLst>
-    <dgm:linClrLst meth="repeat">
-      <a:schemeClr val="accent1"/>
-    </dgm:linClrLst>
-    <dgm:effectClrLst/>
-    <dgm:txLinClrLst/>
-    <dgm:txFillClrLst/>
-    <dgm:txEffectClrLst/>
-  </dgm:styleLbl>
-  <dgm:styleLbl name="node1">
-    <dgm:fillClrLst meth="repeat">
-      <a:schemeClr val="accent1"/>
-    </dgm:fillClrLst>
-    <dgm:linClrLst meth="repeat">
-      <a:schemeClr val="lt1"/>
-    </dgm:linClrLst>
-    <dgm:effectClrLst/>
-    <dgm:txLinClrLst/>
-    <dgm:txFillClrLst/>
-    <dgm:txEffectClrLst/>
-  </dgm:styleLbl>
-  <dgm:styleLbl name="lnNode1">
-    <dgm:fillClrLst meth="repeat">
-      <a:schemeClr val="accent1"/>
-    </dgm:fillClrLst>
-    <dgm:linClrLst meth="repeat">
-      <a:schemeClr val="lt1"/>
-    </dgm:linClrLst>
-    <dgm:effectClrLst/>
-    <dgm:txLinClrLst/>
-    <dgm:txFillClrLst/>
-    <dgm:txEffectClrLst/>
-  </dgm:styleLbl>
-  <dgm:styleLbl name="vennNode1">
-    <dgm:fillClrLst meth="repeat">
-      <a:schemeClr val="accent1">
-        <a:alpha val="50000"/>
-      </a:schemeClr>
-    </dgm:fillClrLst>
-    <dgm:linClrLst meth="repeat">
-      <a:schemeClr val="lt1"/>
-    </dgm:linClrLst>
-    <dgm:effectClrLst/>
-    <dgm:txLinClrLst/>
-    <dgm:txFillClrLst/>
-    <dgm:txEffectClrLst/>
-  </dgm:styleLbl>
-  <dgm:styleLbl name="node2">
-    <dgm:fillClrLst meth="repeat">
-      <a:schemeClr val="accent1"/>
-    </dgm:fillClrLst>
-    <dgm:linClrLst meth="repeat">
-      <a:schemeClr val="lt1"/>
-    </dgm:linClrLst>
-    <dgm:effectClrLst/>
-    <dgm:txLinClrLst/>
-    <dgm:txFillClrLst/>
-    <dgm:txEffectClrLst/>
-  </dgm:styleLbl>
-  <dgm:styleLbl name="node3">
-    <dgm:fillClrLst meth="repeat">
-      <a:schemeClr val="accent1"/>
-    </dgm:fillClrLst>
-    <dgm:linClrLst meth="repeat">
-      <a:schemeClr val="lt1"/>
-    </dgm:linClrLst>
-    <dgm:effectClrLst/>
-    <dgm:txLinClrLst/>
-    <dgm:txFillClrLst/>
-    <dgm:txEffectClrLst/>
-  </dgm:styleLbl>
-  <dgm:styleLbl name="node4">
-    <dgm:fillClrLst meth="repeat">
-      <a:schemeClr val="accent1"/>
-    </dgm:fillClrLst>
-    <dgm:linClrLst meth="repeat">
-      <a:schemeClr val="lt1"/>
-    </dgm:linClrLst>
-    <dgm:effectClrLst/>
-    <dgm:txLinClrLst/>
-    <dgm:txFillClrLst/>
-    <dgm:txEffectClrLst/>
-  </dgm:styleLbl>
-  <dgm:styleLbl name="fgImgPlace1">
-    <dgm:fillClrLst meth="repeat">
-      <a:schemeClr val="accent1">
-        <a:tint val="50000"/>
-      </a:schemeClr>
-    </dgm:fillClrLst>
-    <dgm:linClrLst meth="repeat">
-      <a:schemeClr val="lt1"/>
-    </dgm:linClrLst>
-    <dgm:effectClrLst/>
-    <dgm:txLinClrLst/>
-    <dgm:txFillClrLst meth="repeat">
-      <a:schemeClr val="lt1"/>
-    </dgm:txFillClrLst>
-    <dgm:txEffectClrLst/>
-  </dgm:styleLbl>
-  <dgm:styleLbl name="alignImgPlace1">
-    <dgm:fillClrLst meth="repeat">
-      <a:schemeClr val="accent1">
-        <a:tint val="50000"/>
-      </a:schemeClr>
-    </dgm:fillClrLst>
-    <dgm:linClrLst meth="repeat">
-      <a:schemeClr val="lt1"/>
-    </dgm:linClrLst>
-    <dgm:effectClrLst/>
-    <dgm:txLinClrLst/>
-    <dgm:txFillClrLst meth="repeat">
-      <a:schemeClr val="lt1"/>
-    </dgm:txFillClrLst>
-    <dgm:txEffectClrLst/>
-  </dgm:styleLbl>
-  <dgm:styleLbl name="bgImgPlace1">
-    <dgm:fillClrLst meth="repeat">
-      <a:schemeClr val="accent1">
-        <a:tint val="50000"/>
-      </a:schemeClr>
-    </dgm:fillClrLst>
-    <dgm:linClrLst meth="repeat">
-      <a:schemeClr val="lt1"/>
-    </dgm:linClrLst>
-    <dgm:effectClrLst/>
-    <dgm:txLinClrLst/>
-    <dgm:txFillClrLst meth="repeat">
-      <a:schemeClr val="lt1"/>
-    </dgm:txFillClrLst>
-    <dgm:txEffectClrLst/>
-  </dgm:styleLbl>
-  <dgm:styleLbl name="sibTrans2D1">
-    <dgm:fillClrLst meth="repeat">
-      <a:schemeClr val="accent1">
-        <a:tint val="60000"/>
-      </a:schemeClr>
-    </dgm:fillClrLst>
-    <dgm:linClrLst meth="repeat">
-      <a:schemeClr val="accent1">
-        <a:tint val="60000"/>
-      </a:schemeClr>
-    </dgm:linClrLst>
-    <dgm:effectClrLst/>
-    <dgm:txLinClrLst/>
-    <dgm:txFillClrLst/>
-    <dgm:txEffectClrLst/>
-  </dgm:styleLbl>
-  <dgm:styleLbl name="fgSibTrans2D1">
-    <dgm:fillClrLst meth="repeat">
-      <a:schemeClr val="accent1">
-        <a:tint val="60000"/>
-      </a:schemeClr>
-    </dgm:fillClrLst>
-    <dgm:linClrLst meth="repeat">
-      <a:schemeClr val="accent1">
-        <a:tint val="60000"/>
-      </a:schemeClr>
-    </dgm:linClrLst>
-    <dgm:effectClrLst/>
-    <dgm:txLinClrLst/>
-    <dgm:txFillClrLst/>
-    <dgm:txEffectClrLst/>
-  </dgm:styleLbl>
-  <dgm:styleLbl name="bgSibTrans2D1">
-    <dgm:fillClrLst meth="repeat">
-      <a:schemeClr val="accent1">
-        <a:tint val="60000"/>
-      </a:schemeClr>
-    </dgm:fillClrLst>
-    <dgm:linClrLst meth="repeat">
-      <a:schemeClr val="accent1">
-        <a:tint val="60000"/>
-      </a:schemeClr>
-    </dgm:linClrLst>
-    <dgm:effectClrLst/>
-    <dgm:txLinClrLst/>
-    <dgm:txFillClrLst/>
-    <dgm:txEffectClrLst/>
-  </dgm:styleLbl>
-  <dgm:styleLbl name="sibTrans1D1">
-    <dgm:fillClrLst meth="repeat">
-      <a:schemeClr val="accent1"/>
-    </dgm:fillClrLst>
-    <dgm:linClrLst meth="repeat">
-      <a:schemeClr val="accent1"/>
-    </dgm:linClrLst>
-    <dgm:effectClrLst/>
-    <dgm:txLinClrLst/>
-    <dgm:txFillClrLst meth="repeat">
-      <a:schemeClr val="tx1"/>
-    </dgm:txFillClrLst>
-    <dgm:txEffectClrLst/>
-  </dgm:styleLbl>
-  <dgm:styleLbl name="callout">
-    <dgm:fillClrLst meth="repeat">
-      <a:schemeClr val="accent1"/>
-    </dgm:fillClrLst>
-    <dgm:linClrLst meth="repeat">
-      <a:schemeClr val="accent1">
-        <a:tint val="50000"/>
-      </a:schemeClr>
-    </dgm:linClrLst>
-    <dgm:effectClrLst/>
-    <dgm:txLinClrLst/>
-    <dgm:txFillClrLst meth="repeat">
-      <a:schemeClr val="tx1"/>
-    </dgm:txFillClrLst>
-    <dgm:txEffectClrLst/>
-  </dgm:styleLbl>
-  <dgm:styleLbl name="asst0">
-    <dgm:fillClrLst meth="repeat">
-      <a:schemeClr val="accent1"/>
-    </dgm:fillClrLst>
-    <dgm:linClrLst meth="repeat">
-      <a:schemeClr val="lt1"/>
-    </dgm:linClrLst>
-    <dgm:effectClrLst/>
-    <dgm:txLinClrLst/>
-    <dgm:txFillClrLst/>
-    <dgm:txEffectClrLst/>
-  </dgm:styleLbl>
-  <dgm:styleLbl name="asst1">
-    <dgm:fillClrLst meth="repeat">
-      <a:schemeClr val="accent1"/>
-    </dgm:fillClrLst>
-    <dgm:linClrLst meth="repeat">
-      <a:schemeClr val="lt1"/>
-    </dgm:linClrLst>
-    <dgm:effectClrLst/>
-    <dgm:txLinClrLst/>
-    <dgm:txFillClrLst/>
-    <dgm:txEffectClrLst/>
-  </dgm:styleLbl>
-  <dgm:styleLbl name="asst2">
-    <dgm:fillClrLst meth="repeat">
-      <a:schemeClr val="accent1"/>
-    </dgm:fillClrLst>
-    <dgm:linClrLst meth="repeat">
-      <a:schemeClr val="lt1"/>
-    </dgm:linClrLst>
-    <dgm:effectClrLst/>
-    <dgm:txLinClrLst/>
-    <dgm:txFillClrLst/>
-    <dgm:txEffectClrLst/>
-  </dgm:styleLbl>
-  <dgm:styleLbl name="asst3">
-    <dgm:fillClrLst meth="repeat">
-      <a:schemeClr val="accent1"/>
-    </dgm:fillClrLst>
-    <dgm:linClrLst meth="repeat">
-      <a:schemeClr val="lt1"/>
-    </dgm:linClrLst>
-    <dgm:effectClrLst/>
-    <dgm:txLinClrLst/>
-    <dgm:txFillClrLst/>
-    <dgm:txEffectClrLst/>
-  </dgm:styleLbl>
-  <dgm:styleLbl name="asst4">
-    <dgm:fillClrLst meth="repeat">
-      <a:schemeClr val="accent1"/>
-    </dgm:fillClrLst>
-    <dgm:linClrLst meth="repeat">
-      <a:schemeClr val="lt1"/>
-    </dgm:linClrLst>
-    <dgm:effectClrLst/>
-    <dgm:txLinClrLst/>
-    <dgm:txFillClrLst/>
-    <dgm:txEffectClrLst/>
-  </dgm:styleLbl>
-  <dgm:styleLbl name="parChTrans2D1">
-    <dgm:fillClrLst meth="repeat">
-      <a:schemeClr val="accent1">
-        <a:tint val="60000"/>
-      </a:schemeClr>
-    </dgm:fillClrLst>
-    <dgm:linClrLst meth="repeat">
-      <a:schemeClr val="accent1">
-        <a:tint val="60000"/>
-      </a:schemeClr>
-    </dgm:linClrLst>
-    <dgm:effectClrLst/>
-    <dgm:txLinClrLst/>
-    <dgm:txFillClrLst meth="repeat">
-      <a:schemeClr val="lt1"/>
-    </dgm:txFillClrLst>
-    <dgm:txEffectClrLst/>
-  </dgm:styleLbl>
-  <dgm:styleLbl name="parChTrans2D2">
-    <dgm:fillClrLst meth="repeat">
-      <a:schemeClr val="accent1"/>
-    </dgm:fillClrLst>
-    <dgm:linClrLst meth="repeat">
-      <a:schemeClr val="accent1"/>
-    </dgm:linClrLst>
-    <dgm:effectClrLst/>
-    <dgm:txLinClrLst/>
-    <dgm:txFillClrLst meth="repeat">
-      <a:schemeClr val="lt1"/>
-    </dgm:txFillClrLst>
-    <dgm:txEffectClrLst/>
-  </dgm:styleLbl>
-  <dgm:styleLbl name="parChTrans2D3">
-    <dgm:fillClrLst meth="repeat">
-      <a:schemeClr val="accent1"/>
-    </dgm:fillClrLst>
-    <dgm:linClrLst meth="repeat">
-      <a:schemeClr val="accent1"/>
-    </dgm:linClrLst>
-    <dgm:effectClrLst/>
-    <dgm:txLinClrLst/>
-    <dgm:txFillClrLst meth="repeat">
-      <a:schemeClr val="lt1"/>
-    </dgm:txFillClrLst>
-    <dgm:txEffectClrLst/>
-  </dgm:styleLbl>
-  <dgm:styleLbl name="parChTrans2D4">
-    <dgm:fillClrLst meth="repeat">
-      <a:schemeClr val="accent1"/>
-    </dgm:fillClrLst>
-    <dgm:linClrLst meth="repeat">
-      <a:schemeClr val="accent1"/>
-    </dgm:linClrLst>
-    <dgm:effectClrLst/>
-    <dgm:txLinClrLst/>
-    <dgm:txFillClrLst meth="repeat">
-      <a:schemeClr val="lt1"/>
-    </dgm:txFillClrLst>
-    <dgm:txEffectClrLst/>
-  </dgm:styleLbl>
-  <dgm:styleLbl name="parChTrans1D1">
-    <dgm:fillClrLst meth="repeat">
-      <a:schemeClr val="accent1"/>
-    </dgm:fillClrLst>
-    <dgm:linClrLst meth="repeat">
-      <a:schemeClr val="accent1">
-        <a:shade val="60000"/>
-      </a:schemeClr>
-    </dgm:linClrLst>
-    <dgm:effectClrLst/>
-    <dgm:txLinClrLst/>
-    <dgm:txFillClrLst meth="repeat">
-      <a:schemeClr val="tx1"/>
-    </dgm:txFillClrLst>
-    <dgm:txEffectClrLst/>
-  </dgm:styleLbl>
-  <dgm:styleLbl name="parChTrans1D2">
-    <dgm:fillClrLst meth="repeat">
-      <a:schemeClr val="accent1"/>
-    </dgm:fillClrLst>
-    <dgm:linClrLst meth="repeat">
-      <a:schemeClr val="accent1">
-        <a:shade val="60000"/>
-      </a:schemeClr>
-    </dgm:linClrLst>
-    <dgm:effectClrLst/>
-    <dgm:txLinClrLst/>
-    <dgm:txFillClrLst meth="repeat">
-      <a:schemeClr val="tx1"/>
-    </dgm:txFillClrLst>
-    <dgm:txEffectClrLst/>
-  </dgm:styleLbl>
-  <dgm:styleLbl name="parChTrans1D3">
-    <dgm:fillClrLst meth="repeat">
-      <a:schemeClr val="accent1"/>
-    </dgm:fillClrLst>
-    <dgm:linClrLst meth="repeat">
-      <a:schemeClr val="accent1">
-        <a:shade val="80000"/>
-      </a:schemeClr>
-    </dgm:linClrLst>
-    <dgm:effectClrLst/>
-    <dgm:txLinClrLst/>
-    <dgm:txFillClrLst meth="repeat">
-      <a:schemeClr val="tx1"/>
-    </dgm:txFillClrLst>
-    <dgm:txEffectClrLst/>
-  </dgm:styleLbl>
-  <dgm:styleLbl name="parChTrans1D4">
-    <dgm:fillClrLst meth="repeat">
-      <a:schemeClr val="accent1"/>
-    </dgm:fillClrLst>
-    <dgm:linClrLst meth="repeat">
-      <a:schemeClr val="accent1">
-        <a:shade val="80000"/>
-      </a:schemeClr>
-    </dgm:linClrLst>
-    <dgm:effectClrLst/>
-    <dgm:txLinClrLst/>
-    <dgm:txFillClrLst meth="repeat">
-      <a:schemeClr val="tx1"/>
-    </dgm:txFillClrLst>
-    <dgm:txEffectClrLst/>
-  </dgm:styleLbl>
-  <dgm:styleLbl name="fgAcc1">
-    <dgm:fillClrLst meth="repeat">
-      <a:schemeClr val="lt1">
-        <a:alpha val="90000"/>
-      </a:schemeClr>
-    </dgm:fillClrLst>
-    <dgm:linClrLst meth="repeat">
-      <a:schemeClr val="accent1"/>
-    </dgm:linClrLst>
-    <dgm:effectClrLst/>
-    <dgm:txLinClrLst/>
-    <dgm:txFillClrLst meth="repeat">
-      <a:schemeClr val="dk1"/>
-    </dgm:txFillClrLst>
-    <dgm:txEffectClrLst/>
-  </dgm:styleLbl>
-  <dgm:styleLbl name="conFgAcc1">
-    <dgm:fillClrLst meth="repeat">
-      <a:schemeClr val="lt1">
-        <a:alpha val="90000"/>
-      </a:schemeClr>
-    </dgm:fillClrLst>
-    <dgm:linClrLst meth="repeat">
-      <a:schemeClr val="accent1"/>
-    </dgm:linClrLst>
-    <dgm:effectClrLst/>
-    <dgm:txLinClrLst/>
-    <dgm:txFillClrLst meth="repeat">
-      <a:schemeClr val="dk1"/>
-    </dgm:txFillClrLst>
-    <dgm:txEffectClrLst/>
-  </dgm:styleLbl>
-  <dgm:styleLbl name="alignAcc1">
-    <dgm:fillClrLst meth="repeat">
-      <a:schemeClr val="lt1">
-        <a:alpha val="90000"/>
-      </a:schemeClr>
-    </dgm:fillClrLst>
-    <dgm:linClrLst meth="repeat">
-      <a:schemeClr val="accent1"/>
-    </dgm:linClrLst>
-    <dgm:effectClrLst/>
-    <dgm:txLinClrLst/>
-    <dgm:txFillClrLst meth="repeat">
-      <a:schemeClr val="dk1"/>
-    </dgm:txFillClrLst>
-    <dgm:txEffectClrLst/>
-  </dgm:styleLbl>
-  <dgm:styleLbl name="trAlignAcc1">
-    <dgm:fillClrLst meth="repeat">
-      <a:schemeClr val="lt1">
-        <a:alpha val="40000"/>
-      </a:schemeClr>
-    </dgm:fillClrLst>
-    <dgm:linClrLst meth="repeat">
-      <a:schemeClr val="accent1"/>
-    </dgm:linClrLst>
-    <dgm:effectClrLst/>
-    <dgm:txLinClrLst/>
-    <dgm:txFillClrLst meth="repeat">
-      <a:schemeClr val="dk1"/>
-    </dgm:txFillClrLst>
-    <dgm:txEffectClrLst/>
-  </dgm:styleLbl>
-  <dgm:styleLbl name="bgAcc1">
-    <dgm:fillClrLst meth="repeat">
-      <a:schemeClr val="lt1">
-        <a:alpha val="90000"/>
-      </a:schemeClr>
-    </dgm:fillClrLst>
-    <dgm:linClrLst meth="repeat">
-      <a:schemeClr val="accent1"/>
-    </dgm:linClrLst>
-    <dgm:effectClrLst/>
-    <dgm:txLinClrLst/>
-    <dgm:txFillClrLst meth="repeat">
-      <a:schemeClr val="dk1"/>
-    </dgm:txFillClrLst>
-    <dgm:txEffectClrLst/>
-  </dgm:styleLbl>
-  <dgm:styleLbl name="solidFgAcc1">
-    <dgm:fillClrLst meth="repeat">
-      <a:schemeClr val="lt1"/>
-    </dgm:fillClrLst>
-    <dgm:linClrLst meth="repeat">
-      <a:schemeClr val="accent1"/>
-    </dgm:linClrLst>
-    <dgm:effectClrLst/>
-    <dgm:txLinClrLst/>
-    <dgm:txFillClrLst meth="repeat">
-      <a:schemeClr val="dk1"/>
-    </dgm:txFillClrLst>
-    <dgm:txEffectClrLst/>
-  </dgm:styleLbl>
-  <dgm:styleLbl name="solidAlignAcc1">
-    <dgm:fillClrLst meth="repeat">
-      <a:schemeClr val="lt1"/>
-    </dgm:fillClrLst>
-    <dgm:linClrLst meth="repeat">
-      <a:schemeClr val="accent1"/>
-    </dgm:linClrLst>
-    <dgm:effectClrLst/>
-    <dgm:txLinClrLst/>
-    <dgm:txFillClrLst meth="repeat">
-      <a:schemeClr val="dk1"/>
-    </dgm:txFillClrLst>
-    <dgm:txEffectClrLst/>
-  </dgm:styleLbl>
-  <dgm:styleLbl name="solidBgAcc1">
-    <dgm:fillClrLst meth="repeat">
-      <a:schemeClr val="lt1"/>
-    </dgm:fillClrLst>
-    <dgm:linClrLst meth="repeat">
-      <a:schemeClr val="accent1"/>
-    </dgm:linClrLst>
-    <dgm:effectClrLst/>
-    <dgm:txLinClrLst/>
-    <dgm:txFillClrLst meth="repeat">
-      <a:schemeClr val="dk1"/>
-    </dgm:txFillClrLst>
-    <dgm:txEffectClrLst/>
-  </dgm:styleLbl>
-  <dgm:styleLbl name="fgAccFollowNode1">
-    <dgm:fillClrLst meth="repeat">
-      <a:schemeClr val="accent1">
-        <a:alpha val="90000"/>
-        <a:tint val="40000"/>
-      </a:schemeClr>
-    </dgm:fillClrLst>
-    <dgm:linClrLst meth="repeat">
-      <a:schemeClr val="accent1">
-        <a:alpha val="90000"/>
-        <a:tint val="40000"/>
-      </a:schemeClr>
-    </dgm:linClrLst>
-    <dgm:effectClrLst/>
-    <dgm:txLinClrLst/>
-    <dgm:txFillClrLst meth="repeat">
-      <a:schemeClr val="dk1"/>
-    </dgm:txFillClrLst>
-    <dgm:txEffectClrLst/>
-  </dgm:styleLbl>
-  <dgm:styleLbl name="alignAccFollowNode1">
-    <dgm:fillClrLst meth="repeat">
-      <a:schemeClr val="accent1">
-        <a:alpha val="90000"/>
-        <a:tint val="40000"/>
-      </a:schemeClr>
-    </dgm:fillClrLst>
-    <dgm:linClrLst meth="repeat">
-      <a:schemeClr val="accent1">
-        <a:alpha val="90000"/>
-        <a:tint val="40000"/>
-      </a:schemeClr>
-    </dgm:linClrLst>
-    <dgm:effectClrLst/>
-    <dgm:txLinClrLst/>
-    <dgm:txFillClrLst meth="repeat">
-      <a:schemeClr val="dk1"/>
-    </dgm:txFillClrLst>
-    <dgm:txEffectClrLst/>
-  </dgm:styleLbl>
-  <dgm:styleLbl name="bgAccFollowNode1">
-    <dgm:fillClrLst meth="repeat">
-      <a:schemeClr val="accent1">
-        <a:alpha val="90000"/>
-        <a:tint val="40000"/>
-      </a:schemeClr>
-    </dgm:fillClrLst>
-    <dgm:linClrLst meth="repeat">
-      <a:schemeClr val="accent1">
-        <a:alpha val="90000"/>
-        <a:tint val="40000"/>
-      </a:schemeClr>
-    </dgm:linClrLst>
-    <dgm:effectClrLst/>
-    <dgm:txLinClrLst/>
-    <dgm:txFillClrLst meth="repeat">
-      <a:schemeClr val="dk1"/>
-    </dgm:txFillClrLst>
-    <dgm:txEffectClrLst/>
-  </dgm:styleLbl>
-  <dgm:styleLbl name="fgAcc0">
-    <dgm:fillClrLst meth="repeat">
-      <a:schemeClr val="lt1">
-        <a:alpha val="90000"/>
-      </a:schemeClr>
-    </dgm:fillClrLst>
-    <dgm:linClrLst meth="repeat">
-      <a:schemeClr val="accent1"/>
-    </dgm:linClrLst>
-    <dgm:effectClrLst/>
-    <dgm:txLinClrLst/>
-    <dgm:txFillClrLst meth="repeat">
-      <a:schemeClr val="dk1"/>
-    </dgm:txFillClrLst>
-    <dgm:txEffectClrLst/>
-  </dgm:styleLbl>
-  <dgm:styleLbl name="fgAcc2">
-    <dgm:fillClrLst meth="repeat">
-      <a:schemeClr val="lt1">
-        <a:alpha val="90000"/>
-      </a:schemeClr>
-    </dgm:fillClrLst>
-    <dgm:linClrLst meth="repeat">
-      <a:schemeClr val="accent1"/>
-    </dgm:linClrLst>
-    <dgm:effectClrLst/>
-    <dgm:txLinClrLst/>
-    <dgm:txFillClrLst meth="repeat">
-      <a:schemeClr val="dk1"/>
-    </dgm:txFillClrLst>
-    <dgm:txEffectClrLst/>
-  </dgm:styleLbl>
-  <dgm:styleLbl name="fgAcc3">
-    <dgm:fillClrLst meth="repeat">
-      <a:schemeClr val="lt1">
-        <a:alpha val="90000"/>
-      </a:schemeClr>
-    </dgm:fillClrLst>
-    <dgm:linClrLst meth="repeat">
-      <a:schemeClr val="accent1"/>
-    </dgm:linClrLst>
-    <dgm:effectClrLst/>
-    <dgm:txLinClrLst/>
-    <dgm:txFillClrLst meth="repeat">
-      <a:schemeClr val="dk1"/>
-    </dgm:txFillClrLst>
-    <dgm:txEffectClrLst/>
-  </dgm:styleLbl>
-  <dgm:styleLbl name="fgAcc4">
-    <dgm:fillClrLst meth="repeat">
-      <a:schemeClr val="lt1">
-        <a:alpha val="90000"/>
-      </a:schemeClr>
-    </dgm:fillClrLst>
-    <dgm:linClrLst meth="repeat">
-      <a:schemeClr val="accent1"/>
-    </dgm:linClrLst>
-    <dgm:effectClrLst/>
-    <dgm:txLinClrLst/>
-    <dgm:txFillClrLst meth="repeat">
-      <a:schemeClr val="dk1"/>
-    </dgm:txFillClrLst>
-    <dgm:txEffectClrLst/>
-  </dgm:styleLbl>
-  <dgm:styleLbl name="bgShp">
-    <dgm:fillClrLst meth="repeat">
-      <a:schemeClr val="accent1">
-        <a:tint val="40000"/>
-      </a:schemeClr>
-    </dgm:fillClrLst>
-    <dgm:linClrLst meth="repeat">
-      <a:schemeClr val="accent1"/>
-    </dgm:linClrLst>
-    <dgm:effectClrLst/>
-    <dgm:txLinClrLst/>
-    <dgm:txFillClrLst meth="repeat">
-      <a:schemeClr val="dk1"/>
-    </dgm:txFillClrLst>
-    <dgm:txEffectClrLst/>
-  </dgm:styleLbl>
-  <dgm:styleLbl name="dkBgShp">
-    <dgm:fillClrLst meth="repeat">
-      <a:schemeClr val="accent1">
-        <a:shade val="80000"/>
-      </a:schemeClr>
-    </dgm:fillClrLst>
-    <dgm:linClrLst meth="repeat">
-      <a:schemeClr val="accent1"/>
-    </dgm:linClrLst>
-    <dgm:effectClrLst/>
-    <dgm:txLinClrLst/>
-    <dgm:txFillClrLst meth="repeat">
-      <a:schemeClr val="lt1"/>
-    </dgm:txFillClrLst>
-    <dgm:txEffectClrLst/>
-  </dgm:styleLbl>
-  <dgm:styleLbl name="trBgShp">
-    <dgm:fillClrLst meth="repeat">
-      <a:schemeClr val="accent1">
-        <a:tint val="50000"/>
-        <a:alpha val="40000"/>
-      </a:schemeClr>
-    </dgm:fillClrLst>
-    <dgm:linClrLst meth="repeat">
-      <a:schemeClr val="accent1"/>
-    </dgm:linClrLst>
-    <dgm:effectClrLst/>
-    <dgm:txLinClrLst/>
-    <dgm:txFillClrLst meth="repeat">
-      <a:schemeClr val="lt1"/>
-    </dgm:txFillClrLst>
-    <dgm:txEffectClrLst/>
-  </dgm:styleLbl>
-  <dgm:styleLbl name="fgShp">
-    <dgm:fillClrLst meth="repeat">
-      <a:schemeClr val="accent1">
         <a:tint val="60000"/>
       </a:schemeClr>
     </dgm:fillClrLst>
@@ -4862,7 +4115,7 @@
                 <a:schemeClr val="tx1"/>
               </a:solidFill>
             </a:rPr>
-            <a:t>Importance of Reviews &amp; Reviews Analysis</a:t>
+            <a:t>Importance of Reviews &amp; Review Analysis</a:t>
           </a:r>
         </a:p>
       </dgm:t>
@@ -5246,7 +4499,7 @@
           </a:pPr>
           <a:r>
             <a:rPr lang="en-US" sz="2000" dirty="0"/>
-            <a:t>90% of the Amazon customers check the reviews before purchasing the product </a:t>
+            <a:t>90% of the Amazon customers check the reviews before purchasing the products </a:t>
           </a:r>
         </a:p>
       </dgm:t>
@@ -5996,7 +5249,7 @@
           </a:r>
           <a:r>
             <a:rPr lang="en-US" sz="2000" dirty="0"/>
-            <a:t> To study whether product review is becoming better or worse during the life cycle of the products</a:t>
+            <a:t> To study whether product review is becoming better or worse during the life cycle of the product</a:t>
           </a:r>
         </a:p>
       </dgm:t>
@@ -6109,7 +5362,7 @@
         <a:p>
           <a:r>
             <a:rPr lang="en-US" sz="2000" dirty="0"/>
-            <a:t>- Sales Vs Count of reviews Trend</a:t>
+            <a:t>- Analyze how Sentiment Score interplays with Sales</a:t>
           </a:r>
         </a:p>
       </dgm:t>
@@ -7727,469 +6980,6 @@
 </dgm:dataModel>
 </file>
 
-<file path=ppt/diagrams/data6.xml><?xml version="1.0" encoding="utf-8"?>
-<dgm:dataModel xmlns:dgm="http://schemas.openxmlformats.org/drawingml/2006/diagram" xmlns:a="http://schemas.openxmlformats.org/drawingml/2006/main">
-  <dgm:ptLst>
-    <dgm:pt modelId="{80A8D208-6598-4BB0-8C0E-F72E9F7F171B}" type="doc">
-      <dgm:prSet loTypeId="urn:microsoft.com/office/officeart/2005/8/layout/vList5" loCatId="list" qsTypeId="urn:microsoft.com/office/officeart/2005/8/quickstyle/simple2" qsCatId="simple" csTypeId="urn:microsoft.com/office/officeart/2005/8/colors/accent1_2" csCatId="accent1" phldr="1"/>
-      <dgm:spPr/>
-      <dgm:t>
-        <a:bodyPr/>
-        <a:lstStyle/>
-        <a:p>
-          <a:endParaRPr lang="en-US"/>
-        </a:p>
-      </dgm:t>
-    </dgm:pt>
-    <dgm:pt modelId="{6F272784-4828-4867-8DD4-8111C3CC0915}">
-      <dgm:prSet phldrT="[Text]" custT="1"/>
-      <dgm:spPr/>
-      <dgm:t>
-        <a:bodyPr/>
-        <a:lstStyle/>
-        <a:p>
-          <a:r>
-            <a:rPr lang="en-US" sz="2800" b="1" dirty="0"/>
-            <a:t>Text Blob</a:t>
-          </a:r>
-        </a:p>
-      </dgm:t>
-    </dgm:pt>
-    <dgm:pt modelId="{C517D937-9A3C-4CE9-8182-F76A6E42245C}" type="parTrans" cxnId="{8CE9B357-E68D-409F-80DC-B210D42A93C1}">
-      <dgm:prSet/>
-      <dgm:spPr/>
-      <dgm:t>
-        <a:bodyPr/>
-        <a:lstStyle/>
-        <a:p>
-          <a:endParaRPr lang="en-US"/>
-        </a:p>
-      </dgm:t>
-    </dgm:pt>
-    <dgm:pt modelId="{E6C3F6ED-636A-4DBE-84DD-9CEA47A7CDE0}" type="sibTrans" cxnId="{8CE9B357-E68D-409F-80DC-B210D42A93C1}">
-      <dgm:prSet/>
-      <dgm:spPr/>
-      <dgm:t>
-        <a:bodyPr/>
-        <a:lstStyle/>
-        <a:p>
-          <a:endParaRPr lang="en-US"/>
-        </a:p>
-      </dgm:t>
-    </dgm:pt>
-    <dgm:pt modelId="{887A3F69-5B2F-43AA-9339-DE2AAD4B8255}">
-      <dgm:prSet phldrT="[Text]" custT="1"/>
-      <dgm:spPr/>
-      <dgm:t>
-        <a:bodyPr/>
-        <a:lstStyle/>
-        <a:p>
-          <a:r>
-            <a:rPr lang="en-US" sz="2800" b="1" dirty="0"/>
-            <a:t>Lexicon</a:t>
-          </a:r>
-        </a:p>
-      </dgm:t>
-    </dgm:pt>
-    <dgm:pt modelId="{E6112A44-B263-4A09-86D6-5065F9746DAE}" type="parTrans" cxnId="{1754596D-6718-4511-9428-36D386552AD9}">
-      <dgm:prSet/>
-      <dgm:spPr/>
-      <dgm:t>
-        <a:bodyPr/>
-        <a:lstStyle/>
-        <a:p>
-          <a:endParaRPr lang="en-US"/>
-        </a:p>
-      </dgm:t>
-    </dgm:pt>
-    <dgm:pt modelId="{A1D2AFBC-08CE-426C-939C-1366BD5BC8B4}" type="sibTrans" cxnId="{1754596D-6718-4511-9428-36D386552AD9}">
-      <dgm:prSet/>
-      <dgm:spPr/>
-      <dgm:t>
-        <a:bodyPr/>
-        <a:lstStyle/>
-        <a:p>
-          <a:endParaRPr lang="en-US"/>
-        </a:p>
-      </dgm:t>
-    </dgm:pt>
-    <dgm:pt modelId="{29515AB5-9E5F-4D4B-84FC-D538E9BCFC88}">
-      <dgm:prSet phldrT="[Text]" custT="1"/>
-      <dgm:spPr/>
-      <dgm:t>
-        <a:bodyPr/>
-        <a:lstStyle/>
-        <a:p>
-          <a:r>
-            <a:rPr lang="en-US" sz="2400" b="0" dirty="0"/>
-            <a:t>General purpose lexicon with TFIDF </a:t>
-          </a:r>
-        </a:p>
-      </dgm:t>
-    </dgm:pt>
-    <dgm:pt modelId="{654D5E35-30C6-470E-B516-5FCCB5785779}" type="parTrans" cxnId="{6882029C-20EC-42EA-BA41-514A77ABC66E}">
-      <dgm:prSet/>
-      <dgm:spPr/>
-      <dgm:t>
-        <a:bodyPr/>
-        <a:lstStyle/>
-        <a:p>
-          <a:endParaRPr lang="en-US"/>
-        </a:p>
-      </dgm:t>
-    </dgm:pt>
-    <dgm:pt modelId="{A94A6EFB-C81F-4E5A-B3B1-B60595862CC5}" type="sibTrans" cxnId="{6882029C-20EC-42EA-BA41-514A77ABC66E}">
-      <dgm:prSet/>
-      <dgm:spPr/>
-      <dgm:t>
-        <a:bodyPr/>
-        <a:lstStyle/>
-        <a:p>
-          <a:endParaRPr lang="en-US"/>
-        </a:p>
-      </dgm:t>
-    </dgm:pt>
-    <dgm:pt modelId="{B479E923-A1D1-4E82-BF75-9E264BF9AFB6}">
-      <dgm:prSet phldrT="[Text]" custT="1"/>
-      <dgm:spPr/>
-      <dgm:t>
-        <a:bodyPr/>
-        <a:lstStyle/>
-        <a:p>
-          <a:r>
-            <a:rPr lang="en-US" sz="2800" b="1" dirty="0"/>
-            <a:t>Vader</a:t>
-          </a:r>
-        </a:p>
-      </dgm:t>
-    </dgm:pt>
-    <dgm:pt modelId="{855AA747-6689-43C2-8B30-F858720D2878}" type="parTrans" cxnId="{C3C4B6B8-BF6D-4864-AE18-5B2580E33FD9}">
-      <dgm:prSet/>
-      <dgm:spPr/>
-      <dgm:t>
-        <a:bodyPr/>
-        <a:lstStyle/>
-        <a:p>
-          <a:endParaRPr lang="en-US"/>
-        </a:p>
-      </dgm:t>
-    </dgm:pt>
-    <dgm:pt modelId="{6F38D119-9C38-404E-89DC-0049FC02C521}" type="sibTrans" cxnId="{C3C4B6B8-BF6D-4864-AE18-5B2580E33FD9}">
-      <dgm:prSet/>
-      <dgm:spPr/>
-      <dgm:t>
-        <a:bodyPr/>
-        <a:lstStyle/>
-        <a:p>
-          <a:endParaRPr lang="en-US"/>
-        </a:p>
-      </dgm:t>
-    </dgm:pt>
-    <dgm:pt modelId="{B54A3AB4-443A-4FFB-8EE2-EF5504A2F677}">
-      <dgm:prSet phldrT="[Text]" custT="1"/>
-      <dgm:spPr/>
-      <dgm:t>
-        <a:bodyPr/>
-        <a:lstStyle/>
-        <a:p>
-          <a:r>
-            <a:rPr lang="en-US" sz="2400" dirty="0"/>
-            <a:t>Rule based</a:t>
-          </a:r>
-        </a:p>
-      </dgm:t>
-    </dgm:pt>
-    <dgm:pt modelId="{EB884860-EC45-43BB-80B7-B171E3407B03}" type="parTrans" cxnId="{B784F3F8-AFF7-4E85-A995-6D2EC480491D}">
-      <dgm:prSet/>
-      <dgm:spPr/>
-      <dgm:t>
-        <a:bodyPr/>
-        <a:lstStyle/>
-        <a:p>
-          <a:endParaRPr lang="en-US"/>
-        </a:p>
-      </dgm:t>
-    </dgm:pt>
-    <dgm:pt modelId="{2E6D8B50-BA88-4DE9-88BE-91A79295970C}" type="sibTrans" cxnId="{B784F3F8-AFF7-4E85-A995-6D2EC480491D}">
-      <dgm:prSet/>
-      <dgm:spPr/>
-      <dgm:t>
-        <a:bodyPr/>
-        <a:lstStyle/>
-        <a:p>
-          <a:endParaRPr lang="en-US"/>
-        </a:p>
-      </dgm:t>
-    </dgm:pt>
-    <dgm:pt modelId="{ECB869F5-6784-4096-8FDA-0CD49637EBFE}">
-      <dgm:prSet phldrT="[Text]" custT="1"/>
-      <dgm:spPr/>
-      <dgm:t>
-        <a:bodyPr/>
-        <a:lstStyle/>
-        <a:p>
-          <a:r>
-            <a:rPr lang="en-US" sz="2400" b="0" dirty="0"/>
-            <a:t>Trained based</a:t>
-          </a:r>
-        </a:p>
-      </dgm:t>
-    </dgm:pt>
-    <dgm:pt modelId="{CF33DB6E-DC2A-47A7-A462-0228392BA62D}" type="sibTrans" cxnId="{DEE4BA18-0898-4817-BDC0-502EEDABC1CA}">
-      <dgm:prSet/>
-      <dgm:spPr/>
-      <dgm:t>
-        <a:bodyPr/>
-        <a:lstStyle/>
-        <a:p>
-          <a:endParaRPr lang="en-US"/>
-        </a:p>
-      </dgm:t>
-    </dgm:pt>
-    <dgm:pt modelId="{94146E66-F112-433A-96D0-FB1876238968}" type="parTrans" cxnId="{DEE4BA18-0898-4817-BDC0-502EEDABC1CA}">
-      <dgm:prSet/>
-      <dgm:spPr/>
-      <dgm:t>
-        <a:bodyPr/>
-        <a:lstStyle/>
-        <a:p>
-          <a:endParaRPr lang="en-US"/>
-        </a:p>
-      </dgm:t>
-    </dgm:pt>
-    <dgm:pt modelId="{AED793FF-86BD-4498-B715-CE27208092D2}">
-      <dgm:prSet phldrT="[Text]" custT="1"/>
-      <dgm:spPr/>
-      <dgm:t>
-        <a:bodyPr/>
-        <a:lstStyle/>
-        <a:p>
-          <a:r>
-            <a:rPr lang="en-US" sz="2400" dirty="0"/>
-            <a:t>Accuracy: 79.96%</a:t>
-          </a:r>
-          <a:endParaRPr lang="en-US" sz="2800" dirty="0"/>
-        </a:p>
-      </dgm:t>
-    </dgm:pt>
-    <dgm:pt modelId="{9AE82A64-43E8-4132-89AA-1A35A360D407}" type="parTrans" cxnId="{806A2664-FA61-44E0-BCE5-A8E5F3CE16A5}">
-      <dgm:prSet/>
-      <dgm:spPr/>
-      <dgm:t>
-        <a:bodyPr/>
-        <a:lstStyle/>
-        <a:p>
-          <a:endParaRPr lang="en-US"/>
-        </a:p>
-      </dgm:t>
-    </dgm:pt>
-    <dgm:pt modelId="{5DB605AC-9D58-4F8D-88AE-5C60B4EFCCD2}" type="sibTrans" cxnId="{806A2664-FA61-44E0-BCE5-A8E5F3CE16A5}">
-      <dgm:prSet/>
-      <dgm:spPr/>
-      <dgm:t>
-        <a:bodyPr/>
-        <a:lstStyle/>
-        <a:p>
-          <a:endParaRPr lang="en-US"/>
-        </a:p>
-      </dgm:t>
-    </dgm:pt>
-    <dgm:pt modelId="{C7CED64D-3337-4CC1-84D7-40F16DF31AB8}">
-      <dgm:prSet phldrT="[Text]" custT="1"/>
-      <dgm:spPr/>
-      <dgm:t>
-        <a:bodyPr/>
-        <a:lstStyle/>
-        <a:p>
-          <a:r>
-            <a:rPr lang="en-US" sz="2400" b="0" dirty="0"/>
-            <a:t>Accuracy: 57.69%</a:t>
-          </a:r>
-        </a:p>
-      </dgm:t>
-    </dgm:pt>
-    <dgm:pt modelId="{195887B9-7528-4BDF-AF64-99B08E049394}" type="parTrans" cxnId="{F25BE724-2B85-4417-B52C-EB6F2F1E1B5A}">
-      <dgm:prSet/>
-      <dgm:spPr/>
-      <dgm:t>
-        <a:bodyPr/>
-        <a:lstStyle/>
-        <a:p>
-          <a:endParaRPr lang="en-US"/>
-        </a:p>
-      </dgm:t>
-    </dgm:pt>
-    <dgm:pt modelId="{5C22380A-F7C8-4119-BF42-DBE3863A51DF}" type="sibTrans" cxnId="{F25BE724-2B85-4417-B52C-EB6F2F1E1B5A}">
-      <dgm:prSet/>
-      <dgm:spPr/>
-      <dgm:t>
-        <a:bodyPr/>
-        <a:lstStyle/>
-        <a:p>
-          <a:endParaRPr lang="en-US"/>
-        </a:p>
-      </dgm:t>
-    </dgm:pt>
-    <dgm:pt modelId="{C22FFF29-F027-41A9-9C98-29402E3EDB69}">
-      <dgm:prSet phldrT="[Text]" custT="1"/>
-      <dgm:spPr/>
-      <dgm:t>
-        <a:bodyPr/>
-        <a:lstStyle/>
-        <a:p>
-          <a:r>
-            <a:rPr lang="en-US" sz="2400" b="0" dirty="0"/>
-            <a:t>Accuracy: 67.50%</a:t>
-          </a:r>
-        </a:p>
-      </dgm:t>
-    </dgm:pt>
-    <dgm:pt modelId="{C09C60AC-4924-4A03-A3DA-E5254DDCB36C}" type="parTrans" cxnId="{E1A29F54-BEA3-470E-86E6-131DF13B5BE9}">
-      <dgm:prSet/>
-      <dgm:spPr/>
-      <dgm:t>
-        <a:bodyPr/>
-        <a:lstStyle/>
-        <a:p>
-          <a:endParaRPr lang="en-US"/>
-        </a:p>
-      </dgm:t>
-    </dgm:pt>
-    <dgm:pt modelId="{4D7CA996-0218-476B-86CC-3973542C9170}" type="sibTrans" cxnId="{E1A29F54-BEA3-470E-86E6-131DF13B5BE9}">
-      <dgm:prSet/>
-      <dgm:spPr/>
-      <dgm:t>
-        <a:bodyPr/>
-        <a:lstStyle/>
-        <a:p>
-          <a:endParaRPr lang="en-US"/>
-        </a:p>
-      </dgm:t>
-    </dgm:pt>
-    <dgm:pt modelId="{D9C052DF-C9B1-419B-B6E1-567EBDAAAF46}" type="pres">
-      <dgm:prSet presAssocID="{80A8D208-6598-4BB0-8C0E-F72E9F7F171B}" presName="Name0" presStyleCnt="0">
-        <dgm:presLayoutVars>
-          <dgm:dir/>
-          <dgm:animLvl val="lvl"/>
-          <dgm:resizeHandles val="exact"/>
-        </dgm:presLayoutVars>
-      </dgm:prSet>
-      <dgm:spPr/>
-    </dgm:pt>
-    <dgm:pt modelId="{C20D22CA-B5C0-4927-A04A-12EC12E47A4F}" type="pres">
-      <dgm:prSet presAssocID="{6F272784-4828-4867-8DD4-8111C3CC0915}" presName="linNode" presStyleCnt="0"/>
-      <dgm:spPr/>
-    </dgm:pt>
-    <dgm:pt modelId="{1946386A-B9ED-419F-BB76-ADE9C95ACA8B}" type="pres">
-      <dgm:prSet presAssocID="{6F272784-4828-4867-8DD4-8111C3CC0915}" presName="parentText" presStyleLbl="node1" presStyleIdx="0" presStyleCnt="3" custLinFactNeighborX="-14216" custLinFactNeighborY="-7846">
-        <dgm:presLayoutVars>
-          <dgm:chMax val="1"/>
-          <dgm:bulletEnabled val="1"/>
-        </dgm:presLayoutVars>
-      </dgm:prSet>
-      <dgm:spPr/>
-    </dgm:pt>
-    <dgm:pt modelId="{5F8FDA15-CABF-41CC-969A-37F0A83F2845}" type="pres">
-      <dgm:prSet presAssocID="{6F272784-4828-4867-8DD4-8111C3CC0915}" presName="descendantText" presStyleLbl="alignAccFollowNode1" presStyleIdx="0" presStyleCnt="3">
-        <dgm:presLayoutVars>
-          <dgm:bulletEnabled val="1"/>
-        </dgm:presLayoutVars>
-      </dgm:prSet>
-      <dgm:spPr/>
-    </dgm:pt>
-    <dgm:pt modelId="{E63D8135-306F-416E-A110-306F4BBA4A4A}" type="pres">
-      <dgm:prSet presAssocID="{E6C3F6ED-636A-4DBE-84DD-9CEA47A7CDE0}" presName="sp" presStyleCnt="0"/>
-      <dgm:spPr/>
-    </dgm:pt>
-    <dgm:pt modelId="{1A8415CA-A2C3-4E45-B9F0-C1D089E8094C}" type="pres">
-      <dgm:prSet presAssocID="{887A3F69-5B2F-43AA-9339-DE2AAD4B8255}" presName="linNode" presStyleCnt="0"/>
-      <dgm:spPr/>
-    </dgm:pt>
-    <dgm:pt modelId="{3E2F2E4A-9DF4-472A-AC31-84D882070AE1}" type="pres">
-      <dgm:prSet presAssocID="{887A3F69-5B2F-43AA-9339-DE2AAD4B8255}" presName="parentText" presStyleLbl="node1" presStyleIdx="1" presStyleCnt="3">
-        <dgm:presLayoutVars>
-          <dgm:chMax val="1"/>
-          <dgm:bulletEnabled val="1"/>
-        </dgm:presLayoutVars>
-      </dgm:prSet>
-      <dgm:spPr/>
-    </dgm:pt>
-    <dgm:pt modelId="{2EB02FE2-7DD3-4083-ABDF-CBA05C8C96DD}" type="pres">
-      <dgm:prSet presAssocID="{887A3F69-5B2F-43AA-9339-DE2AAD4B8255}" presName="descendantText" presStyleLbl="alignAccFollowNode1" presStyleIdx="1" presStyleCnt="3">
-        <dgm:presLayoutVars>
-          <dgm:bulletEnabled val="1"/>
-        </dgm:presLayoutVars>
-      </dgm:prSet>
-      <dgm:spPr/>
-    </dgm:pt>
-    <dgm:pt modelId="{126ADB67-7295-43B2-9375-46EE5630ADCE}" type="pres">
-      <dgm:prSet presAssocID="{A1D2AFBC-08CE-426C-939C-1366BD5BC8B4}" presName="sp" presStyleCnt="0"/>
-      <dgm:spPr/>
-    </dgm:pt>
-    <dgm:pt modelId="{3ADC2BB8-9DA7-4DAF-AA2B-FA40D0A3CCFF}" type="pres">
-      <dgm:prSet presAssocID="{B479E923-A1D1-4E82-BF75-9E264BF9AFB6}" presName="linNode" presStyleCnt="0"/>
-      <dgm:spPr/>
-    </dgm:pt>
-    <dgm:pt modelId="{54A6F0F9-AA2E-4C52-80FC-75F9DAD44718}" type="pres">
-      <dgm:prSet presAssocID="{B479E923-A1D1-4E82-BF75-9E264BF9AFB6}" presName="parentText" presStyleLbl="node1" presStyleIdx="2" presStyleCnt="3">
-        <dgm:presLayoutVars>
-          <dgm:chMax val="1"/>
-          <dgm:bulletEnabled val="1"/>
-        </dgm:presLayoutVars>
-      </dgm:prSet>
-      <dgm:spPr/>
-    </dgm:pt>
-    <dgm:pt modelId="{B7C2B740-5787-48B3-A154-2E9EE57FA3C4}" type="pres">
-      <dgm:prSet presAssocID="{B479E923-A1D1-4E82-BF75-9E264BF9AFB6}" presName="descendantText" presStyleLbl="alignAccFollowNode1" presStyleIdx="2" presStyleCnt="3">
-        <dgm:presLayoutVars>
-          <dgm:bulletEnabled val="1"/>
-        </dgm:presLayoutVars>
-      </dgm:prSet>
-      <dgm:spPr/>
-    </dgm:pt>
-  </dgm:ptLst>
-  <dgm:cxnLst>
-    <dgm:cxn modelId="{DEE4BA18-0898-4817-BDC0-502EEDABC1CA}" srcId="{6F272784-4828-4867-8DD4-8111C3CC0915}" destId="{ECB869F5-6784-4096-8FDA-0CD49637EBFE}" srcOrd="0" destOrd="0" parTransId="{94146E66-F112-433A-96D0-FB1876238968}" sibTransId="{CF33DB6E-DC2A-47A7-A462-0228392BA62D}"/>
-    <dgm:cxn modelId="{F25BE724-2B85-4417-B52C-EB6F2F1E1B5A}" srcId="{6F272784-4828-4867-8DD4-8111C3CC0915}" destId="{C7CED64D-3337-4CC1-84D7-40F16DF31AB8}" srcOrd="1" destOrd="0" parTransId="{195887B9-7528-4BDF-AF64-99B08E049394}" sibTransId="{5C22380A-F7C8-4119-BF42-DBE3863A51DF}"/>
-    <dgm:cxn modelId="{91CA5131-CC5B-4003-83A7-36E380306C4B}" type="presOf" srcId="{29515AB5-9E5F-4D4B-84FC-D538E9BCFC88}" destId="{2EB02FE2-7DD3-4083-ABDF-CBA05C8C96DD}" srcOrd="0" destOrd="0" presId="urn:microsoft.com/office/officeart/2005/8/layout/vList5"/>
-    <dgm:cxn modelId="{7E8AF95E-28FA-4768-B7C5-AC78176661C5}" type="presOf" srcId="{6F272784-4828-4867-8DD4-8111C3CC0915}" destId="{1946386A-B9ED-419F-BB76-ADE9C95ACA8B}" srcOrd="0" destOrd="0" presId="urn:microsoft.com/office/officeart/2005/8/layout/vList5"/>
-    <dgm:cxn modelId="{806A2664-FA61-44E0-BCE5-A8E5F3CE16A5}" srcId="{B479E923-A1D1-4E82-BF75-9E264BF9AFB6}" destId="{AED793FF-86BD-4498-B715-CE27208092D2}" srcOrd="1" destOrd="0" parTransId="{9AE82A64-43E8-4132-89AA-1A35A360D407}" sibTransId="{5DB605AC-9D58-4F8D-88AE-5C60B4EFCCD2}"/>
-    <dgm:cxn modelId="{A07DE466-6596-4318-B320-FDB57C2B76F9}" type="presOf" srcId="{C7CED64D-3337-4CC1-84D7-40F16DF31AB8}" destId="{5F8FDA15-CABF-41CC-969A-37F0A83F2845}" srcOrd="0" destOrd="1" presId="urn:microsoft.com/office/officeart/2005/8/layout/vList5"/>
-    <dgm:cxn modelId="{04311769-83D4-4C74-B4E8-9DCC9D1BD70E}" type="presOf" srcId="{80A8D208-6598-4BB0-8C0E-F72E9F7F171B}" destId="{D9C052DF-C9B1-419B-B6E1-567EBDAAAF46}" srcOrd="0" destOrd="0" presId="urn:microsoft.com/office/officeart/2005/8/layout/vList5"/>
-    <dgm:cxn modelId="{1754596D-6718-4511-9428-36D386552AD9}" srcId="{80A8D208-6598-4BB0-8C0E-F72E9F7F171B}" destId="{887A3F69-5B2F-43AA-9339-DE2AAD4B8255}" srcOrd="1" destOrd="0" parTransId="{E6112A44-B263-4A09-86D6-5065F9746DAE}" sibTransId="{A1D2AFBC-08CE-426C-939C-1366BD5BC8B4}"/>
-    <dgm:cxn modelId="{A2405751-B52F-4955-8224-2043F0C4C953}" type="presOf" srcId="{B54A3AB4-443A-4FFB-8EE2-EF5504A2F677}" destId="{B7C2B740-5787-48B3-A154-2E9EE57FA3C4}" srcOrd="0" destOrd="0" presId="urn:microsoft.com/office/officeart/2005/8/layout/vList5"/>
-    <dgm:cxn modelId="{E1A29F54-BEA3-470E-86E6-131DF13B5BE9}" srcId="{887A3F69-5B2F-43AA-9339-DE2AAD4B8255}" destId="{C22FFF29-F027-41A9-9C98-29402E3EDB69}" srcOrd="1" destOrd="0" parTransId="{C09C60AC-4924-4A03-A3DA-E5254DDCB36C}" sibTransId="{4D7CA996-0218-476B-86CC-3973542C9170}"/>
-    <dgm:cxn modelId="{8CE9B357-E68D-409F-80DC-B210D42A93C1}" srcId="{80A8D208-6598-4BB0-8C0E-F72E9F7F171B}" destId="{6F272784-4828-4867-8DD4-8111C3CC0915}" srcOrd="0" destOrd="0" parTransId="{C517D937-9A3C-4CE9-8182-F76A6E42245C}" sibTransId="{E6C3F6ED-636A-4DBE-84DD-9CEA47A7CDE0}"/>
-    <dgm:cxn modelId="{79EA1578-CE74-4935-AA43-491CA3A2C35E}" type="presOf" srcId="{AED793FF-86BD-4498-B715-CE27208092D2}" destId="{B7C2B740-5787-48B3-A154-2E9EE57FA3C4}" srcOrd="0" destOrd="1" presId="urn:microsoft.com/office/officeart/2005/8/layout/vList5"/>
-    <dgm:cxn modelId="{9F3D4D90-A95F-43E1-89AE-B9FBEE12AE0B}" type="presOf" srcId="{ECB869F5-6784-4096-8FDA-0CD49637EBFE}" destId="{5F8FDA15-CABF-41CC-969A-37F0A83F2845}" srcOrd="0" destOrd="0" presId="urn:microsoft.com/office/officeart/2005/8/layout/vList5"/>
-    <dgm:cxn modelId="{6882029C-20EC-42EA-BA41-514A77ABC66E}" srcId="{887A3F69-5B2F-43AA-9339-DE2AAD4B8255}" destId="{29515AB5-9E5F-4D4B-84FC-D538E9BCFC88}" srcOrd="0" destOrd="0" parTransId="{654D5E35-30C6-470E-B516-5FCCB5785779}" sibTransId="{A94A6EFB-C81F-4E5A-B3B1-B60595862CC5}"/>
-    <dgm:cxn modelId="{C3C4B6B8-BF6D-4864-AE18-5B2580E33FD9}" srcId="{80A8D208-6598-4BB0-8C0E-F72E9F7F171B}" destId="{B479E923-A1D1-4E82-BF75-9E264BF9AFB6}" srcOrd="2" destOrd="0" parTransId="{855AA747-6689-43C2-8B30-F858720D2878}" sibTransId="{6F38D119-9C38-404E-89DC-0049FC02C521}"/>
-    <dgm:cxn modelId="{E65FDBC7-1586-4D37-BEF2-B98471D2839B}" type="presOf" srcId="{B479E923-A1D1-4E82-BF75-9E264BF9AFB6}" destId="{54A6F0F9-AA2E-4C52-80FC-75F9DAD44718}" srcOrd="0" destOrd="0" presId="urn:microsoft.com/office/officeart/2005/8/layout/vList5"/>
-    <dgm:cxn modelId="{28DE28F7-179D-405B-BAEF-9D0AFF79ADFC}" type="presOf" srcId="{C22FFF29-F027-41A9-9C98-29402E3EDB69}" destId="{2EB02FE2-7DD3-4083-ABDF-CBA05C8C96DD}" srcOrd="0" destOrd="1" presId="urn:microsoft.com/office/officeart/2005/8/layout/vList5"/>
-    <dgm:cxn modelId="{B784F3F8-AFF7-4E85-A995-6D2EC480491D}" srcId="{B479E923-A1D1-4E82-BF75-9E264BF9AFB6}" destId="{B54A3AB4-443A-4FFB-8EE2-EF5504A2F677}" srcOrd="0" destOrd="0" parTransId="{EB884860-EC45-43BB-80B7-B171E3407B03}" sibTransId="{2E6D8B50-BA88-4DE9-88BE-91A79295970C}"/>
-    <dgm:cxn modelId="{C83C7EFF-62D8-4B21-BD55-204DFA8EF302}" type="presOf" srcId="{887A3F69-5B2F-43AA-9339-DE2AAD4B8255}" destId="{3E2F2E4A-9DF4-472A-AC31-84D882070AE1}" srcOrd="0" destOrd="0" presId="urn:microsoft.com/office/officeart/2005/8/layout/vList5"/>
-    <dgm:cxn modelId="{AC1A5A10-3AE5-4A49-AFB9-81723048A165}" type="presParOf" srcId="{D9C052DF-C9B1-419B-B6E1-567EBDAAAF46}" destId="{C20D22CA-B5C0-4927-A04A-12EC12E47A4F}" srcOrd="0" destOrd="0" presId="urn:microsoft.com/office/officeart/2005/8/layout/vList5"/>
-    <dgm:cxn modelId="{8AA0CE3B-B19C-41C8-B67D-A9A597B96251}" type="presParOf" srcId="{C20D22CA-B5C0-4927-A04A-12EC12E47A4F}" destId="{1946386A-B9ED-419F-BB76-ADE9C95ACA8B}" srcOrd="0" destOrd="0" presId="urn:microsoft.com/office/officeart/2005/8/layout/vList5"/>
-    <dgm:cxn modelId="{6D78E313-7722-40E6-BD97-A455BF2B1B54}" type="presParOf" srcId="{C20D22CA-B5C0-4927-A04A-12EC12E47A4F}" destId="{5F8FDA15-CABF-41CC-969A-37F0A83F2845}" srcOrd="1" destOrd="0" presId="urn:microsoft.com/office/officeart/2005/8/layout/vList5"/>
-    <dgm:cxn modelId="{B533C893-DBE5-4BBB-B1DB-391969F9EEB1}" type="presParOf" srcId="{D9C052DF-C9B1-419B-B6E1-567EBDAAAF46}" destId="{E63D8135-306F-416E-A110-306F4BBA4A4A}" srcOrd="1" destOrd="0" presId="urn:microsoft.com/office/officeart/2005/8/layout/vList5"/>
-    <dgm:cxn modelId="{B803B3A6-8A86-4352-8CBF-17EF11FD1B5A}" type="presParOf" srcId="{D9C052DF-C9B1-419B-B6E1-567EBDAAAF46}" destId="{1A8415CA-A2C3-4E45-B9F0-C1D089E8094C}" srcOrd="2" destOrd="0" presId="urn:microsoft.com/office/officeart/2005/8/layout/vList5"/>
-    <dgm:cxn modelId="{04ECA615-7C86-4E12-B2AD-E58E82FA19F9}" type="presParOf" srcId="{1A8415CA-A2C3-4E45-B9F0-C1D089E8094C}" destId="{3E2F2E4A-9DF4-472A-AC31-84D882070AE1}" srcOrd="0" destOrd="0" presId="urn:microsoft.com/office/officeart/2005/8/layout/vList5"/>
-    <dgm:cxn modelId="{B00232C5-0F40-4439-86D4-2C9B4F5C220C}" type="presParOf" srcId="{1A8415CA-A2C3-4E45-B9F0-C1D089E8094C}" destId="{2EB02FE2-7DD3-4083-ABDF-CBA05C8C96DD}" srcOrd="1" destOrd="0" presId="urn:microsoft.com/office/officeart/2005/8/layout/vList5"/>
-    <dgm:cxn modelId="{E74714EC-DBBC-4FD3-ACA2-8CE0D189405D}" type="presParOf" srcId="{D9C052DF-C9B1-419B-B6E1-567EBDAAAF46}" destId="{126ADB67-7295-43B2-9375-46EE5630ADCE}" srcOrd="3" destOrd="0" presId="urn:microsoft.com/office/officeart/2005/8/layout/vList5"/>
-    <dgm:cxn modelId="{2CC1C4C6-6794-4DC1-9214-B7C40A7AF8C0}" type="presParOf" srcId="{D9C052DF-C9B1-419B-B6E1-567EBDAAAF46}" destId="{3ADC2BB8-9DA7-4DAF-AA2B-FA40D0A3CCFF}" srcOrd="4" destOrd="0" presId="urn:microsoft.com/office/officeart/2005/8/layout/vList5"/>
-    <dgm:cxn modelId="{FE11A52D-7A9E-45DB-BD56-893A310D1147}" type="presParOf" srcId="{3ADC2BB8-9DA7-4DAF-AA2B-FA40D0A3CCFF}" destId="{54A6F0F9-AA2E-4C52-80FC-75F9DAD44718}" srcOrd="0" destOrd="0" presId="urn:microsoft.com/office/officeart/2005/8/layout/vList5"/>
-    <dgm:cxn modelId="{B9B1F67D-D5F9-449E-8722-E78238E7F823}" type="presParOf" srcId="{3ADC2BB8-9DA7-4DAF-AA2B-FA40D0A3CCFF}" destId="{B7C2B740-5787-48B3-A154-2E9EE57FA3C4}" srcOrd="1" destOrd="0" presId="urn:microsoft.com/office/officeart/2005/8/layout/vList5"/>
-  </dgm:cxnLst>
-  <dgm:bg/>
-  <dgm:whole/>
-  <dgm:extLst>
-    <a:ext uri="http://schemas.microsoft.com/office/drawing/2008/diagram">
-      <dsp:dataModelExt xmlns:dsp="http://schemas.microsoft.com/office/drawing/2008/diagram" relId="rId6" minVer="http://schemas.openxmlformats.org/drawingml/2006/diagram"/>
-    </a:ext>
-  </dgm:extLst>
-</dgm:dataModel>
-</file>
-
 <file path=ppt/diagrams/drawing1.xml><?xml version="1.0" encoding="utf-8"?>
 <dsp:drawing xmlns:dgm="http://schemas.openxmlformats.org/drawingml/2006/diagram" xmlns:dsp="http://schemas.microsoft.com/office/drawing/2008/diagram" xmlns:a="http://schemas.openxmlformats.org/drawingml/2006/main">
   <dsp:spTree>
@@ -8587,7 +7377,7 @@
                 <a:schemeClr val="tx1"/>
               </a:solidFill>
             </a:rPr>
-            <a:t>Importance of Reviews &amp; Reviews Analysis</a:t>
+            <a:t>Importance of Reviews &amp; Review Analysis</a:t>
           </a:r>
         </a:p>
       </dsp:txBody>
@@ -9203,8 +7993,8 @@
       </dsp:nvSpPr>
       <dsp:spPr>
         <a:xfrm rot="5400000">
-          <a:off x="5005281" y="-1946050"/>
-          <a:ext cx="1043516" cy="5201920"/>
+          <a:off x="5580802" y="-2213574"/>
+          <a:ext cx="1051952" cy="5747556"/>
         </a:xfrm>
         <a:prstGeom prst="round2SameRect">
           <a:avLst/>
@@ -9268,13 +8058,13 @@
           </a:pPr>
           <a:r>
             <a:rPr lang="en-US" sz="2000" kern="1200" dirty="0"/>
-            <a:t>90% of the Amazon customers check the reviews before purchasing the product </a:t>
+            <a:t>90% of the Amazon customers check the reviews before purchasing the products </a:t>
           </a:r>
         </a:p>
       </dsp:txBody>
       <dsp:txXfrm rot="-5400000">
-        <a:off x="2926079" y="184092"/>
-        <a:ext cx="5150980" cy="941636"/>
+        <a:off x="3233000" y="185580"/>
+        <a:ext cx="5696204" cy="949248"/>
       </dsp:txXfrm>
     </dsp:sp>
     <dsp:sp modelId="{4A9AAC3C-199E-4B4B-899D-BF9E7171803B}">
@@ -9284,8 +8074,8 @@
       </dsp:nvSpPr>
       <dsp:spPr>
         <a:xfrm>
-          <a:off x="0" y="2711"/>
-          <a:ext cx="2926080" cy="1304395"/>
+          <a:off x="0" y="2733"/>
+          <a:ext cx="3233000" cy="1314940"/>
         </a:xfrm>
         <a:prstGeom prst="roundRect">
           <a:avLst/>
@@ -9381,8 +8171,8 @@
         </a:p>
       </dsp:txBody>
       <dsp:txXfrm>
-        <a:off x="63675" y="66386"/>
-        <a:ext cx="2798730" cy="1177045"/>
+        <a:off x="64190" y="66923"/>
+        <a:ext cx="3104620" cy="1186560"/>
       </dsp:txXfrm>
     </dsp:sp>
     <dsp:sp modelId="{1494AC4C-F03A-4946-A69A-F4BF1C4AD824}">
@@ -9392,8 +8182,8 @@
       </dsp:nvSpPr>
       <dsp:spPr>
         <a:xfrm rot="5400000">
-          <a:off x="5005281" y="-576434"/>
-          <a:ext cx="1043516" cy="5201920"/>
+          <a:off x="5580802" y="-832886"/>
+          <a:ext cx="1051952" cy="5747556"/>
         </a:xfrm>
         <a:prstGeom prst="round2SameRect">
           <a:avLst/>
@@ -9466,8 +8256,8 @@
         </a:p>
       </dsp:txBody>
       <dsp:txXfrm rot="-5400000">
-        <a:off x="2926079" y="1553708"/>
-        <a:ext cx="5150980" cy="941636"/>
+        <a:off x="3233000" y="1566268"/>
+        <a:ext cx="5696204" cy="949248"/>
       </dsp:txXfrm>
     </dsp:sp>
     <dsp:sp modelId="{93D0690E-7BB3-4496-A80D-96F876DC0846}">
@@ -9477,8 +8267,8 @@
       </dsp:nvSpPr>
       <dsp:spPr>
         <a:xfrm>
-          <a:off x="0" y="1372327"/>
-          <a:ext cx="2926080" cy="1304395"/>
+          <a:off x="0" y="1383421"/>
+          <a:ext cx="3233000" cy="1314940"/>
         </a:xfrm>
         <a:prstGeom prst="roundRect">
           <a:avLst/>
@@ -9579,8 +8369,8 @@
         </a:p>
       </dsp:txBody>
       <dsp:txXfrm>
-        <a:off x="63675" y="1436002"/>
-        <a:ext cx="2798730" cy="1177045"/>
+        <a:off x="64190" y="1447611"/>
+        <a:ext cx="3104620" cy="1186560"/>
       </dsp:txXfrm>
     </dsp:sp>
     <dsp:sp modelId="{8AECE86C-954A-497D-A9EA-53B27261CC80}">
@@ -9590,8 +8380,8 @@
       </dsp:nvSpPr>
       <dsp:spPr>
         <a:xfrm rot="5400000">
-          <a:off x="5005281" y="793181"/>
-          <a:ext cx="1043516" cy="5201920"/>
+          <a:off x="5580802" y="547800"/>
+          <a:ext cx="1051952" cy="5747556"/>
         </a:xfrm>
         <a:prstGeom prst="round2SameRect">
           <a:avLst/>
@@ -9687,8 +8477,8 @@
         </a:p>
       </dsp:txBody>
       <dsp:txXfrm rot="-5400000">
-        <a:off x="2926079" y="2923323"/>
-        <a:ext cx="5150980" cy="941636"/>
+        <a:off x="3233000" y="2946954"/>
+        <a:ext cx="5696204" cy="949248"/>
       </dsp:txXfrm>
     </dsp:sp>
     <dsp:sp modelId="{91B3007E-362C-4897-8D94-3FB42C7F29C7}">
@@ -9698,8 +8488,8 @@
       </dsp:nvSpPr>
       <dsp:spPr>
         <a:xfrm>
-          <a:off x="0" y="2741943"/>
-          <a:ext cx="2926080" cy="1304395"/>
+          <a:off x="0" y="2764108"/>
+          <a:ext cx="3233000" cy="1314940"/>
         </a:xfrm>
         <a:prstGeom prst="roundRect">
           <a:avLst/>
@@ -9800,8 +8590,8 @@
         </a:p>
       </dsp:txBody>
       <dsp:txXfrm>
-        <a:off x="63675" y="2805618"/>
-        <a:ext cx="2798730" cy="1177045"/>
+        <a:off x="64190" y="2828298"/>
+        <a:ext cx="3104620" cy="1186560"/>
       </dsp:txXfrm>
     </dsp:sp>
     <dsp:sp modelId="{A5E29167-72BA-4D67-AF95-68EA95177D4C}">
@@ -9811,8 +8601,8 @@
       </dsp:nvSpPr>
       <dsp:spPr>
         <a:xfrm rot="5400000">
-          <a:off x="5005281" y="2162797"/>
-          <a:ext cx="1043516" cy="5201920"/>
+          <a:off x="5580802" y="1928487"/>
+          <a:ext cx="1051952" cy="5747556"/>
         </a:xfrm>
         <a:prstGeom prst="round2SameRect">
           <a:avLst/>
@@ -9969,8 +8759,8 @@
         </a:p>
       </dsp:txBody>
       <dsp:txXfrm rot="-5400000">
-        <a:off x="2926079" y="4292939"/>
-        <a:ext cx="5150980" cy="941636"/>
+        <a:off x="3233000" y="4327641"/>
+        <a:ext cx="5696204" cy="949248"/>
       </dsp:txXfrm>
     </dsp:sp>
     <dsp:sp modelId="{81991B22-8759-4504-99D7-1CB7A1C1CE13}">
@@ -9980,8 +8770,8 @@
       </dsp:nvSpPr>
       <dsp:spPr>
         <a:xfrm>
-          <a:off x="0" y="4111559"/>
-          <a:ext cx="2926080" cy="1304395"/>
+          <a:off x="0" y="4144795"/>
+          <a:ext cx="3233000" cy="1314940"/>
         </a:xfrm>
         <a:prstGeom prst="roundRect">
           <a:avLst/>
@@ -10082,8 +8872,8 @@
         </a:p>
       </dsp:txBody>
       <dsp:txXfrm>
-        <a:off x="63675" y="4175234"/>
-        <a:ext cx="2798730" cy="1177045"/>
+        <a:off x="64190" y="4208985"/>
+        <a:ext cx="3104620" cy="1186560"/>
       </dsp:txXfrm>
     </dsp:sp>
   </dsp:spTree>
@@ -10105,8 +8895,8 @@
       </dsp:nvSpPr>
       <dsp:spPr>
         <a:xfrm>
-          <a:off x="122326" y="635461"/>
-          <a:ext cx="7315200" cy="665018"/>
+          <a:off x="145993" y="262915"/>
+          <a:ext cx="8730531" cy="793684"/>
         </a:xfrm>
         <a:prstGeom prst="rect">
           <a:avLst/>
@@ -10155,8 +8945,8 @@
         </a:p>
       </dsp:txBody>
       <dsp:txXfrm>
-        <a:off x="122326" y="635461"/>
-        <a:ext cx="7315200" cy="665018"/>
+        <a:off x="145993" y="262915"/>
+        <a:ext cx="8730531" cy="793684"/>
       </dsp:txXfrm>
     </dsp:sp>
     <dsp:sp modelId="{F9E73F3B-6D57-4A91-8D0B-B6F274F1CC66}">
@@ -10166,8 +8956,8 @@
       </dsp:nvSpPr>
       <dsp:spPr>
         <a:xfrm>
-          <a:off x="122326" y="1300480"/>
-          <a:ext cx="1711756" cy="1354666"/>
+          <a:off x="145993" y="1056599"/>
+          <a:ext cx="2042944" cy="1616765"/>
         </a:xfrm>
         <a:prstGeom prst="chevron">
           <a:avLst>
@@ -10254,8 +9044,8 @@
       </dsp:nvSpPr>
       <dsp:spPr>
         <a:xfrm>
-          <a:off x="1150518" y="1300480"/>
-          <a:ext cx="1711756" cy="1354666"/>
+          <a:off x="1373118" y="1056599"/>
+          <a:ext cx="2042944" cy="1616765"/>
         </a:xfrm>
         <a:prstGeom prst="chevron">
           <a:avLst>
@@ -10342,8 +9132,8 @@
       </dsp:nvSpPr>
       <dsp:spPr>
         <a:xfrm>
-          <a:off x="2179523" y="1300480"/>
-          <a:ext cx="1711756" cy="1354666"/>
+          <a:off x="2601213" y="1056599"/>
+          <a:ext cx="2042944" cy="1616765"/>
         </a:xfrm>
         <a:prstGeom prst="chevron">
           <a:avLst>
@@ -10430,8 +9220,8 @@
       </dsp:nvSpPr>
       <dsp:spPr>
         <a:xfrm>
-          <a:off x="3207715" y="1300480"/>
-          <a:ext cx="1711756" cy="1354666"/>
+          <a:off x="3828338" y="1056599"/>
+          <a:ext cx="2042944" cy="1616765"/>
         </a:xfrm>
         <a:prstGeom prst="chevron">
           <a:avLst>
@@ -10518,8 +9308,8 @@
       </dsp:nvSpPr>
       <dsp:spPr>
         <a:xfrm>
-          <a:off x="4236720" y="1300480"/>
-          <a:ext cx="1711756" cy="1354666"/>
+          <a:off x="5056433" y="1056599"/>
+          <a:ext cx="2042944" cy="1616765"/>
         </a:xfrm>
         <a:prstGeom prst="chevron">
           <a:avLst>
@@ -10606,8 +9396,8 @@
       </dsp:nvSpPr>
       <dsp:spPr>
         <a:xfrm>
-          <a:off x="5264912" y="1300480"/>
-          <a:ext cx="1711756" cy="1354666"/>
+          <a:off x="6283557" y="1056599"/>
+          <a:ext cx="2042944" cy="1616765"/>
         </a:xfrm>
         <a:prstGeom prst="chevron">
           <a:avLst>
@@ -10694,8 +9484,8 @@
       </dsp:nvSpPr>
       <dsp:spPr>
         <a:xfrm>
-          <a:off x="6293916" y="1300480"/>
-          <a:ext cx="1711756" cy="1354666"/>
+          <a:off x="7511652" y="1056599"/>
+          <a:ext cx="2042944" cy="1616765"/>
         </a:xfrm>
         <a:prstGeom prst="chevron">
           <a:avLst>
@@ -10782,8 +9572,8 @@
       </dsp:nvSpPr>
       <dsp:spPr>
         <a:xfrm>
-          <a:off x="122326" y="1435946"/>
-          <a:ext cx="7410297" cy="1083733"/>
+          <a:off x="145993" y="1218276"/>
+          <a:ext cx="8844028" cy="1293412"/>
         </a:xfrm>
         <a:prstGeom prst="rect">
           <a:avLst/>
@@ -10847,13 +9637,13 @@
           </a:r>
           <a:r>
             <a:rPr lang="en-US" sz="2000" kern="1200" dirty="0"/>
-            <a:t> To study whether product review is becoming better or worse during the life cycle of the products</a:t>
+            <a:t> To study whether product review is becoming better or worse during the life cycle of the product</a:t>
           </a:r>
         </a:p>
       </dsp:txBody>
       <dsp:txXfrm>
-        <a:off x="122326" y="1435946"/>
-        <a:ext cx="7410297" cy="1083733"/>
+        <a:off x="145993" y="1218276"/>
+        <a:ext cx="8844028" cy="1293412"/>
       </dsp:txXfrm>
     </dsp:sp>
     <dsp:sp modelId="{1188260C-6405-4984-B6F9-B51C1E29ABF8}">
@@ -10863,8 +9653,8 @@
       </dsp:nvSpPr>
       <dsp:spPr>
         <a:xfrm>
-          <a:off x="122326" y="2763520"/>
-          <a:ext cx="7315200" cy="665018"/>
+          <a:off x="145993" y="2782481"/>
+          <a:ext cx="8730531" cy="793684"/>
         </a:xfrm>
         <a:prstGeom prst="rect">
           <a:avLst/>
@@ -10913,8 +9703,8 @@
         </a:p>
       </dsp:txBody>
       <dsp:txXfrm>
-        <a:off x="122326" y="2763520"/>
-        <a:ext cx="7315200" cy="665018"/>
+        <a:off x="145993" y="2782481"/>
+        <a:ext cx="8730531" cy="793684"/>
       </dsp:txXfrm>
     </dsp:sp>
     <dsp:sp modelId="{98C89A1E-1A04-449E-B455-6BBDD487FF3F}">
@@ -10924,8 +9714,8 @@
       </dsp:nvSpPr>
       <dsp:spPr>
         <a:xfrm>
-          <a:off x="122326" y="3428538"/>
-          <a:ext cx="1711756" cy="1354666"/>
+          <a:off x="145993" y="3576166"/>
+          <a:ext cx="2042944" cy="1616765"/>
         </a:xfrm>
         <a:prstGeom prst="chevron">
           <a:avLst>
@@ -11012,8 +9802,8 @@
       </dsp:nvSpPr>
       <dsp:spPr>
         <a:xfrm>
-          <a:off x="1150518" y="3428538"/>
-          <a:ext cx="1711756" cy="1354666"/>
+          <a:off x="1373118" y="3576166"/>
+          <a:ext cx="2042944" cy="1616765"/>
         </a:xfrm>
         <a:prstGeom prst="chevron">
           <a:avLst>
@@ -11100,8 +9890,8 @@
       </dsp:nvSpPr>
       <dsp:spPr>
         <a:xfrm>
-          <a:off x="2179523" y="3428538"/>
-          <a:ext cx="1711756" cy="1354666"/>
+          <a:off x="2601213" y="3576166"/>
+          <a:ext cx="2042944" cy="1616765"/>
         </a:xfrm>
         <a:prstGeom prst="chevron">
           <a:avLst>
@@ -11188,8 +9978,8 @@
       </dsp:nvSpPr>
       <dsp:spPr>
         <a:xfrm>
-          <a:off x="3207715" y="3428538"/>
-          <a:ext cx="1711756" cy="1354666"/>
+          <a:off x="3828338" y="3576166"/>
+          <a:ext cx="2042944" cy="1616765"/>
         </a:xfrm>
         <a:prstGeom prst="chevron">
           <a:avLst>
@@ -11276,8 +10066,8 @@
       </dsp:nvSpPr>
       <dsp:spPr>
         <a:xfrm>
-          <a:off x="4236720" y="3428538"/>
-          <a:ext cx="1711756" cy="1354666"/>
+          <a:off x="5056433" y="3576166"/>
+          <a:ext cx="2042944" cy="1616765"/>
         </a:xfrm>
         <a:prstGeom prst="chevron">
           <a:avLst>
@@ -11364,8 +10154,8 @@
       </dsp:nvSpPr>
       <dsp:spPr>
         <a:xfrm>
-          <a:off x="5264912" y="3428538"/>
-          <a:ext cx="1711756" cy="1354666"/>
+          <a:off x="6283557" y="3576166"/>
+          <a:ext cx="2042944" cy="1616765"/>
         </a:xfrm>
         <a:prstGeom prst="chevron">
           <a:avLst>
@@ -11452,8 +10242,8 @@
       </dsp:nvSpPr>
       <dsp:spPr>
         <a:xfrm>
-          <a:off x="6293916" y="3428538"/>
-          <a:ext cx="1711756" cy="1354666"/>
+          <a:off x="7511652" y="3576166"/>
+          <a:ext cx="2042944" cy="1616765"/>
         </a:xfrm>
         <a:prstGeom prst="chevron">
           <a:avLst>
@@ -11540,8 +10330,8 @@
       </dsp:nvSpPr>
       <dsp:spPr>
         <a:xfrm>
-          <a:off x="122326" y="3564005"/>
-          <a:ext cx="7410297" cy="1083733"/>
+          <a:off x="145993" y="3737843"/>
+          <a:ext cx="8844028" cy="1293412"/>
         </a:xfrm>
         <a:prstGeom prst="rect">
           <a:avLst/>
@@ -11622,13 +10412,13 @@
           </a:pPr>
           <a:r>
             <a:rPr lang="en-US" sz="2000" kern="1200" dirty="0"/>
-            <a:t>- Sales Vs Count of reviews Trend</a:t>
+            <a:t>- Analyze how Sentiment Score interplays with Sales</a:t>
           </a:r>
         </a:p>
       </dsp:txBody>
       <dsp:txXfrm>
-        <a:off x="122326" y="3564005"/>
-        <a:ext cx="7410297" cy="1083733"/>
+        <a:off x="145993" y="3737843"/>
+        <a:ext cx="8844028" cy="1293412"/>
       </dsp:txXfrm>
     </dsp:sp>
   </dsp:spTree>
@@ -13287,547 +12077,6 @@
       <dsp:txXfrm>
         <a:off x="598902" y="4537760"/>
         <a:ext cx="11094333" cy="518530"/>
-      </dsp:txXfrm>
-    </dsp:sp>
-  </dsp:spTree>
-</dsp:drawing>
-</file>
-
-<file path=ppt/diagrams/drawing6.xml><?xml version="1.0" encoding="utf-8"?>
-<dsp:drawing xmlns:dgm="http://schemas.openxmlformats.org/drawingml/2006/diagram" xmlns:dsp="http://schemas.microsoft.com/office/drawing/2008/diagram" xmlns:a="http://schemas.openxmlformats.org/drawingml/2006/main">
-  <dsp:spTree>
-    <dsp:nvGrpSpPr>
-      <dsp:cNvPr id="0" name=""/>
-      <dsp:cNvGrpSpPr/>
-    </dsp:nvGrpSpPr>
-    <dsp:grpSpPr/>
-    <dsp:sp modelId="{5F8FDA15-CABF-41CC-969A-37F0A83F2845}">
-      <dsp:nvSpPr>
-        <dsp:cNvPr id="0" name=""/>
-        <dsp:cNvSpPr/>
-      </dsp:nvSpPr>
-      <dsp:spPr>
-        <a:xfrm rot="5400000">
-          <a:off x="6643278" y="-2673407"/>
-          <a:ext cx="1156387" cy="6796679"/>
-        </a:xfrm>
-        <a:prstGeom prst="round2SameRect">
-          <a:avLst/>
-        </a:prstGeom>
-        <a:solidFill>
-          <a:schemeClr val="accent1">
-            <a:alpha val="90000"/>
-            <a:tint val="40000"/>
-            <a:hueOff val="0"/>
-            <a:satOff val="0"/>
-            <a:lumOff val="0"/>
-            <a:alphaOff val="0"/>
-          </a:schemeClr>
-        </a:solidFill>
-        <a:ln w="12700" cap="flat" cmpd="sng" algn="ctr">
-          <a:solidFill>
-            <a:schemeClr val="accent1">
-              <a:alpha val="90000"/>
-              <a:tint val="40000"/>
-              <a:hueOff val="0"/>
-              <a:satOff val="0"/>
-              <a:lumOff val="0"/>
-              <a:alphaOff val="0"/>
-            </a:schemeClr>
-          </a:solidFill>
-          <a:prstDash val="solid"/>
-          <a:miter lim="800000"/>
-        </a:ln>
-        <a:effectLst/>
-      </dsp:spPr>
-      <dsp:style>
-        <a:lnRef idx="2">
-          <a:scrgbClr r="0" g="0" b="0"/>
-        </a:lnRef>
-        <a:fillRef idx="1">
-          <a:scrgbClr r="0" g="0" b="0"/>
-        </a:fillRef>
-        <a:effectRef idx="0">
-          <a:scrgbClr r="0" g="0" b="0"/>
-        </a:effectRef>
-        <a:fontRef idx="minor"/>
-      </dsp:style>
-      <dsp:txBody>
-        <a:bodyPr spcFirstLastPara="0" vert="horz" wrap="square" lIns="247650" tIns="123825" rIns="247650" bIns="123825" numCol="1" spcCol="1270" anchor="ctr" anchorCtr="0">
-          <a:noAutofit/>
-        </a:bodyPr>
-        <a:lstStyle/>
-        <a:p>
-          <a:pPr marL="228600" lvl="1" indent="-228600" algn="l" defTabSz="1066800">
-            <a:lnSpc>
-              <a:spcPct val="90000"/>
-            </a:lnSpc>
-            <a:spcBef>
-              <a:spcPct val="0"/>
-            </a:spcBef>
-            <a:spcAft>
-              <a:spcPct val="15000"/>
-            </a:spcAft>
-            <a:buChar char="•"/>
-          </a:pPr>
-          <a:r>
-            <a:rPr lang="en-US" sz="2400" b="0" kern="1200" dirty="0"/>
-            <a:t>Trained based</a:t>
-          </a:r>
-        </a:p>
-        <a:p>
-          <a:pPr marL="228600" lvl="1" indent="-228600" algn="l" defTabSz="1066800">
-            <a:lnSpc>
-              <a:spcPct val="90000"/>
-            </a:lnSpc>
-            <a:spcBef>
-              <a:spcPct val="0"/>
-            </a:spcBef>
-            <a:spcAft>
-              <a:spcPct val="15000"/>
-            </a:spcAft>
-            <a:buChar char="•"/>
-          </a:pPr>
-          <a:r>
-            <a:rPr lang="en-US" sz="2400" b="0" kern="1200" dirty="0"/>
-            <a:t>Accuracy: 57.69%</a:t>
-          </a:r>
-        </a:p>
-      </dsp:txBody>
-      <dsp:txXfrm rot="-5400000">
-        <a:off x="3823132" y="203189"/>
-        <a:ext cx="6740229" cy="1043487"/>
-      </dsp:txXfrm>
-    </dsp:sp>
-    <dsp:sp modelId="{1946386A-B9ED-419F-BB76-ADE9C95ACA8B}">
-      <dsp:nvSpPr>
-        <dsp:cNvPr id="0" name=""/>
-        <dsp:cNvSpPr/>
-      </dsp:nvSpPr>
-      <dsp:spPr>
-        <a:xfrm>
-          <a:off x="0" y="0"/>
-          <a:ext cx="3823132" cy="1445484"/>
-        </a:xfrm>
-        <a:prstGeom prst="roundRect">
-          <a:avLst/>
-        </a:prstGeom>
-        <a:solidFill>
-          <a:schemeClr val="accent1">
-            <a:hueOff val="0"/>
-            <a:satOff val="0"/>
-            <a:lumOff val="0"/>
-            <a:alphaOff val="0"/>
-          </a:schemeClr>
-        </a:solidFill>
-        <a:ln w="19050" cap="flat" cmpd="sng" algn="ctr">
-          <a:solidFill>
-            <a:schemeClr val="lt1">
-              <a:hueOff val="0"/>
-              <a:satOff val="0"/>
-              <a:lumOff val="0"/>
-              <a:alphaOff val="0"/>
-            </a:schemeClr>
-          </a:solidFill>
-          <a:prstDash val="solid"/>
-          <a:miter lim="800000"/>
-        </a:ln>
-        <a:effectLst/>
-      </dsp:spPr>
-      <dsp:style>
-        <a:lnRef idx="3">
-          <a:scrgbClr r="0" g="0" b="0"/>
-        </a:lnRef>
-        <a:fillRef idx="1">
-          <a:scrgbClr r="0" g="0" b="0"/>
-        </a:fillRef>
-        <a:effectRef idx="1">
-          <a:scrgbClr r="0" g="0" b="0"/>
-        </a:effectRef>
-        <a:fontRef idx="minor">
-          <a:schemeClr val="lt1"/>
-        </a:fontRef>
-      </dsp:style>
-      <dsp:txBody>
-        <a:bodyPr spcFirstLastPara="0" vert="horz" wrap="square" lIns="106680" tIns="53340" rIns="106680" bIns="53340" numCol="1" spcCol="1270" anchor="ctr" anchorCtr="0">
-          <a:noAutofit/>
-        </a:bodyPr>
-        <a:lstStyle/>
-        <a:p>
-          <a:pPr marL="0" lvl="0" indent="0" algn="ctr" defTabSz="1244600">
-            <a:lnSpc>
-              <a:spcPct val="90000"/>
-            </a:lnSpc>
-            <a:spcBef>
-              <a:spcPct val="0"/>
-            </a:spcBef>
-            <a:spcAft>
-              <a:spcPct val="35000"/>
-            </a:spcAft>
-            <a:buNone/>
-          </a:pPr>
-          <a:r>
-            <a:rPr lang="en-US" sz="2800" b="1" kern="1200" dirty="0"/>
-            <a:t>Text Blob</a:t>
-          </a:r>
-        </a:p>
-      </dsp:txBody>
-      <dsp:txXfrm>
-        <a:off x="70563" y="70563"/>
-        <a:ext cx="3682006" cy="1304358"/>
-      </dsp:txXfrm>
-    </dsp:sp>
-    <dsp:sp modelId="{2EB02FE2-7DD3-4083-ABDF-CBA05C8C96DD}">
-      <dsp:nvSpPr>
-        <dsp:cNvPr id="0" name=""/>
-        <dsp:cNvSpPr/>
-      </dsp:nvSpPr>
-      <dsp:spPr>
-        <a:xfrm rot="5400000">
-          <a:off x="6643278" y="-1155649"/>
-          <a:ext cx="1156387" cy="6796679"/>
-        </a:xfrm>
-        <a:prstGeom prst="round2SameRect">
-          <a:avLst/>
-        </a:prstGeom>
-        <a:solidFill>
-          <a:schemeClr val="accent1">
-            <a:alpha val="90000"/>
-            <a:tint val="40000"/>
-            <a:hueOff val="0"/>
-            <a:satOff val="0"/>
-            <a:lumOff val="0"/>
-            <a:alphaOff val="0"/>
-          </a:schemeClr>
-        </a:solidFill>
-        <a:ln w="12700" cap="flat" cmpd="sng" algn="ctr">
-          <a:solidFill>
-            <a:schemeClr val="accent1">
-              <a:alpha val="90000"/>
-              <a:tint val="40000"/>
-              <a:hueOff val="0"/>
-              <a:satOff val="0"/>
-              <a:lumOff val="0"/>
-              <a:alphaOff val="0"/>
-            </a:schemeClr>
-          </a:solidFill>
-          <a:prstDash val="solid"/>
-          <a:miter lim="800000"/>
-        </a:ln>
-        <a:effectLst/>
-      </dsp:spPr>
-      <dsp:style>
-        <a:lnRef idx="2">
-          <a:scrgbClr r="0" g="0" b="0"/>
-        </a:lnRef>
-        <a:fillRef idx="1">
-          <a:scrgbClr r="0" g="0" b="0"/>
-        </a:fillRef>
-        <a:effectRef idx="0">
-          <a:scrgbClr r="0" g="0" b="0"/>
-        </a:effectRef>
-        <a:fontRef idx="minor"/>
-      </dsp:style>
-      <dsp:txBody>
-        <a:bodyPr spcFirstLastPara="0" vert="horz" wrap="square" lIns="247650" tIns="123825" rIns="247650" bIns="123825" numCol="1" spcCol="1270" anchor="ctr" anchorCtr="0">
-          <a:noAutofit/>
-        </a:bodyPr>
-        <a:lstStyle/>
-        <a:p>
-          <a:pPr marL="228600" lvl="1" indent="-228600" algn="l" defTabSz="1066800">
-            <a:lnSpc>
-              <a:spcPct val="90000"/>
-            </a:lnSpc>
-            <a:spcBef>
-              <a:spcPct val="0"/>
-            </a:spcBef>
-            <a:spcAft>
-              <a:spcPct val="15000"/>
-            </a:spcAft>
-            <a:buChar char="•"/>
-          </a:pPr>
-          <a:r>
-            <a:rPr lang="en-US" sz="2400" b="0" kern="1200" dirty="0"/>
-            <a:t>General purpose lexicon with TFIDF </a:t>
-          </a:r>
-        </a:p>
-        <a:p>
-          <a:pPr marL="228600" lvl="1" indent="-228600" algn="l" defTabSz="1066800">
-            <a:lnSpc>
-              <a:spcPct val="90000"/>
-            </a:lnSpc>
-            <a:spcBef>
-              <a:spcPct val="0"/>
-            </a:spcBef>
-            <a:spcAft>
-              <a:spcPct val="15000"/>
-            </a:spcAft>
-            <a:buChar char="•"/>
-          </a:pPr>
-          <a:r>
-            <a:rPr lang="en-US" sz="2400" b="0" kern="1200" dirty="0"/>
-            <a:t>Accuracy: 67.50%</a:t>
-          </a:r>
-        </a:p>
-      </dsp:txBody>
-      <dsp:txXfrm rot="-5400000">
-        <a:off x="3823132" y="1720947"/>
-        <a:ext cx="6740229" cy="1043487"/>
-      </dsp:txXfrm>
-    </dsp:sp>
-    <dsp:sp modelId="{3E2F2E4A-9DF4-472A-AC31-84D882070AE1}">
-      <dsp:nvSpPr>
-        <dsp:cNvPr id="0" name=""/>
-        <dsp:cNvSpPr/>
-      </dsp:nvSpPr>
-      <dsp:spPr>
-        <a:xfrm>
-          <a:off x="0" y="1519948"/>
-          <a:ext cx="3823132" cy="1445484"/>
-        </a:xfrm>
-        <a:prstGeom prst="roundRect">
-          <a:avLst/>
-        </a:prstGeom>
-        <a:solidFill>
-          <a:schemeClr val="accent1">
-            <a:hueOff val="0"/>
-            <a:satOff val="0"/>
-            <a:lumOff val="0"/>
-            <a:alphaOff val="0"/>
-          </a:schemeClr>
-        </a:solidFill>
-        <a:ln w="19050" cap="flat" cmpd="sng" algn="ctr">
-          <a:solidFill>
-            <a:schemeClr val="lt1">
-              <a:hueOff val="0"/>
-              <a:satOff val="0"/>
-              <a:lumOff val="0"/>
-              <a:alphaOff val="0"/>
-            </a:schemeClr>
-          </a:solidFill>
-          <a:prstDash val="solid"/>
-          <a:miter lim="800000"/>
-        </a:ln>
-        <a:effectLst/>
-      </dsp:spPr>
-      <dsp:style>
-        <a:lnRef idx="3">
-          <a:scrgbClr r="0" g="0" b="0"/>
-        </a:lnRef>
-        <a:fillRef idx="1">
-          <a:scrgbClr r="0" g="0" b="0"/>
-        </a:fillRef>
-        <a:effectRef idx="1">
-          <a:scrgbClr r="0" g="0" b="0"/>
-        </a:effectRef>
-        <a:fontRef idx="minor">
-          <a:schemeClr val="lt1"/>
-        </a:fontRef>
-      </dsp:style>
-      <dsp:txBody>
-        <a:bodyPr spcFirstLastPara="0" vert="horz" wrap="square" lIns="106680" tIns="53340" rIns="106680" bIns="53340" numCol="1" spcCol="1270" anchor="ctr" anchorCtr="0">
-          <a:noAutofit/>
-        </a:bodyPr>
-        <a:lstStyle/>
-        <a:p>
-          <a:pPr marL="0" lvl="0" indent="0" algn="ctr" defTabSz="1244600">
-            <a:lnSpc>
-              <a:spcPct val="90000"/>
-            </a:lnSpc>
-            <a:spcBef>
-              <a:spcPct val="0"/>
-            </a:spcBef>
-            <a:spcAft>
-              <a:spcPct val="35000"/>
-            </a:spcAft>
-            <a:buNone/>
-          </a:pPr>
-          <a:r>
-            <a:rPr lang="en-US" sz="2800" b="1" kern="1200" dirty="0"/>
-            <a:t>Lexicon</a:t>
-          </a:r>
-        </a:p>
-      </dsp:txBody>
-      <dsp:txXfrm>
-        <a:off x="70563" y="1590511"/>
-        <a:ext cx="3682006" cy="1304358"/>
-      </dsp:txXfrm>
-    </dsp:sp>
-    <dsp:sp modelId="{B7C2B740-5787-48B3-A154-2E9EE57FA3C4}">
-      <dsp:nvSpPr>
-        <dsp:cNvPr id="0" name=""/>
-        <dsp:cNvSpPr/>
-      </dsp:nvSpPr>
-      <dsp:spPr>
-        <a:xfrm rot="5400000">
-          <a:off x="6643278" y="362108"/>
-          <a:ext cx="1156387" cy="6796679"/>
-        </a:xfrm>
-        <a:prstGeom prst="round2SameRect">
-          <a:avLst/>
-        </a:prstGeom>
-        <a:solidFill>
-          <a:schemeClr val="accent1">
-            <a:alpha val="90000"/>
-            <a:tint val="40000"/>
-            <a:hueOff val="0"/>
-            <a:satOff val="0"/>
-            <a:lumOff val="0"/>
-            <a:alphaOff val="0"/>
-          </a:schemeClr>
-        </a:solidFill>
-        <a:ln w="12700" cap="flat" cmpd="sng" algn="ctr">
-          <a:solidFill>
-            <a:schemeClr val="accent1">
-              <a:alpha val="90000"/>
-              <a:tint val="40000"/>
-              <a:hueOff val="0"/>
-              <a:satOff val="0"/>
-              <a:lumOff val="0"/>
-              <a:alphaOff val="0"/>
-            </a:schemeClr>
-          </a:solidFill>
-          <a:prstDash val="solid"/>
-          <a:miter lim="800000"/>
-        </a:ln>
-        <a:effectLst/>
-      </dsp:spPr>
-      <dsp:style>
-        <a:lnRef idx="2">
-          <a:scrgbClr r="0" g="0" b="0"/>
-        </a:lnRef>
-        <a:fillRef idx="1">
-          <a:scrgbClr r="0" g="0" b="0"/>
-        </a:fillRef>
-        <a:effectRef idx="0">
-          <a:scrgbClr r="0" g="0" b="0"/>
-        </a:effectRef>
-        <a:fontRef idx="minor"/>
-      </dsp:style>
-      <dsp:txBody>
-        <a:bodyPr spcFirstLastPara="0" vert="horz" wrap="square" lIns="247650" tIns="123825" rIns="247650" bIns="123825" numCol="1" spcCol="1270" anchor="ctr" anchorCtr="0">
-          <a:noAutofit/>
-        </a:bodyPr>
-        <a:lstStyle/>
-        <a:p>
-          <a:pPr marL="228600" lvl="1" indent="-228600" algn="l" defTabSz="1066800">
-            <a:lnSpc>
-              <a:spcPct val="90000"/>
-            </a:lnSpc>
-            <a:spcBef>
-              <a:spcPct val="0"/>
-            </a:spcBef>
-            <a:spcAft>
-              <a:spcPct val="15000"/>
-            </a:spcAft>
-            <a:buChar char="•"/>
-          </a:pPr>
-          <a:r>
-            <a:rPr lang="en-US" sz="2400" kern="1200" dirty="0"/>
-            <a:t>Rule based</a:t>
-          </a:r>
-        </a:p>
-        <a:p>
-          <a:pPr marL="228600" lvl="1" indent="-228600" algn="l" defTabSz="1066800">
-            <a:lnSpc>
-              <a:spcPct val="90000"/>
-            </a:lnSpc>
-            <a:spcBef>
-              <a:spcPct val="0"/>
-            </a:spcBef>
-            <a:spcAft>
-              <a:spcPct val="15000"/>
-            </a:spcAft>
-            <a:buChar char="•"/>
-          </a:pPr>
-          <a:r>
-            <a:rPr lang="en-US" sz="2400" kern="1200" dirty="0"/>
-            <a:t>Accuracy: 79.96%</a:t>
-          </a:r>
-          <a:endParaRPr lang="en-US" sz="2800" kern="1200" dirty="0"/>
-        </a:p>
-      </dsp:txBody>
-      <dsp:txXfrm rot="-5400000">
-        <a:off x="3823132" y="3238704"/>
-        <a:ext cx="6740229" cy="1043487"/>
-      </dsp:txXfrm>
-    </dsp:sp>
-    <dsp:sp modelId="{54A6F0F9-AA2E-4C52-80FC-75F9DAD44718}">
-      <dsp:nvSpPr>
-        <dsp:cNvPr id="0" name=""/>
-        <dsp:cNvSpPr/>
-      </dsp:nvSpPr>
-      <dsp:spPr>
-        <a:xfrm>
-          <a:off x="0" y="3037706"/>
-          <a:ext cx="3823132" cy="1445484"/>
-        </a:xfrm>
-        <a:prstGeom prst="roundRect">
-          <a:avLst/>
-        </a:prstGeom>
-        <a:solidFill>
-          <a:schemeClr val="accent1">
-            <a:hueOff val="0"/>
-            <a:satOff val="0"/>
-            <a:lumOff val="0"/>
-            <a:alphaOff val="0"/>
-          </a:schemeClr>
-        </a:solidFill>
-        <a:ln w="19050" cap="flat" cmpd="sng" algn="ctr">
-          <a:solidFill>
-            <a:schemeClr val="lt1">
-              <a:hueOff val="0"/>
-              <a:satOff val="0"/>
-              <a:lumOff val="0"/>
-              <a:alphaOff val="0"/>
-            </a:schemeClr>
-          </a:solidFill>
-          <a:prstDash val="solid"/>
-          <a:miter lim="800000"/>
-        </a:ln>
-        <a:effectLst/>
-      </dsp:spPr>
-      <dsp:style>
-        <a:lnRef idx="3">
-          <a:scrgbClr r="0" g="0" b="0"/>
-        </a:lnRef>
-        <a:fillRef idx="1">
-          <a:scrgbClr r="0" g="0" b="0"/>
-        </a:fillRef>
-        <a:effectRef idx="1">
-          <a:scrgbClr r="0" g="0" b="0"/>
-        </a:effectRef>
-        <a:fontRef idx="minor">
-          <a:schemeClr val="lt1"/>
-        </a:fontRef>
-      </dsp:style>
-      <dsp:txBody>
-        <a:bodyPr spcFirstLastPara="0" vert="horz" wrap="square" lIns="106680" tIns="53340" rIns="106680" bIns="53340" numCol="1" spcCol="1270" anchor="ctr" anchorCtr="0">
-          <a:noAutofit/>
-        </a:bodyPr>
-        <a:lstStyle/>
-        <a:p>
-          <a:pPr marL="0" lvl="0" indent="0" algn="ctr" defTabSz="1244600">
-            <a:lnSpc>
-              <a:spcPct val="90000"/>
-            </a:lnSpc>
-            <a:spcBef>
-              <a:spcPct val="0"/>
-            </a:spcBef>
-            <a:spcAft>
-              <a:spcPct val="35000"/>
-            </a:spcAft>
-            <a:buNone/>
-          </a:pPr>
-          <a:r>
-            <a:rPr lang="en-US" sz="2800" b="1" kern="1200" dirty="0"/>
-            <a:t>Vader</a:t>
-          </a:r>
-        </a:p>
-      </dsp:txBody>
-      <dsp:txXfrm>
-        <a:off x="70563" y="3108269"/>
-        <a:ext cx="3682006" cy="1304358"/>
       </dsp:txXfrm>
     </dsp:sp>
   </dsp:spTree>
@@ -16420,239 +14669,6 @@
 </dgm:layoutDef>
 </file>
 
-<file path=ppt/diagrams/layout6.xml><?xml version="1.0" encoding="utf-8"?>
-<dgm:layoutDef xmlns:dgm="http://schemas.openxmlformats.org/drawingml/2006/diagram" xmlns:a="http://schemas.openxmlformats.org/drawingml/2006/main" uniqueId="urn:microsoft.com/office/officeart/2005/8/layout/vList5">
-  <dgm:title val=""/>
-  <dgm:desc val=""/>
-  <dgm:catLst>
-    <dgm:cat type="list" pri="15000"/>
-    <dgm:cat type="convert" pri="2000"/>
-  </dgm:catLst>
-  <dgm:sampData>
-    <dgm:dataModel>
-      <dgm:ptLst>
-        <dgm:pt modelId="0" type="doc"/>
-        <dgm:pt modelId="1">
-          <dgm:prSet phldr="1"/>
-        </dgm:pt>
-        <dgm:pt modelId="11">
-          <dgm:prSet phldr="1"/>
-        </dgm:pt>
-        <dgm:pt modelId="12">
-          <dgm:prSet phldr="1"/>
-        </dgm:pt>
-        <dgm:pt modelId="2">
-          <dgm:prSet phldr="1"/>
-        </dgm:pt>
-        <dgm:pt modelId="21">
-          <dgm:prSet phldr="1"/>
-        </dgm:pt>
-        <dgm:pt modelId="22">
-          <dgm:prSet phldr="1"/>
-        </dgm:pt>
-        <dgm:pt modelId="3">
-          <dgm:prSet phldr="1"/>
-        </dgm:pt>
-        <dgm:pt modelId="31">
-          <dgm:prSet phldr="1"/>
-        </dgm:pt>
-        <dgm:pt modelId="32">
-          <dgm:prSet phldr="1"/>
-        </dgm:pt>
-      </dgm:ptLst>
-      <dgm:cxnLst>
-        <dgm:cxn modelId="4" srcId="0" destId="1" srcOrd="0" destOrd="0"/>
-        <dgm:cxn modelId="5" srcId="0" destId="2" srcOrd="1" destOrd="0"/>
-        <dgm:cxn modelId="6" srcId="0" destId="3" srcOrd="2" destOrd="0"/>
-        <dgm:cxn modelId="13" srcId="1" destId="11" srcOrd="0" destOrd="0"/>
-        <dgm:cxn modelId="14" srcId="1" destId="12" srcOrd="1" destOrd="0"/>
-        <dgm:cxn modelId="23" srcId="2" destId="21" srcOrd="0" destOrd="0"/>
-        <dgm:cxn modelId="24" srcId="2" destId="22" srcOrd="1" destOrd="0"/>
-        <dgm:cxn modelId="33" srcId="3" destId="31" srcOrd="0" destOrd="0"/>
-        <dgm:cxn modelId="34" srcId="3" destId="32" srcOrd="1" destOrd="0"/>
-      </dgm:cxnLst>
-      <dgm:bg/>
-      <dgm:whole/>
-    </dgm:dataModel>
-  </dgm:sampData>
-  <dgm:styleData>
-    <dgm:dataModel>
-      <dgm:ptLst>
-        <dgm:pt modelId="0" type="doc"/>
-        <dgm:pt modelId="1"/>
-        <dgm:pt modelId="11"/>
-        <dgm:pt modelId="2"/>
-        <dgm:pt modelId="21"/>
-      </dgm:ptLst>
-      <dgm:cxnLst>
-        <dgm:cxn modelId="4" srcId="0" destId="1" srcOrd="0" destOrd="0"/>
-        <dgm:cxn modelId="5" srcId="0" destId="2" srcOrd="1" destOrd="0"/>
-        <dgm:cxn modelId="13" srcId="1" destId="11" srcOrd="0" destOrd="0"/>
-        <dgm:cxn modelId="23" srcId="2" destId="21" srcOrd="0" destOrd="0"/>
-      </dgm:cxnLst>
-      <dgm:bg/>
-      <dgm:whole/>
-    </dgm:dataModel>
-  </dgm:styleData>
-  <dgm:clrData>
-    <dgm:dataModel>
-      <dgm:ptLst>
-        <dgm:pt modelId="0" type="doc"/>
-        <dgm:pt modelId="1"/>
-        <dgm:pt modelId="11"/>
-        <dgm:pt modelId="2"/>
-        <dgm:pt modelId="21"/>
-        <dgm:pt modelId="3"/>
-        <dgm:pt modelId="31"/>
-        <dgm:pt modelId="4"/>
-        <dgm:pt modelId="41"/>
-      </dgm:ptLst>
-      <dgm:cxnLst>
-        <dgm:cxn modelId="5" srcId="0" destId="1" srcOrd="0" destOrd="0"/>
-        <dgm:cxn modelId="6" srcId="0" destId="2" srcOrd="1" destOrd="0"/>
-        <dgm:cxn modelId="7" srcId="0" destId="3" srcOrd="2" destOrd="0"/>
-        <dgm:cxn modelId="8" srcId="0" destId="4" srcOrd="3" destOrd="0"/>
-        <dgm:cxn modelId="13" srcId="1" destId="11" srcOrd="0" destOrd="0"/>
-        <dgm:cxn modelId="23" srcId="2" destId="21" srcOrd="0" destOrd="0"/>
-        <dgm:cxn modelId="33" srcId="3" destId="31" srcOrd="0" destOrd="0"/>
-        <dgm:cxn modelId="43" srcId="4" destId="41" srcOrd="0" destOrd="0"/>
-      </dgm:cxnLst>
-      <dgm:bg/>
-      <dgm:whole/>
-    </dgm:dataModel>
-  </dgm:clrData>
-  <dgm:layoutNode name="Name0">
-    <dgm:varLst>
-      <dgm:dir/>
-      <dgm:animLvl val="lvl"/>
-      <dgm:resizeHandles val="exact"/>
-    </dgm:varLst>
-    <dgm:choose name="Name1">
-      <dgm:if name="Name2" func="var" arg="dir" op="equ" val="norm">
-        <dgm:alg type="lin">
-          <dgm:param type="linDir" val="fromT"/>
-          <dgm:param type="nodeHorzAlign" val="l"/>
-        </dgm:alg>
-      </dgm:if>
-      <dgm:else name="Name3">
-        <dgm:alg type="lin">
-          <dgm:param type="linDir" val="fromT"/>
-          <dgm:param type="nodeHorzAlign" val="r"/>
-        </dgm:alg>
-      </dgm:else>
-    </dgm:choose>
-    <dgm:shape xmlns:r="http://schemas.openxmlformats.org/officeDocument/2006/relationships" r:blip="">
-      <dgm:adjLst/>
-    </dgm:shape>
-    <dgm:presOf/>
-    <dgm:constrLst>
-      <dgm:constr type="h" for="ch" forName="linNode" refType="h"/>
-      <dgm:constr type="w" for="ch" forName="linNode" refType="w"/>
-      <dgm:constr type="h" for="ch" forName="sp" refType="h" fact="0.05"/>
-      <dgm:constr type="primFontSz" for="des" forName="parentText" op="equ" val="65"/>
-      <dgm:constr type="secFontSz" for="des" forName="descendantText" op="equ"/>
-    </dgm:constrLst>
-    <dgm:ruleLst/>
-    <dgm:forEach name="Name4" axis="ch" ptType="node">
-      <dgm:layoutNode name="linNode">
-        <dgm:choose name="Name5">
-          <dgm:if name="Name6" func="var" arg="dir" op="equ" val="norm">
-            <dgm:alg type="lin">
-              <dgm:param type="linDir" val="fromL"/>
-            </dgm:alg>
-          </dgm:if>
-          <dgm:else name="Name7">
-            <dgm:alg type="lin">
-              <dgm:param type="linDir" val="fromR"/>
-            </dgm:alg>
-          </dgm:else>
-        </dgm:choose>
-        <dgm:shape xmlns:r="http://schemas.openxmlformats.org/officeDocument/2006/relationships" r:blip="">
-          <dgm:adjLst/>
-        </dgm:shape>
-        <dgm:presOf/>
-        <dgm:constrLst>
-          <dgm:constr type="w" for="ch" forName="parentText" refType="w" fact="0.36"/>
-          <dgm:constr type="w" for="ch" forName="descendantText" refType="w" fact="0.64"/>
-          <dgm:constr type="h" for="ch" forName="parentText" refType="h"/>
-          <dgm:constr type="h" for="ch" forName="descendantText" refType="h" refFor="ch" refForName="parentText" fact="0.8"/>
-        </dgm:constrLst>
-        <dgm:ruleLst/>
-        <dgm:layoutNode name="parentText">
-          <dgm:varLst>
-            <dgm:chMax val="1"/>
-            <dgm:bulletEnabled val="1"/>
-          </dgm:varLst>
-          <dgm:alg type="tx"/>
-          <dgm:shape xmlns:r="http://schemas.openxmlformats.org/officeDocument/2006/relationships" type="roundRect" r:blip="" zOrderOff="3">
-            <dgm:adjLst/>
-          </dgm:shape>
-          <dgm:presOf axis="self" ptType="node"/>
-          <dgm:constrLst>
-            <dgm:constr type="tMarg" refType="primFontSz" fact="0.15"/>
-            <dgm:constr type="bMarg" refType="primFontSz" fact="0.15"/>
-            <dgm:constr type="lMarg" refType="primFontSz" fact="0.3"/>
-            <dgm:constr type="rMarg" refType="primFontSz" fact="0.3"/>
-          </dgm:constrLst>
-          <dgm:ruleLst>
-            <dgm:rule type="primFontSz" val="5" fact="NaN" max="NaN"/>
-          </dgm:ruleLst>
-        </dgm:layoutNode>
-        <dgm:choose name="Name8">
-          <dgm:if name="Name9" axis="ch" ptType="node" func="cnt" op="gte" val="1">
-            <dgm:layoutNode name="descendantText" styleLbl="alignAccFollowNode1">
-              <dgm:varLst>
-                <dgm:bulletEnabled val="1"/>
-              </dgm:varLst>
-              <dgm:alg type="tx">
-                <dgm:param type="stBulletLvl" val="1"/>
-                <dgm:param type="txAnchorVertCh" val="mid"/>
-              </dgm:alg>
-              <dgm:choose name="Name10">
-                <dgm:if name="Name11" func="var" arg="dir" op="equ" val="norm">
-                  <dgm:shape xmlns:r="http://schemas.openxmlformats.org/officeDocument/2006/relationships" rot="90" type="round2SameRect" r:blip="">
-                    <dgm:adjLst/>
-                  </dgm:shape>
-                </dgm:if>
-                <dgm:else name="Name12">
-                  <dgm:shape xmlns:r="http://schemas.openxmlformats.org/officeDocument/2006/relationships" rot="-90" type="round2SameRect" r:blip="">
-                    <dgm:adjLst/>
-                  </dgm:shape>
-                </dgm:else>
-              </dgm:choose>
-              <dgm:presOf axis="des" ptType="node"/>
-              <dgm:constrLst>
-                <dgm:constr type="secFontSz" val="65"/>
-                <dgm:constr type="primFontSz" refType="secFontSz"/>
-                <dgm:constr type="lMarg" refType="secFontSz" fact="0.3"/>
-                <dgm:constr type="rMarg" refType="secFontSz" fact="0.3"/>
-                <dgm:constr type="tMarg" refType="secFontSz" fact="0.15"/>
-                <dgm:constr type="bMarg" refType="secFontSz" fact="0.15"/>
-              </dgm:constrLst>
-              <dgm:ruleLst>
-                <dgm:rule type="secFontSz" val="5" fact="NaN" max="NaN"/>
-              </dgm:ruleLst>
-            </dgm:layoutNode>
-          </dgm:if>
-          <dgm:else name="Name13"/>
-        </dgm:choose>
-      </dgm:layoutNode>
-      <dgm:forEach name="Name14" axis="followSib" ptType="sibTrans" cnt="1">
-        <dgm:layoutNode name="sp">
-          <dgm:alg type="sp"/>
-          <dgm:shape xmlns:r="http://schemas.openxmlformats.org/officeDocument/2006/relationships" r:blip="">
-            <dgm:adjLst/>
-          </dgm:shape>
-          <dgm:presOf/>
-          <dgm:constrLst/>
-          <dgm:ruleLst/>
-        </dgm:layoutNode>
-      </dgm:forEach>
-    </dgm:forEach>
-  </dgm:layoutNode>
-</dgm:layoutDef>
-</file>
-
 <file path=ppt/diagrams/quickStyle1.xml><?xml version="1.0" encoding="utf-8"?>
 <dgm:styleDef xmlns:dgm="http://schemas.openxmlformats.org/drawingml/2006/diagram" xmlns:a="http://schemas.openxmlformats.org/drawingml/2006/main" uniqueId="urn:microsoft.com/office/officeart/2005/8/quickstyle/simple2">
   <dgm:title val=""/>
@@ -21821,1040 +19837,6 @@
         <a:scrgbClr r="0" g="0" b="0"/>
       </a:fillRef>
       <a:effectRef idx="0">
-        <a:scrgbClr r="0" g="0" b="0"/>
-      </a:effectRef>
-      <a:fontRef idx="minor"/>
-    </dgm:style>
-  </dgm:styleLbl>
-  <dgm:styleLbl name="revTx">
-    <dgm:scene3d>
-      <a:camera prst="orthographicFront"/>
-      <a:lightRig rig="threePt" dir="t"/>
-    </dgm:scene3d>
-    <dgm:sp3d/>
-    <dgm:txPr/>
-    <dgm:style>
-      <a:lnRef idx="0">
-        <a:scrgbClr r="0" g="0" b="0"/>
-      </a:lnRef>
-      <a:fillRef idx="0">
-        <a:scrgbClr r="0" g="0" b="0"/>
-      </a:fillRef>
-      <a:effectRef idx="0">
-        <a:scrgbClr r="0" g="0" b="0"/>
-      </a:effectRef>
-      <a:fontRef idx="minor"/>
-    </dgm:style>
-  </dgm:styleLbl>
-</dgm:styleDef>
-</file>
-
-<file path=ppt/diagrams/quickStyle6.xml><?xml version="1.0" encoding="utf-8"?>
-<dgm:styleDef xmlns:dgm="http://schemas.openxmlformats.org/drawingml/2006/diagram" xmlns:a="http://schemas.openxmlformats.org/drawingml/2006/main" uniqueId="urn:microsoft.com/office/officeart/2005/8/quickstyle/simple2">
-  <dgm:title val=""/>
-  <dgm:desc val=""/>
-  <dgm:catLst>
-    <dgm:cat type="simple" pri="10200"/>
-  </dgm:catLst>
-  <dgm:scene3d>
-    <a:camera prst="orthographicFront"/>
-    <a:lightRig rig="threePt" dir="t"/>
-  </dgm:scene3d>
-  <dgm:styleLbl name="node0">
-    <dgm:scene3d>
-      <a:camera prst="orthographicFront"/>
-      <a:lightRig rig="threePt" dir="t"/>
-    </dgm:scene3d>
-    <dgm:sp3d/>
-    <dgm:txPr/>
-    <dgm:style>
-      <a:lnRef idx="3">
-        <a:scrgbClr r="0" g="0" b="0"/>
-      </a:lnRef>
-      <a:fillRef idx="1">
-        <a:scrgbClr r="0" g="0" b="0"/>
-      </a:fillRef>
-      <a:effectRef idx="1">
-        <a:scrgbClr r="0" g="0" b="0"/>
-      </a:effectRef>
-      <a:fontRef idx="minor">
-        <a:schemeClr val="lt1"/>
-      </a:fontRef>
-    </dgm:style>
-  </dgm:styleLbl>
-  <dgm:styleLbl name="lnNode1">
-    <dgm:scene3d>
-      <a:camera prst="orthographicFront"/>
-      <a:lightRig rig="threePt" dir="t"/>
-    </dgm:scene3d>
-    <dgm:sp3d/>
-    <dgm:txPr/>
-    <dgm:style>
-      <a:lnRef idx="3">
-        <a:scrgbClr r="0" g="0" b="0"/>
-      </a:lnRef>
-      <a:fillRef idx="1">
-        <a:scrgbClr r="0" g="0" b="0"/>
-      </a:fillRef>
-      <a:effectRef idx="1">
-        <a:scrgbClr r="0" g="0" b="0"/>
-      </a:effectRef>
-      <a:fontRef idx="minor">
-        <a:schemeClr val="lt1"/>
-      </a:fontRef>
-    </dgm:style>
-  </dgm:styleLbl>
-  <dgm:styleLbl name="vennNode1">
-    <dgm:scene3d>
-      <a:camera prst="orthographicFront"/>
-      <a:lightRig rig="threePt" dir="t"/>
-    </dgm:scene3d>
-    <dgm:sp3d/>
-    <dgm:txPr/>
-    <dgm:style>
-      <a:lnRef idx="3">
-        <a:scrgbClr r="0" g="0" b="0"/>
-      </a:lnRef>
-      <a:fillRef idx="1">
-        <a:scrgbClr r="0" g="0" b="0"/>
-      </a:fillRef>
-      <a:effectRef idx="0">
-        <a:scrgbClr r="0" g="0" b="0"/>
-      </a:effectRef>
-      <a:fontRef idx="minor">
-        <a:schemeClr val="tx1"/>
-      </a:fontRef>
-    </dgm:style>
-  </dgm:styleLbl>
-  <dgm:styleLbl name="alignNode1">
-    <dgm:scene3d>
-      <a:camera prst="orthographicFront"/>
-      <a:lightRig rig="threePt" dir="t"/>
-    </dgm:scene3d>
-    <dgm:sp3d/>
-    <dgm:txPr/>
-    <dgm:style>
-      <a:lnRef idx="2">
-        <a:scrgbClr r="0" g="0" b="0"/>
-      </a:lnRef>
-      <a:fillRef idx="1">
-        <a:scrgbClr r="0" g="0" b="0"/>
-      </a:fillRef>
-      <a:effectRef idx="1">
-        <a:scrgbClr r="0" g="0" b="0"/>
-      </a:effectRef>
-      <a:fontRef idx="minor">
-        <a:schemeClr val="lt1"/>
-      </a:fontRef>
-    </dgm:style>
-  </dgm:styleLbl>
-  <dgm:styleLbl name="node1">
-    <dgm:scene3d>
-      <a:camera prst="orthographicFront"/>
-      <a:lightRig rig="threePt" dir="t"/>
-    </dgm:scene3d>
-    <dgm:sp3d/>
-    <dgm:txPr/>
-    <dgm:style>
-      <a:lnRef idx="3">
-        <a:scrgbClr r="0" g="0" b="0"/>
-      </a:lnRef>
-      <a:fillRef idx="1">
-        <a:scrgbClr r="0" g="0" b="0"/>
-      </a:fillRef>
-      <a:effectRef idx="1">
-        <a:scrgbClr r="0" g="0" b="0"/>
-      </a:effectRef>
-      <a:fontRef idx="minor">
-        <a:schemeClr val="lt1"/>
-      </a:fontRef>
-    </dgm:style>
-  </dgm:styleLbl>
-  <dgm:styleLbl name="node2">
-    <dgm:scene3d>
-      <a:camera prst="orthographicFront"/>
-      <a:lightRig rig="threePt" dir="t"/>
-    </dgm:scene3d>
-    <dgm:sp3d/>
-    <dgm:txPr/>
-    <dgm:style>
-      <a:lnRef idx="3">
-        <a:scrgbClr r="0" g="0" b="0"/>
-      </a:lnRef>
-      <a:fillRef idx="1">
-        <a:scrgbClr r="0" g="0" b="0"/>
-      </a:fillRef>
-      <a:effectRef idx="1">
-        <a:scrgbClr r="0" g="0" b="0"/>
-      </a:effectRef>
-      <a:fontRef idx="minor">
-        <a:schemeClr val="lt1"/>
-      </a:fontRef>
-    </dgm:style>
-  </dgm:styleLbl>
-  <dgm:styleLbl name="node3">
-    <dgm:scene3d>
-      <a:camera prst="orthographicFront"/>
-      <a:lightRig rig="threePt" dir="t"/>
-    </dgm:scene3d>
-    <dgm:sp3d/>
-    <dgm:txPr/>
-    <dgm:style>
-      <a:lnRef idx="3">
-        <a:scrgbClr r="0" g="0" b="0"/>
-      </a:lnRef>
-      <a:fillRef idx="1">
-        <a:scrgbClr r="0" g="0" b="0"/>
-      </a:fillRef>
-      <a:effectRef idx="1">
-        <a:scrgbClr r="0" g="0" b="0"/>
-      </a:effectRef>
-      <a:fontRef idx="minor">
-        <a:schemeClr val="lt1"/>
-      </a:fontRef>
-    </dgm:style>
-  </dgm:styleLbl>
-  <dgm:styleLbl name="node4">
-    <dgm:scene3d>
-      <a:camera prst="orthographicFront"/>
-      <a:lightRig rig="threePt" dir="t"/>
-    </dgm:scene3d>
-    <dgm:sp3d/>
-    <dgm:txPr/>
-    <dgm:style>
-      <a:lnRef idx="3">
-        <a:scrgbClr r="0" g="0" b="0"/>
-      </a:lnRef>
-      <a:fillRef idx="1">
-        <a:scrgbClr r="0" g="0" b="0"/>
-      </a:fillRef>
-      <a:effectRef idx="1">
-        <a:scrgbClr r="0" g="0" b="0"/>
-      </a:effectRef>
-      <a:fontRef idx="minor">
-        <a:schemeClr val="lt1"/>
-      </a:fontRef>
-    </dgm:style>
-  </dgm:styleLbl>
-  <dgm:styleLbl name="fgImgPlace1">
-    <dgm:scene3d>
-      <a:camera prst="orthographicFront"/>
-      <a:lightRig rig="threePt" dir="t"/>
-    </dgm:scene3d>
-    <dgm:sp3d/>
-    <dgm:txPr/>
-    <dgm:style>
-      <a:lnRef idx="3">
-        <a:scrgbClr r="0" g="0" b="0"/>
-      </a:lnRef>
-      <a:fillRef idx="1">
-        <a:scrgbClr r="0" g="0" b="0"/>
-      </a:fillRef>
-      <a:effectRef idx="1">
-        <a:scrgbClr r="0" g="0" b="0"/>
-      </a:effectRef>
-      <a:fontRef idx="minor"/>
-    </dgm:style>
-  </dgm:styleLbl>
-  <dgm:styleLbl name="alignImgPlace1">
-    <dgm:scene3d>
-      <a:camera prst="orthographicFront"/>
-      <a:lightRig rig="threePt" dir="t"/>
-    </dgm:scene3d>
-    <dgm:sp3d/>
-    <dgm:txPr/>
-    <dgm:style>
-      <a:lnRef idx="3">
-        <a:scrgbClr r="0" g="0" b="0"/>
-      </a:lnRef>
-      <a:fillRef idx="1">
-        <a:scrgbClr r="0" g="0" b="0"/>
-      </a:fillRef>
-      <a:effectRef idx="1">
-        <a:scrgbClr r="0" g="0" b="0"/>
-      </a:effectRef>
-      <a:fontRef idx="minor"/>
-    </dgm:style>
-  </dgm:styleLbl>
-  <dgm:styleLbl name="bgImgPlace1">
-    <dgm:scene3d>
-      <a:camera prst="orthographicFront"/>
-      <a:lightRig rig="threePt" dir="t"/>
-    </dgm:scene3d>
-    <dgm:sp3d/>
-    <dgm:txPr/>
-    <dgm:style>
-      <a:lnRef idx="3">
-        <a:scrgbClr r="0" g="0" b="0"/>
-      </a:lnRef>
-      <a:fillRef idx="1">
-        <a:scrgbClr r="0" g="0" b="0"/>
-      </a:fillRef>
-      <a:effectRef idx="1">
-        <a:scrgbClr r="0" g="0" b="0"/>
-      </a:effectRef>
-      <a:fontRef idx="minor"/>
-    </dgm:style>
-  </dgm:styleLbl>
-  <dgm:styleLbl name="sibTrans2D1">
-    <dgm:scene3d>
-      <a:camera prst="orthographicFront"/>
-      <a:lightRig rig="threePt" dir="t"/>
-    </dgm:scene3d>
-    <dgm:sp3d/>
-    <dgm:txPr/>
-    <dgm:style>
-      <a:lnRef idx="0">
-        <a:scrgbClr r="0" g="0" b="0"/>
-      </a:lnRef>
-      <a:fillRef idx="1">
-        <a:scrgbClr r="0" g="0" b="0"/>
-      </a:fillRef>
-      <a:effectRef idx="1">
-        <a:scrgbClr r="0" g="0" b="0"/>
-      </a:effectRef>
-      <a:fontRef idx="minor">
-        <a:schemeClr val="lt1"/>
-      </a:fontRef>
-    </dgm:style>
-  </dgm:styleLbl>
-  <dgm:styleLbl name="fgSibTrans2D1">
-    <dgm:scene3d>
-      <a:camera prst="orthographicFront"/>
-      <a:lightRig rig="threePt" dir="t"/>
-    </dgm:scene3d>
-    <dgm:sp3d/>
-    <dgm:txPr/>
-    <dgm:style>
-      <a:lnRef idx="0">
-        <a:scrgbClr r="0" g="0" b="0"/>
-      </a:lnRef>
-      <a:fillRef idx="1">
-        <a:scrgbClr r="0" g="0" b="0"/>
-      </a:fillRef>
-      <a:effectRef idx="1">
-        <a:scrgbClr r="0" g="0" b="0"/>
-      </a:effectRef>
-      <a:fontRef idx="minor">
-        <a:schemeClr val="lt1"/>
-      </a:fontRef>
-    </dgm:style>
-  </dgm:styleLbl>
-  <dgm:styleLbl name="bgSibTrans2D1">
-    <dgm:scene3d>
-      <a:camera prst="orthographicFront"/>
-      <a:lightRig rig="threePt" dir="t"/>
-    </dgm:scene3d>
-    <dgm:sp3d/>
-    <dgm:txPr/>
-    <dgm:style>
-      <a:lnRef idx="0">
-        <a:scrgbClr r="0" g="0" b="0"/>
-      </a:lnRef>
-      <a:fillRef idx="1">
-        <a:scrgbClr r="0" g="0" b="0"/>
-      </a:fillRef>
-      <a:effectRef idx="1">
-        <a:scrgbClr r="0" g="0" b="0"/>
-      </a:effectRef>
-      <a:fontRef idx="minor">
-        <a:schemeClr val="lt1"/>
-      </a:fontRef>
-    </dgm:style>
-  </dgm:styleLbl>
-  <dgm:styleLbl name="sibTrans1D1">
-    <dgm:scene3d>
-      <a:camera prst="orthographicFront"/>
-      <a:lightRig rig="threePt" dir="t"/>
-    </dgm:scene3d>
-    <dgm:sp3d/>
-    <dgm:txPr/>
-    <dgm:style>
-      <a:lnRef idx="1">
-        <a:scrgbClr r="0" g="0" b="0"/>
-      </a:lnRef>
-      <a:fillRef idx="0">
-        <a:scrgbClr r="0" g="0" b="0"/>
-      </a:fillRef>
-      <a:effectRef idx="0">
-        <a:scrgbClr r="0" g="0" b="0"/>
-      </a:effectRef>
-      <a:fontRef idx="minor"/>
-    </dgm:style>
-  </dgm:styleLbl>
-  <dgm:styleLbl name="callout">
-    <dgm:scene3d>
-      <a:camera prst="orthographicFront"/>
-      <a:lightRig rig="threePt" dir="t"/>
-    </dgm:scene3d>
-    <dgm:sp3d/>
-    <dgm:txPr/>
-    <dgm:style>
-      <a:lnRef idx="2">
-        <a:scrgbClr r="0" g="0" b="0"/>
-      </a:lnRef>
-      <a:fillRef idx="1">
-        <a:scrgbClr r="0" g="0" b="0"/>
-      </a:fillRef>
-      <a:effectRef idx="1">
-        <a:scrgbClr r="0" g="0" b="0"/>
-      </a:effectRef>
-      <a:fontRef idx="minor"/>
-    </dgm:style>
-  </dgm:styleLbl>
-  <dgm:styleLbl name="asst0">
-    <dgm:scene3d>
-      <a:camera prst="orthographicFront"/>
-      <a:lightRig rig="threePt" dir="t"/>
-    </dgm:scene3d>
-    <dgm:sp3d/>
-    <dgm:txPr/>
-    <dgm:style>
-      <a:lnRef idx="3">
-        <a:scrgbClr r="0" g="0" b="0"/>
-      </a:lnRef>
-      <a:fillRef idx="1">
-        <a:scrgbClr r="0" g="0" b="0"/>
-      </a:fillRef>
-      <a:effectRef idx="1">
-        <a:scrgbClr r="0" g="0" b="0"/>
-      </a:effectRef>
-      <a:fontRef idx="minor">
-        <a:schemeClr val="lt1"/>
-      </a:fontRef>
-    </dgm:style>
-  </dgm:styleLbl>
-  <dgm:styleLbl name="asst1">
-    <dgm:scene3d>
-      <a:camera prst="orthographicFront"/>
-      <a:lightRig rig="threePt" dir="t"/>
-    </dgm:scene3d>
-    <dgm:sp3d/>
-    <dgm:txPr/>
-    <dgm:style>
-      <a:lnRef idx="3">
-        <a:scrgbClr r="0" g="0" b="0"/>
-      </a:lnRef>
-      <a:fillRef idx="1">
-        <a:scrgbClr r="0" g="0" b="0"/>
-      </a:fillRef>
-      <a:effectRef idx="1">
-        <a:scrgbClr r="0" g="0" b="0"/>
-      </a:effectRef>
-      <a:fontRef idx="minor">
-        <a:schemeClr val="lt1"/>
-      </a:fontRef>
-    </dgm:style>
-  </dgm:styleLbl>
-  <dgm:styleLbl name="asst2">
-    <dgm:scene3d>
-      <a:camera prst="orthographicFront"/>
-      <a:lightRig rig="threePt" dir="t"/>
-    </dgm:scene3d>
-    <dgm:sp3d/>
-    <dgm:txPr/>
-    <dgm:style>
-      <a:lnRef idx="3">
-        <a:scrgbClr r="0" g="0" b="0"/>
-      </a:lnRef>
-      <a:fillRef idx="1">
-        <a:scrgbClr r="0" g="0" b="0"/>
-      </a:fillRef>
-      <a:effectRef idx="1">
-        <a:scrgbClr r="0" g="0" b="0"/>
-      </a:effectRef>
-      <a:fontRef idx="minor">
-        <a:schemeClr val="lt1"/>
-      </a:fontRef>
-    </dgm:style>
-  </dgm:styleLbl>
-  <dgm:styleLbl name="asst3">
-    <dgm:scene3d>
-      <a:camera prst="orthographicFront"/>
-      <a:lightRig rig="threePt" dir="t"/>
-    </dgm:scene3d>
-    <dgm:sp3d/>
-    <dgm:txPr/>
-    <dgm:style>
-      <a:lnRef idx="3">
-        <a:scrgbClr r="0" g="0" b="0"/>
-      </a:lnRef>
-      <a:fillRef idx="1">
-        <a:scrgbClr r="0" g="0" b="0"/>
-      </a:fillRef>
-      <a:effectRef idx="1">
-        <a:scrgbClr r="0" g="0" b="0"/>
-      </a:effectRef>
-      <a:fontRef idx="minor">
-        <a:schemeClr val="lt1"/>
-      </a:fontRef>
-    </dgm:style>
-  </dgm:styleLbl>
-  <dgm:styleLbl name="asst4">
-    <dgm:scene3d>
-      <a:camera prst="orthographicFront"/>
-      <a:lightRig rig="threePt" dir="t"/>
-    </dgm:scene3d>
-    <dgm:sp3d/>
-    <dgm:txPr/>
-    <dgm:style>
-      <a:lnRef idx="3">
-        <a:scrgbClr r="0" g="0" b="0"/>
-      </a:lnRef>
-      <a:fillRef idx="1">
-        <a:scrgbClr r="0" g="0" b="0"/>
-      </a:fillRef>
-      <a:effectRef idx="1">
-        <a:scrgbClr r="0" g="0" b="0"/>
-      </a:effectRef>
-      <a:fontRef idx="minor">
-        <a:schemeClr val="lt1"/>
-      </a:fontRef>
-    </dgm:style>
-  </dgm:styleLbl>
-  <dgm:styleLbl name="parChTrans2D1">
-    <dgm:scene3d>
-      <a:camera prst="orthographicFront"/>
-      <a:lightRig rig="threePt" dir="t"/>
-    </dgm:scene3d>
-    <dgm:sp3d/>
-    <dgm:txPr/>
-    <dgm:style>
-      <a:lnRef idx="3">
-        <a:scrgbClr r="0" g="0" b="0"/>
-      </a:lnRef>
-      <a:fillRef idx="1">
-        <a:scrgbClr r="0" g="0" b="0"/>
-      </a:fillRef>
-      <a:effectRef idx="1">
-        <a:scrgbClr r="0" g="0" b="0"/>
-      </a:effectRef>
-      <a:fontRef idx="minor">
-        <a:schemeClr val="lt1"/>
-      </a:fontRef>
-    </dgm:style>
-  </dgm:styleLbl>
-  <dgm:styleLbl name="parChTrans2D2">
-    <dgm:scene3d>
-      <a:camera prst="orthographicFront"/>
-      <a:lightRig rig="threePt" dir="t"/>
-    </dgm:scene3d>
-    <dgm:sp3d/>
-    <dgm:txPr/>
-    <dgm:style>
-      <a:lnRef idx="3">
-        <a:scrgbClr r="0" g="0" b="0"/>
-      </a:lnRef>
-      <a:fillRef idx="1">
-        <a:scrgbClr r="0" g="0" b="0"/>
-      </a:fillRef>
-      <a:effectRef idx="1">
-        <a:scrgbClr r="0" g="0" b="0"/>
-      </a:effectRef>
-      <a:fontRef idx="minor">
-        <a:schemeClr val="lt1"/>
-      </a:fontRef>
-    </dgm:style>
-  </dgm:styleLbl>
-  <dgm:styleLbl name="parChTrans2D3">
-    <dgm:scene3d>
-      <a:camera prst="orthographicFront"/>
-      <a:lightRig rig="threePt" dir="t"/>
-    </dgm:scene3d>
-    <dgm:sp3d/>
-    <dgm:txPr/>
-    <dgm:style>
-      <a:lnRef idx="3">
-        <a:scrgbClr r="0" g="0" b="0"/>
-      </a:lnRef>
-      <a:fillRef idx="1">
-        <a:scrgbClr r="0" g="0" b="0"/>
-      </a:fillRef>
-      <a:effectRef idx="1">
-        <a:scrgbClr r="0" g="0" b="0"/>
-      </a:effectRef>
-      <a:fontRef idx="minor">
-        <a:schemeClr val="lt1"/>
-      </a:fontRef>
-    </dgm:style>
-  </dgm:styleLbl>
-  <dgm:styleLbl name="parChTrans2D4">
-    <dgm:scene3d>
-      <a:camera prst="orthographicFront"/>
-      <a:lightRig rig="threePt" dir="t"/>
-    </dgm:scene3d>
-    <dgm:sp3d/>
-    <dgm:txPr/>
-    <dgm:style>
-      <a:lnRef idx="3">
-        <a:scrgbClr r="0" g="0" b="0"/>
-      </a:lnRef>
-      <a:fillRef idx="1">
-        <a:scrgbClr r="0" g="0" b="0"/>
-      </a:fillRef>
-      <a:effectRef idx="1">
-        <a:scrgbClr r="0" g="0" b="0"/>
-      </a:effectRef>
-      <a:fontRef idx="minor">
-        <a:schemeClr val="lt1"/>
-      </a:fontRef>
-    </dgm:style>
-  </dgm:styleLbl>
-  <dgm:styleLbl name="parChTrans1D1">
-    <dgm:scene3d>
-      <a:camera prst="orthographicFront"/>
-      <a:lightRig rig="threePt" dir="t"/>
-    </dgm:scene3d>
-    <dgm:sp3d/>
-    <dgm:txPr/>
-    <dgm:style>
-      <a:lnRef idx="2">
-        <a:scrgbClr r="0" g="0" b="0"/>
-      </a:lnRef>
-      <a:fillRef idx="0">
-        <a:scrgbClr r="0" g="0" b="0"/>
-      </a:fillRef>
-      <a:effectRef idx="0">
-        <a:scrgbClr r="0" g="0" b="0"/>
-      </a:effectRef>
-      <a:fontRef idx="minor"/>
-    </dgm:style>
-  </dgm:styleLbl>
-  <dgm:styleLbl name="parChTrans1D2">
-    <dgm:scene3d>
-      <a:camera prst="orthographicFront"/>
-      <a:lightRig rig="threePt" dir="t"/>
-    </dgm:scene3d>
-    <dgm:sp3d/>
-    <dgm:txPr/>
-    <dgm:style>
-      <a:lnRef idx="2">
-        <a:scrgbClr r="0" g="0" b="0"/>
-      </a:lnRef>
-      <a:fillRef idx="0">
-        <a:scrgbClr r="0" g="0" b="0"/>
-      </a:fillRef>
-      <a:effectRef idx="0">
-        <a:scrgbClr r="0" g="0" b="0"/>
-      </a:effectRef>
-      <a:fontRef idx="minor"/>
-    </dgm:style>
-  </dgm:styleLbl>
-  <dgm:styleLbl name="parChTrans1D3">
-    <dgm:scene3d>
-      <a:camera prst="orthographicFront"/>
-      <a:lightRig rig="threePt" dir="t"/>
-    </dgm:scene3d>
-    <dgm:sp3d/>
-    <dgm:txPr/>
-    <dgm:style>
-      <a:lnRef idx="2">
-        <a:scrgbClr r="0" g="0" b="0"/>
-      </a:lnRef>
-      <a:fillRef idx="0">
-        <a:scrgbClr r="0" g="0" b="0"/>
-      </a:fillRef>
-      <a:effectRef idx="0">
-        <a:scrgbClr r="0" g="0" b="0"/>
-      </a:effectRef>
-      <a:fontRef idx="minor"/>
-    </dgm:style>
-  </dgm:styleLbl>
-  <dgm:styleLbl name="parChTrans1D4">
-    <dgm:scene3d>
-      <a:camera prst="orthographicFront"/>
-      <a:lightRig rig="threePt" dir="t"/>
-    </dgm:scene3d>
-    <dgm:sp3d/>
-    <dgm:txPr/>
-    <dgm:style>
-      <a:lnRef idx="2">
-        <a:scrgbClr r="0" g="0" b="0"/>
-      </a:lnRef>
-      <a:fillRef idx="0">
-        <a:scrgbClr r="0" g="0" b="0"/>
-      </a:fillRef>
-      <a:effectRef idx="0">
-        <a:scrgbClr r="0" g="0" b="0"/>
-      </a:effectRef>
-      <a:fontRef idx="minor"/>
-    </dgm:style>
-  </dgm:styleLbl>
-  <dgm:styleLbl name="fgAcc1">
-    <dgm:scene3d>
-      <a:camera prst="orthographicFront"/>
-      <a:lightRig rig="threePt" dir="t"/>
-    </dgm:scene3d>
-    <dgm:sp3d/>
-    <dgm:txPr/>
-    <dgm:style>
-      <a:lnRef idx="2">
-        <a:scrgbClr r="0" g="0" b="0"/>
-      </a:lnRef>
-      <a:fillRef idx="1">
-        <a:scrgbClr r="0" g="0" b="0"/>
-      </a:fillRef>
-      <a:effectRef idx="0">
-        <a:scrgbClr r="0" g="0" b="0"/>
-      </a:effectRef>
-      <a:fontRef idx="minor"/>
-    </dgm:style>
-  </dgm:styleLbl>
-  <dgm:styleLbl name="conFgAcc1">
-    <dgm:scene3d>
-      <a:camera prst="orthographicFront"/>
-      <a:lightRig rig="threePt" dir="t"/>
-    </dgm:scene3d>
-    <dgm:sp3d/>
-    <dgm:txPr/>
-    <dgm:style>
-      <a:lnRef idx="2">
-        <a:scrgbClr r="0" g="0" b="0"/>
-      </a:lnRef>
-      <a:fillRef idx="1">
-        <a:scrgbClr r="0" g="0" b="0"/>
-      </a:fillRef>
-      <a:effectRef idx="0">
-        <a:scrgbClr r="0" g="0" b="0"/>
-      </a:effectRef>
-      <a:fontRef idx="minor"/>
-    </dgm:style>
-  </dgm:styleLbl>
-  <dgm:styleLbl name="alignAcc1">
-    <dgm:scene3d>
-      <a:camera prst="orthographicFront"/>
-      <a:lightRig rig="threePt" dir="t"/>
-    </dgm:scene3d>
-    <dgm:sp3d/>
-    <dgm:txPr/>
-    <dgm:style>
-      <a:lnRef idx="2">
-        <a:scrgbClr r="0" g="0" b="0"/>
-      </a:lnRef>
-      <a:fillRef idx="1">
-        <a:scrgbClr r="0" g="0" b="0"/>
-      </a:fillRef>
-      <a:effectRef idx="0">
-        <a:scrgbClr r="0" g="0" b="0"/>
-      </a:effectRef>
-      <a:fontRef idx="minor"/>
-    </dgm:style>
-  </dgm:styleLbl>
-  <dgm:styleLbl name="trAlignAcc1">
-    <dgm:scene3d>
-      <a:camera prst="orthographicFront"/>
-      <a:lightRig rig="threePt" dir="t"/>
-    </dgm:scene3d>
-    <dgm:sp3d/>
-    <dgm:txPr/>
-    <dgm:style>
-      <a:lnRef idx="1">
-        <a:scrgbClr r="0" g="0" b="0"/>
-      </a:lnRef>
-      <a:fillRef idx="1">
-        <a:scrgbClr r="0" g="0" b="0"/>
-      </a:fillRef>
-      <a:effectRef idx="0">
-        <a:scrgbClr r="0" g="0" b="0"/>
-      </a:effectRef>
-      <a:fontRef idx="minor"/>
-    </dgm:style>
-  </dgm:styleLbl>
-  <dgm:styleLbl name="bgAcc1">
-    <dgm:scene3d>
-      <a:camera prst="orthographicFront"/>
-      <a:lightRig rig="threePt" dir="t"/>
-    </dgm:scene3d>
-    <dgm:sp3d/>
-    <dgm:txPr/>
-    <dgm:style>
-      <a:lnRef idx="2">
-        <a:scrgbClr r="0" g="0" b="0"/>
-      </a:lnRef>
-      <a:fillRef idx="1">
-        <a:scrgbClr r="0" g="0" b="0"/>
-      </a:fillRef>
-      <a:effectRef idx="0">
-        <a:scrgbClr r="0" g="0" b="0"/>
-      </a:effectRef>
-      <a:fontRef idx="minor"/>
-    </dgm:style>
-  </dgm:styleLbl>
-  <dgm:styleLbl name="solidFgAcc1">
-    <dgm:scene3d>
-      <a:camera prst="orthographicFront"/>
-      <a:lightRig rig="threePt" dir="t"/>
-    </dgm:scene3d>
-    <dgm:sp3d/>
-    <dgm:txPr/>
-    <dgm:style>
-      <a:lnRef idx="2">
-        <a:scrgbClr r="0" g="0" b="0"/>
-      </a:lnRef>
-      <a:fillRef idx="1">
-        <a:scrgbClr r="0" g="0" b="0"/>
-      </a:fillRef>
-      <a:effectRef idx="0">
-        <a:scrgbClr r="0" g="0" b="0"/>
-      </a:effectRef>
-      <a:fontRef idx="minor"/>
-    </dgm:style>
-  </dgm:styleLbl>
-  <dgm:styleLbl name="solidAlignAcc1">
-    <dgm:scene3d>
-      <a:camera prst="orthographicFront"/>
-      <a:lightRig rig="threePt" dir="t"/>
-    </dgm:scene3d>
-    <dgm:sp3d/>
-    <dgm:txPr/>
-    <dgm:style>
-      <a:lnRef idx="2">
-        <a:scrgbClr r="0" g="0" b="0"/>
-      </a:lnRef>
-      <a:fillRef idx="1">
-        <a:scrgbClr r="0" g="0" b="0"/>
-      </a:fillRef>
-      <a:effectRef idx="0">
-        <a:scrgbClr r="0" g="0" b="0"/>
-      </a:effectRef>
-      <a:fontRef idx="minor"/>
-    </dgm:style>
-  </dgm:styleLbl>
-  <dgm:styleLbl name="solidBgAcc1">
-    <dgm:scene3d>
-      <a:camera prst="orthographicFront"/>
-      <a:lightRig rig="threePt" dir="t"/>
-    </dgm:scene3d>
-    <dgm:sp3d/>
-    <dgm:txPr/>
-    <dgm:style>
-      <a:lnRef idx="2">
-        <a:scrgbClr r="0" g="0" b="0"/>
-      </a:lnRef>
-      <a:fillRef idx="1">
-        <a:scrgbClr r="0" g="0" b="0"/>
-      </a:fillRef>
-      <a:effectRef idx="0">
-        <a:scrgbClr r="0" g="0" b="0"/>
-      </a:effectRef>
-      <a:fontRef idx="minor"/>
-    </dgm:style>
-  </dgm:styleLbl>
-  <dgm:styleLbl name="fgAccFollowNode1">
-    <dgm:scene3d>
-      <a:camera prst="orthographicFront"/>
-      <a:lightRig rig="threePt" dir="t"/>
-    </dgm:scene3d>
-    <dgm:sp3d/>
-    <dgm:txPr/>
-    <dgm:style>
-      <a:lnRef idx="2">
-        <a:scrgbClr r="0" g="0" b="0"/>
-      </a:lnRef>
-      <a:fillRef idx="1">
-        <a:scrgbClr r="0" g="0" b="0"/>
-      </a:fillRef>
-      <a:effectRef idx="0">
-        <a:scrgbClr r="0" g="0" b="0"/>
-      </a:effectRef>
-      <a:fontRef idx="minor"/>
-    </dgm:style>
-  </dgm:styleLbl>
-  <dgm:styleLbl name="alignAccFollowNode1">
-    <dgm:scene3d>
-      <a:camera prst="orthographicFront"/>
-      <a:lightRig rig="threePt" dir="t"/>
-    </dgm:scene3d>
-    <dgm:sp3d/>
-    <dgm:txPr/>
-    <dgm:style>
-      <a:lnRef idx="2">
-        <a:scrgbClr r="0" g="0" b="0"/>
-      </a:lnRef>
-      <a:fillRef idx="1">
-        <a:scrgbClr r="0" g="0" b="0"/>
-      </a:fillRef>
-      <a:effectRef idx="0">
-        <a:scrgbClr r="0" g="0" b="0"/>
-      </a:effectRef>
-      <a:fontRef idx="minor"/>
-    </dgm:style>
-  </dgm:styleLbl>
-  <dgm:styleLbl name="bgAccFollowNode1">
-    <dgm:scene3d>
-      <a:camera prst="orthographicFront"/>
-      <a:lightRig rig="threePt" dir="t"/>
-    </dgm:scene3d>
-    <dgm:sp3d/>
-    <dgm:txPr/>
-    <dgm:style>
-      <a:lnRef idx="2">
-        <a:scrgbClr r="0" g="0" b="0"/>
-      </a:lnRef>
-      <a:fillRef idx="1">
-        <a:scrgbClr r="0" g="0" b="0"/>
-      </a:fillRef>
-      <a:effectRef idx="0">
-        <a:scrgbClr r="0" g="0" b="0"/>
-      </a:effectRef>
-      <a:fontRef idx="minor"/>
-    </dgm:style>
-  </dgm:styleLbl>
-  <dgm:styleLbl name="fgAcc0">
-    <dgm:scene3d>
-      <a:camera prst="orthographicFront"/>
-      <a:lightRig rig="threePt" dir="t"/>
-    </dgm:scene3d>
-    <dgm:sp3d/>
-    <dgm:txPr/>
-    <dgm:style>
-      <a:lnRef idx="2">
-        <a:scrgbClr r="0" g="0" b="0"/>
-      </a:lnRef>
-      <a:fillRef idx="1">
-        <a:scrgbClr r="0" g="0" b="0"/>
-      </a:fillRef>
-      <a:effectRef idx="0">
-        <a:scrgbClr r="0" g="0" b="0"/>
-      </a:effectRef>
-      <a:fontRef idx="minor"/>
-    </dgm:style>
-  </dgm:styleLbl>
-  <dgm:styleLbl name="fgAcc2">
-    <dgm:scene3d>
-      <a:camera prst="orthographicFront"/>
-      <a:lightRig rig="threePt" dir="t"/>
-    </dgm:scene3d>
-    <dgm:sp3d/>
-    <dgm:txPr/>
-    <dgm:style>
-      <a:lnRef idx="2">
-        <a:scrgbClr r="0" g="0" b="0"/>
-      </a:lnRef>
-      <a:fillRef idx="1">
-        <a:scrgbClr r="0" g="0" b="0"/>
-      </a:fillRef>
-      <a:effectRef idx="0">
-        <a:scrgbClr r="0" g="0" b="0"/>
-      </a:effectRef>
-      <a:fontRef idx="minor"/>
-    </dgm:style>
-  </dgm:styleLbl>
-  <dgm:styleLbl name="fgAcc3">
-    <dgm:scene3d>
-      <a:camera prst="orthographicFront"/>
-      <a:lightRig rig="threePt" dir="t"/>
-    </dgm:scene3d>
-    <dgm:sp3d/>
-    <dgm:txPr/>
-    <dgm:style>
-      <a:lnRef idx="2">
-        <a:scrgbClr r="0" g="0" b="0"/>
-      </a:lnRef>
-      <a:fillRef idx="1">
-        <a:scrgbClr r="0" g="0" b="0"/>
-      </a:fillRef>
-      <a:effectRef idx="0">
-        <a:scrgbClr r="0" g="0" b="0"/>
-      </a:effectRef>
-      <a:fontRef idx="minor"/>
-    </dgm:style>
-  </dgm:styleLbl>
-  <dgm:styleLbl name="fgAcc4">
-    <dgm:scene3d>
-      <a:camera prst="orthographicFront"/>
-      <a:lightRig rig="threePt" dir="t"/>
-    </dgm:scene3d>
-    <dgm:sp3d/>
-    <dgm:txPr/>
-    <dgm:style>
-      <a:lnRef idx="2">
-        <a:scrgbClr r="0" g="0" b="0"/>
-      </a:lnRef>
-      <a:fillRef idx="1">
-        <a:scrgbClr r="0" g="0" b="0"/>
-      </a:fillRef>
-      <a:effectRef idx="0">
-        <a:scrgbClr r="0" g="0" b="0"/>
-      </a:effectRef>
-      <a:fontRef idx="minor"/>
-    </dgm:style>
-  </dgm:styleLbl>
-  <dgm:styleLbl name="bgShp">
-    <dgm:scene3d>
-      <a:camera prst="orthographicFront"/>
-      <a:lightRig rig="threePt" dir="t"/>
-    </dgm:scene3d>
-    <dgm:sp3d/>
-    <dgm:txPr/>
-    <dgm:style>
-      <a:lnRef idx="0">
-        <a:scrgbClr r="0" g="0" b="0"/>
-      </a:lnRef>
-      <a:fillRef idx="1">
-        <a:scrgbClr r="0" g="0" b="0"/>
-      </a:fillRef>
-      <a:effectRef idx="0">
-        <a:scrgbClr r="0" g="0" b="0"/>
-      </a:effectRef>
-      <a:fontRef idx="minor"/>
-    </dgm:style>
-  </dgm:styleLbl>
-  <dgm:styleLbl name="dkBgShp">
-    <dgm:scene3d>
-      <a:camera prst="orthographicFront"/>
-      <a:lightRig rig="threePt" dir="t"/>
-    </dgm:scene3d>
-    <dgm:sp3d/>
-    <dgm:txPr/>
-    <dgm:style>
-      <a:lnRef idx="0">
-        <a:scrgbClr r="0" g="0" b="0"/>
-      </a:lnRef>
-      <a:fillRef idx="1">
-        <a:scrgbClr r="0" g="0" b="0"/>
-      </a:fillRef>
-      <a:effectRef idx="0">
-        <a:scrgbClr r="0" g="0" b="0"/>
-      </a:effectRef>
-      <a:fontRef idx="minor"/>
-    </dgm:style>
-  </dgm:styleLbl>
-  <dgm:styleLbl name="trBgShp">
-    <dgm:scene3d>
-      <a:camera prst="orthographicFront"/>
-      <a:lightRig rig="threePt" dir="t"/>
-    </dgm:scene3d>
-    <dgm:sp3d/>
-    <dgm:txPr/>
-    <dgm:style>
-      <a:lnRef idx="0">
-        <a:scrgbClr r="0" g="0" b="0"/>
-      </a:lnRef>
-      <a:fillRef idx="1">
-        <a:scrgbClr r="0" g="0" b="0"/>
-      </a:fillRef>
-      <a:effectRef idx="0">
-        <a:scrgbClr r="0" g="0" b="0"/>
-      </a:effectRef>
-      <a:fontRef idx="minor"/>
-    </dgm:style>
-  </dgm:styleLbl>
-  <dgm:styleLbl name="fgShp">
-    <dgm:scene3d>
-      <a:camera prst="orthographicFront"/>
-      <a:lightRig rig="threePt" dir="t"/>
-    </dgm:scene3d>
-    <dgm:sp3d/>
-    <dgm:txPr/>
-    <dgm:style>
-      <a:lnRef idx="3">
-        <a:scrgbClr r="0" g="0" b="0"/>
-      </a:lnRef>
-      <a:fillRef idx="1">
-        <a:scrgbClr r="0" g="0" b="0"/>
-      </a:fillRef>
-      <a:effectRef idx="1">
         <a:scrgbClr r="0" g="0" b="0"/>
       </a:effectRef>
       <a:fontRef idx="minor"/>
@@ -22965,7 +19947,7 @@
           <a:p>
             <a:fld id="{53C8A9ED-E5A3-4A3E-819B-E4A93EDD4C8F}" type="datetimeFigureOut">
               <a:rPr lang="en-US" smtClean="0"/>
-              <a:t>7/18/2020</a:t>
+              <a:t>7/19/2020</a:t>
             </a:fld>
             <a:endParaRPr lang="en-US"/>
           </a:p>
@@ -23230,6 +20212,90 @@
     </a:lvl9pPr>
   </p:notesStyle>
 </p:notesMaster>
+</file>
+
+<file path=ppt/notesSlides/notesSlide1.xml><?xml version="1.0" encoding="utf-8"?>
+<p:notes xmlns:a="http://schemas.openxmlformats.org/drawingml/2006/main" xmlns:r="http://schemas.openxmlformats.org/officeDocument/2006/relationships" xmlns:p="http://schemas.openxmlformats.org/presentationml/2006/main">
+  <p:cSld>
+    <p:spTree>
+      <p:nvGrpSpPr>
+        <p:cNvPr id="1" name=""/>
+        <p:cNvGrpSpPr/>
+        <p:nvPr/>
+      </p:nvGrpSpPr>
+      <p:grpSpPr>
+        <a:xfrm>
+          <a:off x="0" y="0"/>
+          <a:ext cx="0" cy="0"/>
+          <a:chOff x="0" y="0"/>
+          <a:chExt cx="0" cy="0"/>
+        </a:xfrm>
+      </p:grpSpPr>
+      <p:sp>
+        <p:nvSpPr>
+          <p:cNvPr id="2" name="Slide Image Placeholder 1"/>
+          <p:cNvSpPr>
+            <a:spLocks noGrp="1" noRot="1" noChangeAspect="1"/>
+          </p:cNvSpPr>
+          <p:nvPr>
+            <p:ph type="sldImg"/>
+          </p:nvPr>
+        </p:nvSpPr>
+        <p:spPr/>
+      </p:sp>
+      <p:sp>
+        <p:nvSpPr>
+          <p:cNvPr id="3" name="Notes Placeholder 2"/>
+          <p:cNvSpPr>
+            <a:spLocks noGrp="1"/>
+          </p:cNvSpPr>
+          <p:nvPr>
+            <p:ph type="body" idx="1"/>
+          </p:nvPr>
+        </p:nvSpPr>
+        <p:spPr/>
+        <p:txBody>
+          <a:bodyPr/>
+          <a:lstStyle/>
+          <a:p>
+            <a:endParaRPr lang="en-US" dirty="0"/>
+          </a:p>
+        </p:txBody>
+      </p:sp>
+      <p:sp>
+        <p:nvSpPr>
+          <p:cNvPr id="4" name="Slide Number Placeholder 3"/>
+          <p:cNvSpPr>
+            <a:spLocks noGrp="1"/>
+          </p:cNvSpPr>
+          <p:nvPr>
+            <p:ph type="sldNum" sz="quarter" idx="5"/>
+          </p:nvPr>
+        </p:nvSpPr>
+        <p:spPr/>
+        <p:txBody>
+          <a:bodyPr/>
+          <a:lstStyle/>
+          <a:p>
+            <a:fld id="{406993F6-C97E-4A5F-9390-66732356FFCF}" type="slidenum">
+              <a:rPr lang="en-US" smtClean="0"/>
+              <a:t>17</a:t>
+            </a:fld>
+            <a:endParaRPr lang="en-US"/>
+          </a:p>
+        </p:txBody>
+      </p:sp>
+    </p:spTree>
+    <p:extLst>
+      <p:ext uri="{BB962C8B-B14F-4D97-AF65-F5344CB8AC3E}">
+        <p14:creationId xmlns:p14="http://schemas.microsoft.com/office/powerpoint/2010/main" val="1257658896"/>
+      </p:ext>
+    </p:extLst>
+  </p:cSld>
+  <p:clrMapOvr>
+    <a:masterClrMapping/>
+  </p:clrMapOvr>
+</p:notes>
 </file>
 
 <file path=ppt/slideLayouts/slideLayout1.xml><?xml version="1.0" encoding="utf-8"?>
@@ -23530,7 +20596,7 @@
           <a:p>
             <a:fld id="{1C40B874-E53C-42B9-98BA-0781B387246C}" type="datetime1">
               <a:rPr lang="en-US" smtClean="0"/>
-              <a:t>7/18/2020</a:t>
+              <a:t>7/19/2020</a:t>
             </a:fld>
             <a:endParaRPr lang="en-US" dirty="0"/>
           </a:p>
@@ -23729,7 +20795,7 @@
           <a:p>
             <a:fld id="{75D402F4-45D7-406A-9C33-75238E131A1E}" type="datetime1">
               <a:rPr lang="en-US" smtClean="0"/>
-              <a:t>7/18/2020</a:t>
+              <a:t>7/19/2020</a:t>
             </a:fld>
             <a:endParaRPr lang="en-US" dirty="0"/>
           </a:p>
@@ -23913,7 +20979,7 @@
           <a:p>
             <a:fld id="{4506E011-4F7D-42D0-82E1-078A40B76F01}" type="datetime1">
               <a:rPr lang="en-US" smtClean="0"/>
-              <a:t>7/18/2020</a:t>
+              <a:t>7/19/2020</a:t>
             </a:fld>
             <a:endParaRPr lang="en-US" dirty="0"/>
           </a:p>
@@ -24139,7 +21205,7 @@
           <a:p>
             <a:fld id="{3DA471FE-0FCC-47A4-B218-06AF00AFA70F}" type="datetime1">
               <a:rPr lang="en-US" smtClean="0"/>
-              <a:t>7/18/2020</a:t>
+              <a:t>7/19/2020</a:t>
             </a:fld>
             <a:endParaRPr lang="en-US" dirty="0"/>
           </a:p>
@@ -24446,7 +21512,7 @@
           <a:p>
             <a:fld id="{BE42C22A-A385-4013-8BC3-1C712ED98224}" type="datetime1">
               <a:rPr lang="en-US" smtClean="0"/>
-              <a:t>7/18/2020</a:t>
+              <a:t>7/19/2020</a:t>
             </a:fld>
             <a:endParaRPr lang="en-US" dirty="0"/>
           </a:p>
@@ -24900,7 +21966,7 @@
           <a:p>
             <a:fld id="{A4143CD7-DDC2-4E28-B80E-11B3368F8846}" type="datetime1">
               <a:rPr lang="en-US" smtClean="0"/>
-              <a:t>7/18/2020</a:t>
+              <a:t>7/19/2020</a:t>
             </a:fld>
             <a:endParaRPr lang="en-US" dirty="0"/>
           </a:p>
@@ -25033,7 +22099,7 @@
           <a:p>
             <a:fld id="{68882D6B-0F0F-41E5-8A0F-FC2D7E2110E0}" type="datetime1">
               <a:rPr lang="en-US" smtClean="0"/>
-              <a:t>7/18/2020</a:t>
+              <a:t>7/19/2020</a:t>
             </a:fld>
             <a:endParaRPr lang="en-US" dirty="0"/>
           </a:p>
@@ -25158,7 +22224,7 @@
           <a:p>
             <a:fld id="{399C1A38-D70F-41CF-857C-945C6FF6B07D}" type="datetime1">
               <a:rPr lang="en-US" smtClean="0"/>
-              <a:t>7/18/2020</a:t>
+              <a:t>7/19/2020</a:t>
             </a:fld>
             <a:endParaRPr lang="en-US" dirty="0"/>
           </a:p>
@@ -25516,7 +22582,7 @@
           <a:p>
             <a:fld id="{E32B96DC-D1E7-4668-A471-A46ECA2AE34F}" type="datetime1">
               <a:rPr lang="en-US" smtClean="0"/>
-              <a:t>7/18/2020</a:t>
+              <a:t>7/19/2020</a:t>
             </a:fld>
             <a:endParaRPr lang="en-US" dirty="0"/>
           </a:p>
@@ -26024,7 +23090,7 @@
           <a:p>
             <a:fld id="{CC444FFE-4BDB-4301-83D8-FE8B25E7CF5A}" type="datetime1">
               <a:rPr lang="en-US" smtClean="0"/>
-              <a:t>7/18/2020</a:t>
+              <a:t>7/19/2020</a:t>
             </a:fld>
             <a:endParaRPr lang="en-US" dirty="0"/>
           </a:p>
@@ -29400,7 +26466,7 @@
             </a:pPr>
             <a:r>
               <a:rPr lang="en-US" dirty="0"/>
-              <a:t>For product 3 and 4, percentage of positive reviews increased by ~20% and then decreased by ~15%</a:t>
+              <a:t>For product 3 and 5, percentage of positive reviews increased by ~20% and then decreased by ~15%</a:t>
             </a:r>
           </a:p>
           <a:p>
@@ -29438,6 +26504,198 @@
           </a:prstGeom>
         </p:spPr>
       </p:pic>
+      <p:sp>
+        <p:nvSpPr>
+          <p:cNvPr id="3" name="TextBox 2">
+            <a:extLst>
+              <a:ext uri="{FF2B5EF4-FFF2-40B4-BE49-F238E27FC236}">
+                <a16:creationId xmlns:a16="http://schemas.microsoft.com/office/drawing/2014/main" id="{E716183E-32E5-4063-A5A6-7C6242285285}"/>
+              </a:ext>
+            </a:extLst>
+          </p:cNvPr>
+          <p:cNvSpPr txBox="1"/>
+          <p:nvPr/>
+        </p:nvSpPr>
+        <p:spPr>
+          <a:xfrm>
+            <a:off x="5638800" y="2988365"/>
+            <a:ext cx="914400" cy="914400"/>
+          </a:xfrm>
+          <a:prstGeom prst="rect">
+            <a:avLst/>
+          </a:prstGeom>
+          <a:noFill/>
+        </p:spPr>
+        <p:txBody>
+          <a:bodyPr wrap="square" rtlCol="0">
+            <a:spAutoFit/>
+          </a:bodyPr>
+          <a:lstStyle/>
+          <a:p>
+            <a:endParaRPr lang="en-US" dirty="0"/>
+          </a:p>
+        </p:txBody>
+      </p:sp>
+      <p:sp>
+        <p:nvSpPr>
+          <p:cNvPr id="7" name="TextBox 6">
+            <a:extLst>
+              <a:ext uri="{FF2B5EF4-FFF2-40B4-BE49-F238E27FC236}">
+                <a16:creationId xmlns:a16="http://schemas.microsoft.com/office/drawing/2014/main" id="{12806697-C7F1-4A71-8C8D-CE06E2CE4555}"/>
+              </a:ext>
+            </a:extLst>
+          </p:cNvPr>
+          <p:cNvSpPr txBox="1"/>
+          <p:nvPr/>
+        </p:nvSpPr>
+        <p:spPr>
+          <a:xfrm>
+            <a:off x="1311965" y="1511613"/>
+            <a:ext cx="1166192" cy="307777"/>
+          </a:xfrm>
+          <a:prstGeom prst="rect">
+            <a:avLst/>
+          </a:prstGeom>
+          <a:noFill/>
+        </p:spPr>
+        <p:txBody>
+          <a:bodyPr wrap="square" rtlCol="0">
+            <a:spAutoFit/>
+          </a:bodyPr>
+          <a:lstStyle/>
+          <a:p>
+            <a:r>
+              <a:rPr lang="en-US" sz="1400" b="1" dirty="0">
+                <a:solidFill>
+                  <a:srgbClr val="FF0000"/>
+                </a:solidFill>
+              </a:rPr>
+              <a:t>Product 1</a:t>
+            </a:r>
+          </a:p>
+        </p:txBody>
+      </p:sp>
+      <p:sp>
+        <p:nvSpPr>
+          <p:cNvPr id="8" name="TextBox 7">
+            <a:extLst>
+              <a:ext uri="{FF2B5EF4-FFF2-40B4-BE49-F238E27FC236}">
+                <a16:creationId xmlns:a16="http://schemas.microsoft.com/office/drawing/2014/main" id="{07756F9B-6CEC-4DA0-9DE2-BFF5F100C110}"/>
+              </a:ext>
+            </a:extLst>
+          </p:cNvPr>
+          <p:cNvSpPr txBox="1"/>
+          <p:nvPr/>
+        </p:nvSpPr>
+        <p:spPr>
+          <a:xfrm>
+            <a:off x="6341165" y="1511613"/>
+            <a:ext cx="1166192" cy="307777"/>
+          </a:xfrm>
+          <a:prstGeom prst="rect">
+            <a:avLst/>
+          </a:prstGeom>
+          <a:noFill/>
+        </p:spPr>
+        <p:txBody>
+          <a:bodyPr wrap="square" rtlCol="0">
+            <a:spAutoFit/>
+          </a:bodyPr>
+          <a:lstStyle/>
+          <a:p>
+            <a:r>
+              <a:rPr lang="en-US" sz="1400" b="1" dirty="0">
+                <a:solidFill>
+                  <a:srgbClr val="FF0000"/>
+                </a:solidFill>
+              </a:rPr>
+              <a:t>Product 6</a:t>
+            </a:r>
+          </a:p>
+        </p:txBody>
+      </p:sp>
+      <p:sp>
+        <p:nvSpPr>
+          <p:cNvPr id="9" name="TextBox 8">
+            <a:extLst>
+              <a:ext uri="{FF2B5EF4-FFF2-40B4-BE49-F238E27FC236}">
+                <a16:creationId xmlns:a16="http://schemas.microsoft.com/office/drawing/2014/main" id="{0ECABD1B-0EE7-4152-8487-AB63773A119F}"/>
+              </a:ext>
+            </a:extLst>
+          </p:cNvPr>
+          <p:cNvSpPr txBox="1"/>
+          <p:nvPr/>
+        </p:nvSpPr>
+        <p:spPr>
+          <a:xfrm>
+            <a:off x="3306417" y="2676315"/>
+            <a:ext cx="1166192" cy="307777"/>
+          </a:xfrm>
+          <a:prstGeom prst="rect">
+            <a:avLst/>
+          </a:prstGeom>
+          <a:noFill/>
+        </p:spPr>
+        <p:txBody>
+          <a:bodyPr wrap="square" rtlCol="0">
+            <a:spAutoFit/>
+          </a:bodyPr>
+          <a:lstStyle/>
+          <a:p>
+            <a:r>
+              <a:rPr lang="en-US" sz="1400" b="1" dirty="0">
+                <a:solidFill>
+                  <a:schemeClr val="accent1">
+                    <a:lumMod val="50000"/>
+                  </a:schemeClr>
+                </a:solidFill>
+              </a:rPr>
+              <a:t>Product 3</a:t>
+            </a:r>
+          </a:p>
+        </p:txBody>
+      </p:sp>
+      <p:sp>
+        <p:nvSpPr>
+          <p:cNvPr id="10" name="TextBox 9">
+            <a:extLst>
+              <a:ext uri="{FF2B5EF4-FFF2-40B4-BE49-F238E27FC236}">
+                <a16:creationId xmlns:a16="http://schemas.microsoft.com/office/drawing/2014/main" id="{765DAE49-56D5-4D98-8FB1-72E21235A71D}"/>
+              </a:ext>
+            </a:extLst>
+          </p:cNvPr>
+          <p:cNvSpPr txBox="1"/>
+          <p:nvPr/>
+        </p:nvSpPr>
+        <p:spPr>
+          <a:xfrm>
+            <a:off x="5287617" y="2368538"/>
+            <a:ext cx="1166192" cy="307777"/>
+          </a:xfrm>
+          <a:prstGeom prst="rect">
+            <a:avLst/>
+          </a:prstGeom>
+          <a:noFill/>
+        </p:spPr>
+        <p:txBody>
+          <a:bodyPr wrap="square" rtlCol="0">
+            <a:spAutoFit/>
+          </a:bodyPr>
+          <a:lstStyle/>
+          <a:p>
+            <a:r>
+              <a:rPr lang="en-US" sz="1400" b="1" dirty="0">
+                <a:solidFill>
+                  <a:schemeClr val="accent1">
+                    <a:lumMod val="50000"/>
+                  </a:schemeClr>
+                </a:solidFill>
+              </a:rPr>
+              <a:t>Product 5</a:t>
+            </a:r>
+          </a:p>
+        </p:txBody>
+      </p:sp>
     </p:spTree>
     <p:extLst>
       <p:ext uri="{BB962C8B-B14F-4D97-AF65-F5344CB8AC3E}">
@@ -29605,34 +26863,6 @@
           <a:chExt cx="0" cy="0"/>
         </a:xfrm>
       </p:grpSpPr>
-      <p:graphicFrame>
-        <p:nvGraphicFramePr>
-          <p:cNvPr id="8" name="Diagram 7">
-            <a:extLst>
-              <a:ext uri="{FF2B5EF4-FFF2-40B4-BE49-F238E27FC236}">
-                <a16:creationId xmlns:a16="http://schemas.microsoft.com/office/drawing/2014/main" id="{5901822F-28D0-44EE-8D1A-4C2A572993E5}"/>
-              </a:ext>
-            </a:extLst>
-          </p:cNvPr>
-          <p:cNvGraphicFramePr/>
-          <p:nvPr>
-            <p:extLst>
-              <p:ext uri="{D42A27DB-BD31-4B8C-83A1-F6EECF244321}">
-                <p14:modId xmlns:p14="http://schemas.microsoft.com/office/powerpoint/2010/main" val="3144132669"/>
-              </p:ext>
-            </p:extLst>
-          </p:nvPr>
-        </p:nvGraphicFramePr>
-        <p:xfrm>
-          <a:off x="498762" y="1663627"/>
-          <a:ext cx="10619812" cy="4485381"/>
-        </p:xfrm>
-        <a:graphic>
-          <a:graphicData uri="http://schemas.openxmlformats.org/drawingml/2006/diagram">
-            <dgm:relIds xmlns:dgm="http://schemas.openxmlformats.org/drawingml/2006/diagram" xmlns:r="http://schemas.openxmlformats.org/officeDocument/2006/relationships" r:dm="rId2" r:lo="rId3" r:qs="rId4" r:cs="rId5"/>
-          </a:graphicData>
-        </a:graphic>
-      </p:graphicFrame>
       <p:sp>
         <p:nvSpPr>
           <p:cNvPr id="11" name="Title 1">
@@ -29693,10 +26923,754 @@
           </a:p>
         </p:txBody>
       </p:sp>
+      <p:graphicFrame>
+        <p:nvGraphicFramePr>
+          <p:cNvPr id="4" name="Table 5">
+            <a:extLst>
+              <a:ext uri="{FF2B5EF4-FFF2-40B4-BE49-F238E27FC236}">
+                <a16:creationId xmlns:a16="http://schemas.microsoft.com/office/drawing/2014/main" id="{65C9DC20-32D2-4F89-AA21-2255F8CBFD9B}"/>
+              </a:ext>
+            </a:extLst>
+          </p:cNvPr>
+          <p:cNvGraphicFramePr>
+            <a:graphicFrameLocks noGrp="1"/>
+          </p:cNvGraphicFramePr>
+          <p:nvPr>
+            <p:extLst>
+              <p:ext uri="{D42A27DB-BD31-4B8C-83A1-F6EECF244321}">
+                <p14:modId xmlns:p14="http://schemas.microsoft.com/office/powerpoint/2010/main" val="2831040877"/>
+              </p:ext>
+            </p:extLst>
+          </p:nvPr>
+        </p:nvGraphicFramePr>
+        <p:xfrm>
+          <a:off x="513522" y="1408780"/>
+          <a:ext cx="11164955" cy="4754880"/>
+        </p:xfrm>
+        <a:graphic>
+          <a:graphicData uri="http://schemas.openxmlformats.org/drawingml/2006/table">
+            <a:tbl>
+              <a:tblPr firstRow="1" bandRow="1">
+                <a:tableStyleId>{5C22544A-7EE6-4342-B048-85BDC9FD1C3A}</a:tableStyleId>
+              </a:tblPr>
+              <a:tblGrid>
+                <a:gridCol w="1133060">
+                  <a:extLst>
+                    <a:ext uri="{9D8B030D-6E8A-4147-A177-3AD203B41FA5}">
+                      <a16:colId xmlns:a16="http://schemas.microsoft.com/office/drawing/2014/main" val="2518806104"/>
+                    </a:ext>
+                  </a:extLst>
+                </a:gridCol>
+                <a:gridCol w="1663148">
+                  <a:extLst>
+                    <a:ext uri="{9D8B030D-6E8A-4147-A177-3AD203B41FA5}">
+                      <a16:colId xmlns:a16="http://schemas.microsoft.com/office/drawing/2014/main" val="2784809845"/>
+                    </a:ext>
+                  </a:extLst>
+                </a:gridCol>
+                <a:gridCol w="2428461">
+                  <a:extLst>
+                    <a:ext uri="{9D8B030D-6E8A-4147-A177-3AD203B41FA5}">
+                      <a16:colId xmlns:a16="http://schemas.microsoft.com/office/drawing/2014/main" val="364092403"/>
+                    </a:ext>
+                  </a:extLst>
+                </a:gridCol>
+                <a:gridCol w="1858617">
+                  <a:extLst>
+                    <a:ext uri="{9D8B030D-6E8A-4147-A177-3AD203B41FA5}">
+                      <a16:colId xmlns:a16="http://schemas.microsoft.com/office/drawing/2014/main" val="3429832459"/>
+                    </a:ext>
+                  </a:extLst>
+                </a:gridCol>
+                <a:gridCol w="2788602">
+                  <a:extLst>
+                    <a:ext uri="{9D8B030D-6E8A-4147-A177-3AD203B41FA5}">
+                      <a16:colId xmlns:a16="http://schemas.microsoft.com/office/drawing/2014/main" val="541920014"/>
+                    </a:ext>
+                  </a:extLst>
+                </a:gridCol>
+                <a:gridCol w="1293067">
+                  <a:extLst>
+                    <a:ext uri="{9D8B030D-6E8A-4147-A177-3AD203B41FA5}">
+                      <a16:colId xmlns:a16="http://schemas.microsoft.com/office/drawing/2014/main" val="3390346739"/>
+                    </a:ext>
+                  </a:extLst>
+                </a:gridCol>
+              </a:tblGrid>
+              <a:tr h="369700">
+                <a:tc>
+                  <a:txBody>
+                    <a:bodyPr/>
+                    <a:lstStyle/>
+                    <a:p>
+                      <a:r>
+                        <a:rPr lang="en-US" dirty="0"/>
+                        <a:t>Method Name</a:t>
+                      </a:r>
+                    </a:p>
+                  </a:txBody>
+                  <a:tcPr/>
+                </a:tc>
+                <a:tc>
+                  <a:txBody>
+                    <a:bodyPr/>
+                    <a:lstStyle/>
+                    <a:p>
+                      <a:r>
+                        <a:rPr lang="en-US" dirty="0"/>
+                        <a:t>Description</a:t>
+                      </a:r>
+                    </a:p>
+                  </a:txBody>
+                  <a:tcPr/>
+                </a:tc>
+                <a:tc>
+                  <a:txBody>
+                    <a:bodyPr/>
+                    <a:lstStyle/>
+                    <a:p>
+                      <a:r>
+                        <a:rPr lang="en-US" dirty="0"/>
+                        <a:t>Predictor (Input Variables)</a:t>
+                      </a:r>
+                    </a:p>
+                  </a:txBody>
+                  <a:tcPr/>
+                </a:tc>
+                <a:tc>
+                  <a:txBody>
+                    <a:bodyPr/>
+                    <a:lstStyle/>
+                    <a:p>
+                      <a:r>
+                        <a:rPr lang="en-US" dirty="0"/>
+                        <a:t>Predicted Variable</a:t>
+                      </a:r>
+                    </a:p>
+                  </a:txBody>
+                  <a:tcPr/>
+                </a:tc>
+                <a:tc>
+                  <a:txBody>
+                    <a:bodyPr/>
+                    <a:lstStyle/>
+                    <a:p>
+                      <a:r>
+                        <a:rPr lang="en-US" dirty="0"/>
+                        <a:t>Logic</a:t>
+                      </a:r>
+                    </a:p>
+                  </a:txBody>
+                  <a:tcPr/>
+                </a:tc>
+                <a:tc>
+                  <a:txBody>
+                    <a:bodyPr/>
+                    <a:lstStyle/>
+                    <a:p>
+                      <a:r>
+                        <a:rPr lang="en-US" dirty="0"/>
+                        <a:t>Accuracy</a:t>
+                      </a:r>
+                    </a:p>
+                  </a:txBody>
+                  <a:tcPr/>
+                </a:tc>
+                <a:extLst>
+                  <a:ext uri="{0D108BD9-81ED-4DB2-BD59-A6C34878D82A}">
+                    <a16:rowId xmlns:a16="http://schemas.microsoft.com/office/drawing/2014/main" val="1761681703"/>
+                  </a:ext>
+                </a:extLst>
+              </a:tr>
+              <a:tr h="192524">
+                <a:tc>
+                  <a:txBody>
+                    <a:bodyPr/>
+                    <a:lstStyle/>
+                    <a:p>
+                      <a:pPr marL="0" marR="0" lvl="0" indent="0" algn="l" defTabSz="914400" rtl="0" eaLnBrk="1" fontAlgn="auto" latinLnBrk="0" hangingPunct="1">
+                        <a:lnSpc>
+                          <a:spcPct val="100000"/>
+                        </a:lnSpc>
+                        <a:spcBef>
+                          <a:spcPts val="0"/>
+                        </a:spcBef>
+                        <a:spcAft>
+                          <a:spcPts val="0"/>
+                        </a:spcAft>
+                        <a:buClrTx/>
+                        <a:buSzTx/>
+                        <a:buFontTx/>
+                        <a:buNone/>
+                        <a:tabLst/>
+                        <a:defRPr/>
+                      </a:pPr>
+                      <a:r>
+                        <a:rPr lang="en-US" b="1" dirty="0"/>
+                        <a:t>Text Blob</a:t>
+                      </a:r>
+                    </a:p>
+                    <a:p>
+                      <a:endParaRPr lang="en-US" dirty="0"/>
+                    </a:p>
+                  </a:txBody>
+                  <a:tcPr/>
+                </a:tc>
+                <a:tc>
+                  <a:txBody>
+                    <a:bodyPr/>
+                    <a:lstStyle/>
+                    <a:p>
+                      <a:pPr marL="0" marR="0" lvl="0" indent="0" algn="l" defTabSz="914400" rtl="0" eaLnBrk="1" fontAlgn="auto" latinLnBrk="0" hangingPunct="1">
+                        <a:lnSpc>
+                          <a:spcPct val="100000"/>
+                        </a:lnSpc>
+                        <a:spcBef>
+                          <a:spcPts val="0"/>
+                        </a:spcBef>
+                        <a:spcAft>
+                          <a:spcPts val="0"/>
+                        </a:spcAft>
+                        <a:buClrTx/>
+                        <a:buSzTx/>
+                        <a:buFontTx/>
+                        <a:buNone/>
+                        <a:tabLst/>
+                        <a:defRPr/>
+                      </a:pPr>
+                      <a:r>
+                        <a:rPr lang="en-US" sz="1800" b="0" dirty="0"/>
+                        <a:t>Trained based</a:t>
+                      </a:r>
+                    </a:p>
+                  </a:txBody>
+                  <a:tcPr/>
+                </a:tc>
+                <a:tc rowSpan="3">
+                  <a:txBody>
+                    <a:bodyPr/>
+                    <a:lstStyle/>
+                    <a:p>
+                      <a:pPr marL="342900" indent="-342900" algn="l">
+                        <a:buAutoNum type="arabicPeriod"/>
+                      </a:pPr>
+                      <a:r>
+                        <a:rPr lang="en-US" dirty="0"/>
+                        <a:t>Product Reviews</a:t>
+                      </a:r>
+                    </a:p>
+                    <a:p>
+                      <a:pPr marL="342900" indent="-342900" algn="l">
+                        <a:buAutoNum type="arabicPeriod"/>
+                      </a:pPr>
+                      <a:r>
+                        <a:rPr lang="en-US" dirty="0"/>
+                        <a:t>Amazon Score Sentiment variable for comparison</a:t>
+                      </a:r>
+                    </a:p>
+                  </a:txBody>
+                  <a:tcPr anchor="ctr"/>
+                </a:tc>
+                <a:tc>
+                  <a:txBody>
+                    <a:bodyPr/>
+                    <a:lstStyle/>
+                    <a:p>
+                      <a:r>
+                        <a:rPr lang="en-US" dirty="0"/>
+                        <a:t>Text Blob Sentiment Score</a:t>
+                      </a:r>
+                    </a:p>
+                  </a:txBody>
+                  <a:tcPr/>
+                </a:tc>
+                <a:tc>
+                  <a:txBody>
+                    <a:bodyPr/>
+                    <a:lstStyle/>
+                    <a:p>
+                      <a:r>
+                        <a:rPr lang="en-US" b="1" dirty="0"/>
+                        <a:t>Positive -</a:t>
+                      </a:r>
+                      <a:r>
+                        <a:rPr lang="en-US" dirty="0"/>
+                        <a:t> </a:t>
+                      </a:r>
+                    </a:p>
+                    <a:p>
+                      <a:r>
+                        <a:rPr lang="en-US" dirty="0"/>
+                        <a:t>(*Pol &gt;0 &amp; *Sub &gt; 0.5)</a:t>
+                      </a:r>
+                    </a:p>
+                    <a:p>
+                      <a:r>
+                        <a:rPr lang="en-US" b="1" dirty="0"/>
+                        <a:t>Negative -</a:t>
+                      </a:r>
+                    </a:p>
+                    <a:p>
+                      <a:r>
+                        <a:rPr lang="en-US" dirty="0"/>
+                        <a:t>(*Pol &lt;= 0 &amp; *Sub &gt; 0.5)</a:t>
+                      </a:r>
+                    </a:p>
+                    <a:p>
+                      <a:r>
+                        <a:rPr lang="en-US" b="1" dirty="0"/>
+                        <a:t>Neutral –</a:t>
+                      </a:r>
+                      <a:endParaRPr lang="en-US" dirty="0"/>
+                    </a:p>
+                    <a:p>
+                      <a:r>
+                        <a:rPr lang="en-US" dirty="0"/>
+                        <a:t>(*Sub &lt;= 0.5)</a:t>
+                      </a:r>
+                    </a:p>
+                  </a:txBody>
+                  <a:tcPr/>
+                </a:tc>
+                <a:tc>
+                  <a:txBody>
+                    <a:bodyPr/>
+                    <a:lstStyle/>
+                    <a:p>
+                      <a:pPr marL="0" marR="0" lvl="0" indent="0" algn="l" defTabSz="914400" rtl="0" eaLnBrk="1" fontAlgn="auto" latinLnBrk="0" hangingPunct="1">
+                        <a:lnSpc>
+                          <a:spcPct val="100000"/>
+                        </a:lnSpc>
+                        <a:spcBef>
+                          <a:spcPts val="0"/>
+                        </a:spcBef>
+                        <a:spcAft>
+                          <a:spcPts val="0"/>
+                        </a:spcAft>
+                        <a:buClrTx/>
+                        <a:buSzTx/>
+                        <a:buFontTx/>
+                        <a:buNone/>
+                        <a:tabLst/>
+                        <a:defRPr/>
+                      </a:pPr>
+                      <a:r>
+                        <a:rPr lang="en-US" sz="1800" b="0" kern="1200" dirty="0"/>
+                        <a:t>57.69%</a:t>
+                      </a:r>
+                    </a:p>
+                  </a:txBody>
+                  <a:tcPr/>
+                </a:tc>
+                <a:extLst>
+                  <a:ext uri="{0D108BD9-81ED-4DB2-BD59-A6C34878D82A}">
+                    <a16:rowId xmlns:a16="http://schemas.microsoft.com/office/drawing/2014/main" val="3863642058"/>
+                  </a:ext>
+                </a:extLst>
+              </a:tr>
+              <a:tr h="1161914">
+                <a:tc>
+                  <a:txBody>
+                    <a:bodyPr/>
+                    <a:lstStyle/>
+                    <a:p>
+                      <a:pPr marL="0" marR="0" lvl="0" indent="0" algn="l" defTabSz="914400" rtl="0" eaLnBrk="1" fontAlgn="auto" latinLnBrk="0" hangingPunct="1">
+                        <a:lnSpc>
+                          <a:spcPct val="100000"/>
+                        </a:lnSpc>
+                        <a:spcBef>
+                          <a:spcPts val="0"/>
+                        </a:spcBef>
+                        <a:spcAft>
+                          <a:spcPts val="0"/>
+                        </a:spcAft>
+                        <a:buClrTx/>
+                        <a:buSzTx/>
+                        <a:buFontTx/>
+                        <a:buNone/>
+                        <a:tabLst/>
+                        <a:defRPr/>
+                      </a:pPr>
+                      <a:r>
+                        <a:rPr lang="en-US" sz="1800" b="1" kern="1200" dirty="0">
+                          <a:solidFill>
+                            <a:schemeClr val="dk1"/>
+                          </a:solidFill>
+                          <a:latin typeface="+mn-lt"/>
+                          <a:ea typeface="+mn-ea"/>
+                          <a:cs typeface="+mn-cs"/>
+                        </a:rPr>
+                        <a:t>Lexicon</a:t>
+                      </a:r>
+                    </a:p>
+                    <a:p>
+                      <a:endParaRPr lang="en-US" dirty="0"/>
+                    </a:p>
+                  </a:txBody>
+                  <a:tcPr/>
+                </a:tc>
+                <a:tc>
+                  <a:txBody>
+                    <a:bodyPr/>
+                    <a:lstStyle/>
+                    <a:p>
+                      <a:pPr marL="0" marR="0" lvl="0" indent="0" algn="l" defTabSz="914400" rtl="0" eaLnBrk="1" fontAlgn="auto" latinLnBrk="0" hangingPunct="1">
+                        <a:lnSpc>
+                          <a:spcPct val="100000"/>
+                        </a:lnSpc>
+                        <a:spcBef>
+                          <a:spcPts val="0"/>
+                        </a:spcBef>
+                        <a:spcAft>
+                          <a:spcPts val="0"/>
+                        </a:spcAft>
+                        <a:buClrTx/>
+                        <a:buSzTx/>
+                        <a:buFontTx/>
+                        <a:buNone/>
+                        <a:tabLst/>
+                        <a:defRPr/>
+                      </a:pPr>
+                      <a:r>
+                        <a:rPr lang="en-US" sz="1800" b="0" kern="1200" dirty="0"/>
+                        <a:t>General purpose lexicon with TF-IDF </a:t>
+                      </a:r>
+                    </a:p>
+                  </a:txBody>
+                  <a:tcPr/>
+                </a:tc>
+                <a:tc vMerge="1">
+                  <a:txBody>
+                    <a:bodyPr/>
+                    <a:lstStyle/>
+                    <a:p>
+                      <a:pPr marL="0" marR="0" lvl="0" indent="0" algn="l" defTabSz="914400" rtl="0" eaLnBrk="1" fontAlgn="auto" latinLnBrk="0" hangingPunct="1">
+                        <a:lnSpc>
+                          <a:spcPct val="100000"/>
+                        </a:lnSpc>
+                        <a:spcBef>
+                          <a:spcPts val="0"/>
+                        </a:spcBef>
+                        <a:spcAft>
+                          <a:spcPts val="0"/>
+                        </a:spcAft>
+                        <a:buClrTx/>
+                        <a:buSzTx/>
+                        <a:buFontTx/>
+                        <a:buNone/>
+                        <a:tabLst/>
+                        <a:defRPr/>
+                      </a:pPr>
+                      <a:endParaRPr lang="en-US" sz="1800" b="0" kern="1200" dirty="0"/>
+                    </a:p>
+                  </a:txBody>
+                  <a:tcPr/>
+                </a:tc>
+                <a:tc>
+                  <a:txBody>
+                    <a:bodyPr/>
+                    <a:lstStyle/>
+                    <a:p>
+                      <a:r>
+                        <a:rPr lang="en-US" dirty="0"/>
+                        <a:t>Lexicon Sentiment Score</a:t>
+                      </a:r>
+                    </a:p>
+                  </a:txBody>
+                  <a:tcPr/>
+                </a:tc>
+                <a:tc>
+                  <a:txBody>
+                    <a:bodyPr/>
+                    <a:lstStyle/>
+                    <a:p>
+                      <a:r>
+                        <a:rPr lang="en-US" dirty="0"/>
+                        <a:t> </a:t>
+                      </a:r>
+                      <a:r>
+                        <a:rPr lang="en-US" b="1" dirty="0"/>
+                        <a:t>TF-IDF - </a:t>
+                      </a:r>
+                    </a:p>
+                    <a:p>
+                      <a:r>
+                        <a:rPr lang="en-US" dirty="0"/>
+                        <a:t>- Positive &gt; 0.55</a:t>
+                      </a:r>
+                    </a:p>
+                    <a:p>
+                      <a:pPr marL="0" marR="0" lvl="0" indent="0" algn="l" defTabSz="914400" rtl="0" eaLnBrk="1" fontAlgn="auto" latinLnBrk="0" hangingPunct="1">
+                        <a:lnSpc>
+                          <a:spcPct val="100000"/>
+                        </a:lnSpc>
+                        <a:spcBef>
+                          <a:spcPts val="0"/>
+                        </a:spcBef>
+                        <a:spcAft>
+                          <a:spcPts val="0"/>
+                        </a:spcAft>
+                        <a:buClrTx/>
+                        <a:buSzTx/>
+                        <a:buFontTx/>
+                        <a:buNone/>
+                        <a:tabLst/>
+                        <a:defRPr/>
+                      </a:pPr>
+                      <a:r>
+                        <a:rPr lang="en-US" dirty="0"/>
+                        <a:t>- Neutral &gt; 0.45 </a:t>
+                      </a:r>
+                    </a:p>
+                    <a:p>
+                      <a:r>
+                        <a:rPr lang="en-US" dirty="0"/>
+                        <a:t>- Negative &lt;= 0.55</a:t>
+                      </a:r>
+                    </a:p>
+                  </a:txBody>
+                  <a:tcPr/>
+                </a:tc>
+                <a:tc>
+                  <a:txBody>
+                    <a:bodyPr/>
+                    <a:lstStyle/>
+                    <a:p>
+                      <a:pPr marL="0" marR="0" lvl="0" indent="0" algn="l" defTabSz="914400" rtl="0" eaLnBrk="1" fontAlgn="auto" latinLnBrk="0" hangingPunct="1">
+                        <a:lnSpc>
+                          <a:spcPct val="100000"/>
+                        </a:lnSpc>
+                        <a:spcBef>
+                          <a:spcPts val="0"/>
+                        </a:spcBef>
+                        <a:spcAft>
+                          <a:spcPts val="0"/>
+                        </a:spcAft>
+                        <a:buClrTx/>
+                        <a:buSzTx/>
+                        <a:buFontTx/>
+                        <a:buNone/>
+                        <a:tabLst/>
+                        <a:defRPr/>
+                      </a:pPr>
+                      <a:r>
+                        <a:rPr lang="en-US" sz="1800" b="0" dirty="0"/>
+                        <a:t>67.50%</a:t>
+                      </a:r>
+                      <a:endParaRPr lang="en-US" dirty="0"/>
+                    </a:p>
+                  </a:txBody>
+                  <a:tcPr/>
+                </a:tc>
+                <a:extLst>
+                  <a:ext uri="{0D108BD9-81ED-4DB2-BD59-A6C34878D82A}">
+                    <a16:rowId xmlns:a16="http://schemas.microsoft.com/office/drawing/2014/main" val="3804176640"/>
+                  </a:ext>
+                </a:extLst>
+              </a:tr>
+              <a:tr h="1161914">
+                <a:tc>
+                  <a:txBody>
+                    <a:bodyPr/>
+                    <a:lstStyle/>
+                    <a:p>
+                      <a:pPr marL="0" marR="0" lvl="0" indent="0" algn="l" defTabSz="914400" rtl="0" eaLnBrk="1" fontAlgn="auto" latinLnBrk="0" hangingPunct="1">
+                        <a:lnSpc>
+                          <a:spcPct val="100000"/>
+                        </a:lnSpc>
+                        <a:spcBef>
+                          <a:spcPts val="0"/>
+                        </a:spcBef>
+                        <a:spcAft>
+                          <a:spcPts val="0"/>
+                        </a:spcAft>
+                        <a:buClrTx/>
+                        <a:buSzTx/>
+                        <a:buFontTx/>
+                        <a:buNone/>
+                        <a:tabLst/>
+                        <a:defRPr/>
+                      </a:pPr>
+                      <a:r>
+                        <a:rPr lang="en-US" b="1" dirty="0"/>
+                        <a:t>Vader</a:t>
+                      </a:r>
+                    </a:p>
+                    <a:p>
+                      <a:endParaRPr lang="en-US" dirty="0"/>
+                    </a:p>
+                  </a:txBody>
+                  <a:tcPr/>
+                </a:tc>
+                <a:tc>
+                  <a:txBody>
+                    <a:bodyPr/>
+                    <a:lstStyle/>
+                    <a:p>
+                      <a:pPr lvl="0"/>
+                      <a:r>
+                        <a:rPr lang="en-US" sz="1800" dirty="0"/>
+                        <a:t>Rule based</a:t>
+                      </a:r>
+                    </a:p>
+                    <a:p>
+                      <a:pPr lvl="0"/>
+                      <a:endParaRPr lang="en-US" sz="2000" dirty="0"/>
+                    </a:p>
+                  </a:txBody>
+                  <a:tcPr/>
+                </a:tc>
+                <a:tc vMerge="1">
+                  <a:txBody>
+                    <a:bodyPr/>
+                    <a:lstStyle/>
+                    <a:p>
+                      <a:pPr lvl="0"/>
+                      <a:endParaRPr lang="en-US" sz="2000" dirty="0"/>
+                    </a:p>
+                  </a:txBody>
+                  <a:tcPr/>
+                </a:tc>
+                <a:tc>
+                  <a:txBody>
+                    <a:bodyPr/>
+                    <a:lstStyle/>
+                    <a:p>
+                      <a:r>
+                        <a:rPr lang="en-US" dirty="0"/>
+                        <a:t>Vader Compound Sentiment Score</a:t>
+                      </a:r>
+                    </a:p>
+                  </a:txBody>
+                  <a:tcPr/>
+                </a:tc>
+                <a:tc>
+                  <a:txBody>
+                    <a:bodyPr/>
+                    <a:lstStyle/>
+                    <a:p>
+                      <a:r>
+                        <a:rPr lang="en-US" b="1" dirty="0"/>
+                        <a:t>Compound- </a:t>
+                      </a:r>
+                    </a:p>
+                    <a:p>
+                      <a:r>
+                        <a:rPr lang="en-US" dirty="0"/>
+                        <a:t>- Positive &gt; 0.3</a:t>
+                      </a:r>
+                    </a:p>
+                    <a:p>
+                      <a:pPr marL="0" marR="0" lvl="0" indent="0" algn="l" defTabSz="914400" rtl="0" eaLnBrk="1" fontAlgn="auto" latinLnBrk="0" hangingPunct="1">
+                        <a:lnSpc>
+                          <a:spcPct val="100000"/>
+                        </a:lnSpc>
+                        <a:spcBef>
+                          <a:spcPts val="0"/>
+                        </a:spcBef>
+                        <a:spcAft>
+                          <a:spcPts val="0"/>
+                        </a:spcAft>
+                        <a:buClrTx/>
+                        <a:buSzTx/>
+                        <a:buFontTx/>
+                        <a:buNone/>
+                        <a:tabLst/>
+                        <a:defRPr/>
+                      </a:pPr>
+                      <a:r>
+                        <a:rPr lang="en-US" dirty="0"/>
+                        <a:t>- Neutral = -0.3 to 0.3</a:t>
+                      </a:r>
+                    </a:p>
+                    <a:p>
+                      <a:r>
+                        <a:rPr lang="en-US" dirty="0"/>
+                        <a:t>- Negative &lt; -0.3</a:t>
+                      </a:r>
+                    </a:p>
+                  </a:txBody>
+                  <a:tcPr/>
+                </a:tc>
+                <a:tc>
+                  <a:txBody>
+                    <a:bodyPr/>
+                    <a:lstStyle/>
+                    <a:p>
+                      <a:pPr marL="0" marR="0" lvl="0" indent="0" algn="l" defTabSz="914400" rtl="0" eaLnBrk="1" fontAlgn="auto" latinLnBrk="0" hangingPunct="1">
+                        <a:lnSpc>
+                          <a:spcPct val="100000"/>
+                        </a:lnSpc>
+                        <a:spcBef>
+                          <a:spcPts val="0"/>
+                        </a:spcBef>
+                        <a:spcAft>
+                          <a:spcPts val="0"/>
+                        </a:spcAft>
+                        <a:buClrTx/>
+                        <a:buSzTx/>
+                        <a:buFontTx/>
+                        <a:buNone/>
+                        <a:tabLst/>
+                        <a:defRPr/>
+                      </a:pPr>
+                      <a:r>
+                        <a:rPr lang="en-US" sz="1800" dirty="0"/>
+                        <a:t>79.96%</a:t>
+                      </a:r>
+                      <a:endParaRPr lang="en-US" sz="2000" dirty="0"/>
+                    </a:p>
+                  </a:txBody>
+                  <a:tcPr/>
+                </a:tc>
+                <a:extLst>
+                  <a:ext uri="{0D108BD9-81ED-4DB2-BD59-A6C34878D82A}">
+                    <a16:rowId xmlns:a16="http://schemas.microsoft.com/office/drawing/2014/main" val="2723923547"/>
+                  </a:ext>
+                </a:extLst>
+              </a:tr>
+            </a:tbl>
+          </a:graphicData>
+        </a:graphic>
+      </p:graphicFrame>
+      <p:sp>
+        <p:nvSpPr>
+          <p:cNvPr id="7" name="Rectangle 6">
+            <a:extLst>
+              <a:ext uri="{FF2B5EF4-FFF2-40B4-BE49-F238E27FC236}">
+                <a16:creationId xmlns:a16="http://schemas.microsoft.com/office/drawing/2014/main" id="{FA72B540-0744-49D9-9D6A-ADE04EB794A9}"/>
+              </a:ext>
+            </a:extLst>
+          </p:cNvPr>
+          <p:cNvSpPr/>
+          <p:nvPr/>
+        </p:nvSpPr>
+        <p:spPr>
+          <a:xfrm>
+            <a:off x="9159240" y="6364000"/>
+            <a:ext cx="4114800" cy="276999"/>
+          </a:xfrm>
+          <a:prstGeom prst="rect">
+            <a:avLst/>
+          </a:prstGeom>
+        </p:spPr>
+        <p:txBody>
+          <a:bodyPr wrap="square">
+            <a:spAutoFit/>
+          </a:bodyPr>
+          <a:lstStyle/>
+          <a:p>
+            <a:r>
+              <a:rPr lang="en-US" sz="1200" i="1" dirty="0"/>
+              <a:t>* Pol – Polarity , Sub - Subjectivity</a:t>
+            </a:r>
+          </a:p>
+        </p:txBody>
+      </p:sp>
     </p:spTree>
     <p:extLst>
       <p:ext uri="{BB962C8B-B14F-4D97-AF65-F5344CB8AC3E}">
-        <p14:creationId xmlns:p14="http://schemas.microsoft.com/office/powerpoint/2010/main" val="3943805870"/>
+        <p14:creationId xmlns:p14="http://schemas.microsoft.com/office/powerpoint/2010/main" val="1972598544"/>
       </p:ext>
     </p:extLst>
   </p:cSld>
@@ -29735,37 +27709,6 @@
           <a:chExt cx="0" cy="0"/>
         </a:xfrm>
       </p:grpSpPr>
-      <p:pic>
-        <p:nvPicPr>
-          <p:cNvPr id="5" name="Picture 4">
-            <a:extLst>
-              <a:ext uri="{FF2B5EF4-FFF2-40B4-BE49-F238E27FC236}">
-                <a16:creationId xmlns:a16="http://schemas.microsoft.com/office/drawing/2014/main" id="{3CD70204-1361-4507-893F-EF431B0DDB98}"/>
-              </a:ext>
-            </a:extLst>
-          </p:cNvPr>
-          <p:cNvPicPr>
-            <a:picLocks noChangeAspect="1"/>
-          </p:cNvPicPr>
-          <p:nvPr/>
-        </p:nvPicPr>
-        <p:blipFill>
-          <a:blip r:embed="rId2"/>
-          <a:stretch>
-            <a:fillRect/>
-          </a:stretch>
-        </p:blipFill>
-        <p:spPr>
-          <a:xfrm>
-            <a:off x="0" y="9143"/>
-            <a:ext cx="7315200" cy="6839711"/>
-          </a:xfrm>
-          <a:prstGeom prst="rect">
-            <a:avLst/>
-          </a:prstGeom>
-          <a:noFill/>
-        </p:spPr>
-      </p:pic>
       <p:sp>
         <p:nvSpPr>
           <p:cNvPr id="13" name="Title 1">
@@ -29802,6 +27745,36 @@
           </a:p>
         </p:txBody>
       </p:sp>
+      <p:pic>
+        <p:nvPicPr>
+          <p:cNvPr id="2" name="Picture 1">
+            <a:extLst>
+              <a:ext uri="{FF2B5EF4-FFF2-40B4-BE49-F238E27FC236}">
+                <a16:creationId xmlns:a16="http://schemas.microsoft.com/office/drawing/2014/main" id="{0C22A281-833B-4F84-88A4-9280C5022EE9}"/>
+              </a:ext>
+            </a:extLst>
+          </p:cNvPr>
+          <p:cNvPicPr>
+            <a:picLocks noChangeAspect="1"/>
+          </p:cNvPicPr>
+          <p:nvPr/>
+        </p:nvPicPr>
+        <p:blipFill>
+          <a:blip r:embed="rId2"/>
+          <a:stretch>
+            <a:fillRect/>
+          </a:stretch>
+        </p:blipFill>
+        <p:spPr>
+          <a:xfrm>
+            <a:off x="119270" y="1881809"/>
+            <a:ext cx="7063408" cy="2584174"/>
+          </a:xfrm>
+          <a:prstGeom prst="rect">
+            <a:avLst/>
+          </a:prstGeom>
+        </p:spPr>
+      </p:pic>
     </p:spTree>
     <p:extLst>
       <p:ext uri="{BB962C8B-B14F-4D97-AF65-F5344CB8AC3E}">
@@ -29938,7 +27911,7 @@
             </a:pPr>
             <a:r>
               <a:rPr lang="en-US" dirty="0"/>
-              <a:t>Total sales shows a similar trend as # of Reviews over years</a:t>
+              <a:t>Sentiment Score of the prior year impacts the Sales of the next year</a:t>
             </a:r>
           </a:p>
           <a:p>
@@ -29948,17 +27921,17 @@
             </a:pPr>
             <a:r>
               <a:rPr lang="en-US" dirty="0"/>
-              <a:t>Sales and Reviews are directly proportional</a:t>
+              <a:t>For e.g. Sentiment Score improves in 2007 which results in increment in Sales in 2008</a:t>
             </a:r>
           </a:p>
         </p:txBody>
       </p:sp>
       <p:pic>
         <p:nvPicPr>
-          <p:cNvPr id="2" name="Picture 1">
+          <p:cNvPr id="7" name="Picture 6" descr="A close up of a map&#10;&#10;Description automatically generated">
             <a:extLst>
               <a:ext uri="{FF2B5EF4-FFF2-40B4-BE49-F238E27FC236}">
-                <a16:creationId xmlns:a16="http://schemas.microsoft.com/office/drawing/2014/main" id="{49F9E9CF-C3FD-48C2-98BF-C1BEA6F42767}"/>
+                <a16:creationId xmlns:a16="http://schemas.microsoft.com/office/drawing/2014/main" id="{E2A52B77-CA4D-4F73-8744-CCBECF6941FA}"/>
               </a:ext>
             </a:extLst>
           </p:cNvPr>
@@ -29968,15 +27941,21 @@
           <p:nvPr/>
         </p:nvPicPr>
         <p:blipFill>
-          <a:blip r:embed="rId2"/>
+          <a:blip r:embed="rId2">
+            <a:extLst>
+              <a:ext uri="{28A0092B-C50C-407E-A947-70E740481C1C}">
+                <a14:useLocalDpi xmlns:a14="http://schemas.microsoft.com/office/drawing/2010/main" val="0"/>
+              </a:ext>
+            </a:extLst>
+          </a:blip>
           <a:stretch>
             <a:fillRect/>
           </a:stretch>
         </p:blipFill>
         <p:spPr>
           <a:xfrm>
-            <a:off x="818321" y="1237835"/>
-            <a:ext cx="10525539" cy="4356901"/>
+            <a:off x="818323" y="1288504"/>
+            <a:ext cx="10631554" cy="4280992"/>
           </a:xfrm>
           <a:prstGeom prst="rect">
             <a:avLst/>
@@ -30074,7 +28053,7 @@
           <p:nvPr>
             <p:extLst>
               <p:ext uri="{D42A27DB-BD31-4B8C-83A1-F6EECF244321}">
-                <p14:modId xmlns:p14="http://schemas.microsoft.com/office/powerpoint/2010/main" val="940366874"/>
+                <p14:modId xmlns:p14="http://schemas.microsoft.com/office/powerpoint/2010/main" val="3815338344"/>
               </p:ext>
             </p:extLst>
           </p:nvPr>
@@ -30180,7 +28159,7 @@
           <a:p>
             <a:r>
               <a:rPr lang="en-US" b="1" dirty="0"/>
-              <a:t>Analysis Result (1/3)</a:t>
+              <a:t>Analysis Result (2/3)</a:t>
             </a:r>
             <a:endParaRPr lang="en-US" dirty="0"/>
           </a:p>
@@ -30559,8 +28538,8 @@
           <a:lstStyle/>
           <a:p>
             <a:pPr marL="285750" indent="-285750">
-              <a:buFont typeface="Arial" panose="020B0604020202020204" pitchFamily="34" charset="0"/>
-              <a:buChar char="•"/>
+              <a:buFont typeface="Wingdings" panose="05000000000000000000" pitchFamily="2" charset="2"/>
+              <a:buChar char="ü"/>
             </a:pPr>
             <a:r>
               <a:rPr lang="en-US" dirty="0">
@@ -30571,12 +28550,18 @@
             <a:endParaRPr lang="en-US" dirty="0"/>
           </a:p>
           <a:p>
-            <a:endParaRPr lang="en-US" dirty="0"/>
+            <a:pPr marL="285750" indent="-285750">
+              <a:buFont typeface="Wingdings" panose="05000000000000000000" pitchFamily="2" charset="2"/>
+              <a:buChar char="ü"/>
+            </a:pPr>
+            <a:endParaRPr lang="en-US" dirty="0">
+              <a:hlinkClick r:id="rId3"/>
+            </a:endParaRPr>
           </a:p>
           <a:p>
             <a:pPr marL="285750" indent="-285750">
-              <a:buFont typeface="Arial" panose="020B0604020202020204" pitchFamily="34" charset="0"/>
-              <a:buChar char="•"/>
+              <a:buFont typeface="Wingdings" panose="05000000000000000000" pitchFamily="2" charset="2"/>
+              <a:buChar char="ü"/>
             </a:pPr>
             <a:r>
               <a:rPr lang="en-US" dirty="0">
@@ -30588,15 +28573,17 @@
           </a:p>
           <a:p>
             <a:pPr marL="285750" indent="-285750">
-              <a:buFont typeface="Arial" panose="020B0604020202020204" pitchFamily="34" charset="0"/>
-              <a:buChar char="•"/>
+              <a:buFont typeface="Wingdings" panose="05000000000000000000" pitchFamily="2" charset="2"/>
+              <a:buChar char="ü"/>
             </a:pPr>
-            <a:endParaRPr lang="en-US" dirty="0"/>
+            <a:endParaRPr lang="en-US" dirty="0">
+              <a:hlinkClick r:id="rId4"/>
+            </a:endParaRPr>
           </a:p>
           <a:p>
             <a:pPr marL="285750" indent="-285750">
-              <a:buFont typeface="Arial" panose="020B0604020202020204" pitchFamily="34" charset="0"/>
-              <a:buChar char="•"/>
+              <a:buFont typeface="Wingdings" panose="05000000000000000000" pitchFamily="2" charset="2"/>
+              <a:buChar char="ü"/>
             </a:pPr>
             <a:r>
               <a:rPr lang="en-US" dirty="0">
@@ -31012,14 +28999,14 @@
           <p:nvPr>
             <p:extLst>
               <p:ext uri="{D42A27DB-BD31-4B8C-83A1-F6EECF244321}">
-                <p14:modId xmlns:p14="http://schemas.microsoft.com/office/powerpoint/2010/main" val="3515872846"/>
+                <p14:modId xmlns:p14="http://schemas.microsoft.com/office/powerpoint/2010/main" val="4083005599"/>
               </p:ext>
             </p:extLst>
           </p:nvPr>
         </p:nvGraphicFramePr>
         <p:xfrm>
-          <a:off x="2032000" y="1170239"/>
-          <a:ext cx="8128000" cy="5418667"/>
+          <a:off x="1179443" y="1126437"/>
+          <a:ext cx="8980557" cy="5462470"/>
         </p:xfrm>
         <a:graphic>
           <a:graphicData uri="http://schemas.openxmlformats.org/drawingml/2006/diagram">
@@ -31334,14 +29321,14 @@
           <p:nvPr>
             <p:extLst>
               <p:ext uri="{D42A27DB-BD31-4B8C-83A1-F6EECF244321}">
-                <p14:modId xmlns:p14="http://schemas.microsoft.com/office/powerpoint/2010/main" val="109813106"/>
+                <p14:modId xmlns:p14="http://schemas.microsoft.com/office/powerpoint/2010/main" val="2688583593"/>
               </p:ext>
             </p:extLst>
           </p:nvPr>
         </p:nvGraphicFramePr>
         <p:xfrm>
-          <a:off x="689113" y="852188"/>
-          <a:ext cx="8128000" cy="5418667"/>
+          <a:off x="689112" y="852188"/>
+          <a:ext cx="9700591" cy="5455847"/>
         </p:xfrm>
         <a:graphic>
           <a:graphicData uri="http://schemas.openxmlformats.org/drawingml/2006/diagram">

</xml_diff>